<commit_message>
Changes after presentation review by Yariv - second half
</commit_message>
<xml_diff>
--- a/opencl-intel/devices/mic_device/doc/OpenCL for MIC acrh overview for Runtime.pptx
+++ b/opencl-intel/devices/mic_device/doc/OpenCL for MIC acrh overview for Runtime.pptx
@@ -5,10 +5,10 @@
     <p:sldMasterId id="2147483648" r:id="rId1"/>
   </p:sldMasterIdLst>
   <p:notesMasterIdLst>
-    <p:notesMasterId r:id="rId17"/>
+    <p:notesMasterId r:id="rId18"/>
   </p:notesMasterIdLst>
   <p:handoutMasterIdLst>
-    <p:handoutMasterId r:id="rId18"/>
+    <p:handoutMasterId r:id="rId19"/>
   </p:handoutMasterIdLst>
   <p:sldIdLst>
     <p:sldId id="288" r:id="rId2"/>
@@ -25,7 +25,8 @@
     <p:sldId id="481" r:id="rId13"/>
     <p:sldId id="482" r:id="rId14"/>
     <p:sldId id="483" r:id="rId15"/>
-    <p:sldId id="485" r:id="rId16"/>
+    <p:sldId id="487" r:id="rId16"/>
+    <p:sldId id="485" r:id="rId17"/>
   </p:sldIdLst>
   <p:sldSz cx="9144000" cy="6858000" type="screen4x3"/>
   <p:notesSz cx="7150100" cy="9448800"/>
@@ -5574,8 +5575,8 @@
     <dgm:cxn modelId="{2A48B30C-03F6-4155-9867-8FDB030F45B5}" type="presOf" srcId="{EDE9A32A-1EE8-49EE-9616-6231124FD3A3}" destId="{67CB0F3C-91F0-4252-B2FD-94DD2A88713F}" srcOrd="0" destOrd="1" presId="urn:microsoft.com/office/officeart/2005/8/layout/vList2"/>
     <dgm:cxn modelId="{448B5DFE-9B65-4D7F-9B9F-6117679C94CA}" srcId="{645C2147-D9DF-426D-9B9E-9A3E88FF3842}" destId="{16AB3D69-F3F4-49D7-A479-1381D0944BFF}" srcOrd="1" destOrd="0" parTransId="{B36237B1-1AF9-4E14-AB43-B4D8ACBF65FA}" sibTransId="{E44A54B4-060E-47E3-975D-95083743D9B3}"/>
     <dgm:cxn modelId="{591AAD2E-6BD0-47C7-826A-C50832576999}" srcId="{3B357217-0457-4C25-9F85-86D455F8C347}" destId="{8CADFED6-C70E-467B-9FA9-19F180D0304F}" srcOrd="0" destOrd="0" parTransId="{C291A340-5D69-4D16-9A00-B24344F612B1}" sibTransId="{BE0341A3-94A0-45A7-98A7-44CB269DAC3D}"/>
+    <dgm:cxn modelId="{9034A79B-6AA3-4830-BB01-11A5C52956C4}" srcId="{5FE6577F-2F0E-42A1-A8B3-642CEF5553B1}" destId="{B33E0094-6108-409F-9B05-31DF59FC87DE}" srcOrd="2" destOrd="0" parTransId="{EEA66E92-C882-4700-A457-379A110343AE}" sibTransId="{A50A1DDB-8226-4FD4-B38B-BB5910663D6F}"/>
     <dgm:cxn modelId="{2323AD08-9DE1-43A0-8103-30C242ADAC29}" type="presOf" srcId="{FF7C26BD-6F3D-490A-A545-505E6F77B79D}" destId="{5D0E9AB6-30DB-4451-BD34-57F4B8A1A198}" srcOrd="0" destOrd="0" presId="urn:microsoft.com/office/officeart/2005/8/layout/vList2"/>
-    <dgm:cxn modelId="{9034A79B-6AA3-4830-BB01-11A5C52956C4}" srcId="{5FE6577F-2F0E-42A1-A8B3-642CEF5553B1}" destId="{B33E0094-6108-409F-9B05-31DF59FC87DE}" srcOrd="2" destOrd="0" parTransId="{EEA66E92-C882-4700-A457-379A110343AE}" sibTransId="{A50A1DDB-8226-4FD4-B38B-BB5910663D6F}"/>
     <dgm:cxn modelId="{1801BD03-5993-4691-AEB2-670114D50408}" srcId="{645C2147-D9DF-426D-9B9E-9A3E88FF3842}" destId="{FF7C26BD-6F3D-490A-A545-505E6F77B79D}" srcOrd="0" destOrd="0" parTransId="{C7DDC468-2299-40F2-94F9-42ACFB819AE3}" sibTransId="{3D3A5D58-F110-4EAC-BD8B-9554B58A7838}"/>
     <dgm:cxn modelId="{680C57E1-1C70-44BD-8DBC-7739FF535F3C}" srcId="{16AB3D69-F3F4-49D7-A479-1381D0944BFF}" destId="{3B357217-0457-4C25-9F85-86D455F8C347}" srcOrd="1" destOrd="0" parTransId="{B04E24B6-D35E-4A81-8E70-9F6DF74BC9B1}" sibTransId="{D0D0E4D7-9784-47A3-9A9E-A3D72E4994F1}"/>
     <dgm:cxn modelId="{8B82F0A8-118D-4BAC-8F91-7D93C35B7153}" type="presOf" srcId="{673A70AA-5817-42A2-81C6-3AF6A86AD91C}" destId="{67CB0F3C-91F0-4252-B2FD-94DD2A88713F}" srcOrd="0" destOrd="0" presId="urn:microsoft.com/office/officeart/2005/8/layout/vList2"/>
@@ -6306,9 +6307,20 @@
           <a:pPr rtl="0"/>
           <a:r>
             <a:rPr lang="en-US" sz="1800" dirty="0" smtClean="0"/>
-            <a:t>MIC DA device side callback copies the string to the specific buffer atomically.</a:t>
+            <a:t>MIC DA device side callback copies the string to the specific buffer atomically</a:t>
           </a:r>
-          <a:endParaRPr lang="en-US" sz="1800" dirty="0"/>
+          <a:r>
+            <a:rPr lang="en-US" sz="1800" dirty="0" smtClean="0"/>
+            <a:t>.</a:t>
+          </a:r>
+        </a:p>
+        <a:p>
+          <a:pPr rtl="0"/>
+          <a:r>
+            <a:rPr lang="en-US" sz="1800" b="1" i="1" dirty="0" smtClean="0"/>
+            <a:t>** Avoid Work Items output intermixing to ease debugging **</a:t>
+          </a:r>
+          <a:endParaRPr lang="en-US" sz="1800" b="1" i="1" dirty="0"/>
         </a:p>
       </dgm:t>
     </dgm:pt>
@@ -6807,7 +6819,7 @@
         <a:p>
           <a:pPr rtl="0"/>
           <a:r>
-            <a:rPr lang="en-US" smtClean="0"/>
+            <a:rPr lang="en-US" dirty="0" smtClean="0"/>
             <a:t>Allow manual Arena creation and submitting tasks to arbitrary arenas by any application thread</a:t>
           </a:r>
           <a:endParaRPr lang="en-US" dirty="0"/>
@@ -6959,10 +6971,10 @@
         <a:p>
           <a:pPr rtl="0"/>
           <a:r>
-            <a:rPr lang="en-US" smtClean="0"/>
+            <a:rPr lang="en-US" dirty="0" smtClean="0"/>
             <a:t>Ability to measure buffer operation start</a:t>
           </a:r>
-          <a:endParaRPr lang="en-US"/>
+          <a:endParaRPr lang="en-US" dirty="0"/>
         </a:p>
       </dgm:t>
     </dgm:pt>
@@ -7016,6 +7028,44 @@
       </dgm:t>
     </dgm:pt>
     <dgm:pt modelId="{6CF29048-0F10-4A73-A66D-4A25BC828763}" type="sibTrans" cxnId="{7AD890BC-5599-4F95-A106-1C041C54315D}">
+      <dgm:prSet/>
+      <dgm:spPr/>
+      <dgm:t>
+        <a:bodyPr/>
+        <a:lstStyle/>
+        <a:p>
+          <a:endParaRPr lang="en-US"/>
+        </a:p>
+      </dgm:t>
+    </dgm:pt>
+    <dgm:pt modelId="{5EA98692-4DD2-4F1A-909E-252F4E37A285}">
+      <dgm:prSet/>
+      <dgm:spPr/>
+      <dgm:t>
+        <a:bodyPr/>
+        <a:lstStyle/>
+        <a:p>
+          <a:pPr rtl="0"/>
+          <a:r>
+            <a:rPr lang="en-US" dirty="0" smtClean="0"/>
+            <a:t>Support Local Arena Observers</a:t>
+          </a:r>
+          <a:endParaRPr lang="en-US" dirty="0"/>
+        </a:p>
+      </dgm:t>
+    </dgm:pt>
+    <dgm:pt modelId="{9CDABB4E-A8AE-4F6A-9188-E0631CE30B34}" type="parTrans" cxnId="{9DE7BCFA-4B72-4028-BA7C-C42AA4694649}">
+      <dgm:prSet/>
+      <dgm:spPr/>
+      <dgm:t>
+        <a:bodyPr/>
+        <a:lstStyle/>
+        <a:p>
+          <a:endParaRPr lang="en-US"/>
+        </a:p>
+      </dgm:t>
+    </dgm:pt>
+    <dgm:pt modelId="{0882DC31-B73D-4877-9292-B07A59CEDE38}" type="sibTrans" cxnId="{9DE7BCFA-4B72-4028-BA7C-C42AA4694649}">
       <dgm:prSet/>
       <dgm:spPr/>
       <dgm:t>
@@ -7262,6 +7312,8 @@
     <dgm:cxn modelId="{84881D50-A9F4-45CF-B677-E307948FCB8F}" type="presOf" srcId="{381BE165-E217-4469-967D-449BAF1F7DC2}" destId="{A7510B0D-8B2A-4A86-807F-2A085A9968A5}" srcOrd="0" destOrd="0" presId="urn:microsoft.com/office/officeart/2005/8/layout/list1"/>
     <dgm:cxn modelId="{82632590-126F-478B-95A2-32CA0DFF92F4}" type="presOf" srcId="{875A89C7-B05B-4366-8D40-1185823E2C6E}" destId="{B4FDC873-78D4-4FB4-B5B0-049926DE8A1A}" srcOrd="1" destOrd="0" presId="urn:microsoft.com/office/officeart/2005/8/layout/list1"/>
     <dgm:cxn modelId="{8C4B960C-99B8-4601-8AC4-F88E3953A281}" type="presOf" srcId="{DFEDEE1D-69F6-4D76-8A43-6A808AD3E1C4}" destId="{CC7BCB6C-8BCA-495D-8CF6-D84666EF5E5F}" srcOrd="0" destOrd="3" presId="urn:microsoft.com/office/officeart/2005/8/layout/list1"/>
+    <dgm:cxn modelId="{9DE7BCFA-4B72-4028-BA7C-C42AA4694649}" srcId="{8480DCCD-41B1-4FEE-814C-0E656A275AF9}" destId="{5EA98692-4DD2-4F1A-909E-252F4E37A285}" srcOrd="1" destOrd="0" parTransId="{9CDABB4E-A8AE-4F6A-9188-E0631CE30B34}" sibTransId="{0882DC31-B73D-4877-9292-B07A59CEDE38}"/>
+    <dgm:cxn modelId="{CE1E61B2-E742-4CBC-94AD-97B7A52B449D}" type="presOf" srcId="{5EA98692-4DD2-4F1A-909E-252F4E37A285}" destId="{48B4068F-93DE-4F21-A39D-216EC12D90FA}" srcOrd="0" destOrd="1" presId="urn:microsoft.com/office/officeart/2005/8/layout/list1"/>
     <dgm:cxn modelId="{B7DC7B38-1D0C-4603-9A07-4BAF8922692C}" type="presOf" srcId="{4809A052-339C-4B54-B992-67A13C97ADAA}" destId="{CC7BCB6C-8BCA-495D-8CF6-D84666EF5E5F}" srcOrd="0" destOrd="1" presId="urn:microsoft.com/office/officeart/2005/8/layout/list1"/>
     <dgm:cxn modelId="{D7C19577-B0E8-494B-AE68-7087E7E452D3}" srcId="{DD8C1B21-E105-4303-887A-6CB1E6E4DA97}" destId="{875A89C7-B05B-4366-8D40-1185823E2C6E}" srcOrd="0" destOrd="0" parTransId="{1DF17B52-25DF-41A7-A84E-6375AE03F565}" sibTransId="{0292764D-80F7-4C7E-86C1-6FEFCE2161BE}"/>
     <dgm:cxn modelId="{8C761ED4-F506-40FF-A62F-EF5BA50B6C76}" type="presOf" srcId="{B3DC2587-E04D-4C5C-A58F-384A6C572ACF}" destId="{5DEEECA0-F703-4185-BE20-02DAF9EFE1D1}" srcOrd="0" destOrd="0" presId="urn:microsoft.com/office/officeart/2005/8/layout/list1"/>
@@ -9382,9 +9434,30 @@
           </a:pPr>
           <a:r>
             <a:rPr lang="en-US" sz="1800" kern="1200" dirty="0" smtClean="0"/>
-            <a:t>MIC DA device side callback copies the string to the specific buffer atomically.</a:t>
+            <a:t>MIC DA device side callback copies the string to the specific buffer atomically</a:t>
           </a:r>
-          <a:endParaRPr lang="en-US" sz="1800" kern="1200" dirty="0"/>
+          <a:r>
+            <a:rPr lang="en-US" sz="1800" kern="1200" dirty="0" smtClean="0"/>
+            <a:t>.</a:t>
+          </a:r>
+        </a:p>
+        <a:p>
+          <a:pPr lvl="0" algn="ctr" defTabSz="800100" rtl="0">
+            <a:lnSpc>
+              <a:spcPct val="90000"/>
+            </a:lnSpc>
+            <a:spcBef>
+              <a:spcPct val="0"/>
+            </a:spcBef>
+            <a:spcAft>
+              <a:spcPct val="35000"/>
+            </a:spcAft>
+          </a:pPr>
+          <a:r>
+            <a:rPr lang="en-US" sz="1800" b="1" i="1" kern="1200" dirty="0" smtClean="0"/>
+            <a:t>** Avoid Work Items output intermixing to ease debugging **</a:t>
+          </a:r>
+          <a:endParaRPr lang="en-US" sz="1800" b="1" i="1" kern="1200" dirty="0"/>
         </a:p>
       </dsp:txBody>
       <dsp:txXfrm rot="10800000">
@@ -9589,7 +9662,7 @@
       </dsp:nvSpPr>
       <dsp:spPr>
         <a:xfrm>
-          <a:off x="0" y="422610"/>
+          <a:off x="0" y="312360"/>
           <a:ext cx="8464550" cy="595350"/>
         </a:xfrm>
         <a:prstGeom prst="rect">
@@ -9655,7 +9728,7 @@
         </a:p>
       </dsp:txBody>
       <dsp:txXfrm>
-        <a:off x="0" y="422610"/>
+        <a:off x="0" y="312360"/>
         <a:ext cx="8464550" cy="595350"/>
       </dsp:txXfrm>
     </dsp:sp>
@@ -9666,7 +9739,7 @@
       </dsp:nvSpPr>
       <dsp:spPr>
         <a:xfrm>
-          <a:off x="423227" y="215970"/>
+          <a:off x="423227" y="105720"/>
           <a:ext cx="5925185" cy="413280"/>
         </a:xfrm>
         <a:prstGeom prst="roundRect">
@@ -9764,7 +9837,7 @@
         </a:p>
       </dsp:txBody>
       <dsp:txXfrm>
-        <a:off x="443402" y="236145"/>
+        <a:off x="443402" y="125895"/>
         <a:ext cx="5884835" cy="372930"/>
       </dsp:txXfrm>
     </dsp:sp>
@@ -9775,7 +9848,7 @@
       </dsp:nvSpPr>
       <dsp:spPr>
         <a:xfrm>
-          <a:off x="0" y="1300200"/>
+          <a:off x="0" y="1189950"/>
           <a:ext cx="8464550" cy="1455299"/>
         </a:xfrm>
         <a:prstGeom prst="rect">
@@ -9895,7 +9968,7 @@
         </a:p>
       </dsp:txBody>
       <dsp:txXfrm>
-        <a:off x="0" y="1300200"/>
+        <a:off x="0" y="1189950"/>
         <a:ext cx="8464550" cy="1455299"/>
       </dsp:txXfrm>
     </dsp:sp>
@@ -9906,7 +9979,7 @@
       </dsp:nvSpPr>
       <dsp:spPr>
         <a:xfrm>
-          <a:off x="423227" y="1093560"/>
+          <a:off x="423227" y="983310"/>
           <a:ext cx="5925185" cy="413280"/>
         </a:xfrm>
         <a:prstGeom prst="roundRect">
@@ -10004,7 +10077,7 @@
         </a:p>
       </dsp:txBody>
       <dsp:txXfrm>
-        <a:off x="443402" y="1113735"/>
+        <a:off x="443402" y="1003485"/>
         <a:ext cx="5884835" cy="372930"/>
       </dsp:txXfrm>
     </dsp:sp>
@@ -10015,8 +10088,8 @@
       </dsp:nvSpPr>
       <dsp:spPr>
         <a:xfrm>
-          <a:off x="0" y="3037739"/>
-          <a:ext cx="8464550" cy="595350"/>
+          <a:off x="0" y="2927489"/>
+          <a:ext cx="8464550" cy="815850"/>
         </a:xfrm>
         <a:prstGeom prst="rect">
           <a:avLst/>
@@ -10074,15 +10147,34 @@
             <a:buChar char="••"/>
           </a:pPr>
           <a:r>
-            <a:rPr lang="en-US" sz="1400" kern="1200" smtClean="0"/>
+            <a:rPr lang="en-US" sz="1400" kern="1200" dirty="0" smtClean="0"/>
             <a:t>Allow manual Arena creation and submitting tasks to arbitrary arenas by any application thread</a:t>
+          </a:r>
+          <a:endParaRPr lang="en-US" sz="1400" kern="1200" dirty="0"/>
+        </a:p>
+        <a:p>
+          <a:pPr marL="114300" lvl="1" indent="-114300" algn="l" defTabSz="622300" rtl="0">
+            <a:lnSpc>
+              <a:spcPct val="90000"/>
+            </a:lnSpc>
+            <a:spcBef>
+              <a:spcPct val="0"/>
+            </a:spcBef>
+            <a:spcAft>
+              <a:spcPct val="15000"/>
+            </a:spcAft>
+            <a:buChar char="••"/>
+          </a:pPr>
+          <a:r>
+            <a:rPr lang="en-US" sz="1400" kern="1200" dirty="0" smtClean="0"/>
+            <a:t>Support Local Arena Observers</a:t>
           </a:r>
           <a:endParaRPr lang="en-US" sz="1400" kern="1200" dirty="0"/>
         </a:p>
       </dsp:txBody>
       <dsp:txXfrm>
-        <a:off x="0" y="3037739"/>
-        <a:ext cx="8464550" cy="595350"/>
+        <a:off x="0" y="2927489"/>
+        <a:ext cx="8464550" cy="815850"/>
       </dsp:txXfrm>
     </dsp:sp>
     <dsp:sp modelId="{4FB21003-4F00-4B83-ACB9-5DE3C9405725}">
@@ -10092,7 +10184,7 @@
       </dsp:nvSpPr>
       <dsp:spPr>
         <a:xfrm>
-          <a:off x="423227" y="2831099"/>
+          <a:off x="423227" y="2720849"/>
           <a:ext cx="5925185" cy="413280"/>
         </a:xfrm>
         <a:prstGeom prst="roundRect">
@@ -10190,7 +10282,7 @@
         </a:p>
       </dsp:txBody>
       <dsp:txXfrm>
-        <a:off x="443402" y="2851274"/>
+        <a:off x="443402" y="2741024"/>
         <a:ext cx="5884835" cy="372930"/>
       </dsp:txXfrm>
     </dsp:sp>
@@ -10201,7 +10293,7 @@
       </dsp:nvSpPr>
       <dsp:spPr>
         <a:xfrm>
-          <a:off x="0" y="3915330"/>
+          <a:off x="0" y="4025579"/>
           <a:ext cx="8464550" cy="1278900"/>
         </a:xfrm>
         <a:prstGeom prst="rect">
@@ -10298,10 +10390,10 @@
             <a:buChar char="••"/>
           </a:pPr>
           <a:r>
-            <a:rPr lang="en-US" sz="1400" kern="1200" smtClean="0"/>
+            <a:rPr lang="en-US" sz="1400" kern="1200" dirty="0" smtClean="0"/>
             <a:t>Ability to measure buffer operation start</a:t>
           </a:r>
-          <a:endParaRPr lang="en-US" sz="1400" kern="1200"/>
+          <a:endParaRPr lang="en-US" sz="1400" kern="1200" dirty="0"/>
         </a:p>
         <a:p>
           <a:pPr marL="114300" lvl="1" indent="-114300" algn="l" defTabSz="622300" rtl="0">
@@ -10324,7 +10416,7 @@
         </a:p>
       </dsp:txBody>
       <dsp:txXfrm>
-        <a:off x="0" y="3915330"/>
+        <a:off x="0" y="4025579"/>
         <a:ext cx="8464550" cy="1278900"/>
       </dsp:txXfrm>
     </dsp:sp>
@@ -10335,7 +10427,7 @@
       </dsp:nvSpPr>
       <dsp:spPr>
         <a:xfrm>
-          <a:off x="423227" y="3708689"/>
+          <a:off x="423227" y="3818939"/>
           <a:ext cx="5925185" cy="413280"/>
         </a:xfrm>
         <a:prstGeom prst="roundRect">
@@ -10433,7 +10525,7 @@
         </a:p>
       </dsp:txBody>
       <dsp:txXfrm>
-        <a:off x="443402" y="3728864"/>
+        <a:off x="443402" y="3839114"/>
         <a:ext cx="5884835" cy="372930"/>
       </dsp:txXfrm>
     </dsp:sp>
@@ -20255,7 +20347,6 @@
               <a:rPr lang="en-US" sz="2000" dirty="0" smtClean="0"/>
               <a:t>November 14, 2011</a:t>
             </a:r>
-            <a:endParaRPr lang="en-US" sz="2000" dirty="0" smtClean="0"/>
           </a:p>
         </p:txBody>
       </p:sp>
@@ -20407,13 +20498,46 @@
           <a:p>
             <a:r>
               <a:rPr lang="en-US" dirty="0" smtClean="0"/>
-              <a:t>Each Command List is represented as COI Pipeline with dedicated device thread.</a:t>
+              <a:t>Each Command List is represented as </a:t>
+            </a:r>
+            <a:r>
+              <a:rPr lang="en-US" i="1" dirty="0" smtClean="0"/>
+              <a:t>COI Pipeline</a:t>
+            </a:r>
+            <a:r>
+              <a:rPr lang="en-US" dirty="0" smtClean="0"/>
+              <a:t> with dedicated device thread.</a:t>
             </a:r>
           </a:p>
           <a:p>
+            <a:pPr>
+              <a:spcBef>
+                <a:spcPts val="600"/>
+              </a:spcBef>
+            </a:pPr>
+            <a:r>
+              <a:rPr lang="en-US" dirty="0" err="1" smtClean="0"/>
+              <a:t>NDRange</a:t>
+            </a:r>
             <a:r>
               <a:rPr lang="en-US" dirty="0" smtClean="0"/>
-              <a:t>Enqueue Kernel is mapped to COI Run-Function (device-side </a:t>
+              <a:t> </a:t>
+            </a:r>
+            <a:r>
+              <a:rPr lang="en-US" dirty="0" smtClean="0"/>
+              <a:t>is mapped to </a:t>
+            </a:r>
+            <a:r>
+              <a:rPr lang="en-US" i="1" dirty="0" smtClean="0"/>
+              <a:t>COI Run-Function</a:t>
+            </a:r>
+            <a:r>
+              <a:rPr lang="en-US" dirty="0" smtClean="0"/>
+              <a:t> (</a:t>
+            </a:r>
+            <a:r>
+              <a:rPr lang="en-US" dirty="0" smtClean="0"/>
+              <a:t>device-side </a:t>
             </a:r>
             <a:r>
               <a:rPr lang="en-US" dirty="0" err="1" smtClean="0"/>
@@ -20421,10 +20545,16 @@
             </a:r>
             <a:r>
               <a:rPr lang="en-US" dirty="0" smtClean="0"/>
-              <a:t>) enqueue.</a:t>
+              <a:t>) invocation.</a:t>
             </a:r>
+            <a:endParaRPr lang="en-US" dirty="0" smtClean="0"/>
           </a:p>
           <a:p>
+            <a:pPr>
+              <a:spcBef>
+                <a:spcPts val="600"/>
+              </a:spcBef>
+            </a:pPr>
             <a:r>
               <a:rPr lang="en-US" dirty="0" smtClean="0"/>
               <a:t>Memory Object Operations (Read/Write/Map/</a:t>
@@ -20435,7 +20565,27 @@
             </a:r>
             <a:r>
               <a:rPr lang="en-US" dirty="0" smtClean="0"/>
-              <a:t>) are represented as COI Buffer operations and are mapped to DMA invocations </a:t>
+              <a:t>) are </a:t>
+            </a:r>
+            <a:r>
+              <a:rPr lang="en-US" dirty="0" smtClean="0"/>
+              <a:t>implemented as </a:t>
+            </a:r>
+            <a:r>
+              <a:rPr lang="en-US" i="1" dirty="0" smtClean="0"/>
+              <a:t>COI Buffer</a:t>
+            </a:r>
+            <a:r>
+              <a:rPr lang="en-US" dirty="0" smtClean="0"/>
+              <a:t> operations </a:t>
+            </a:r>
+            <a:r>
+              <a:rPr lang="en-US" dirty="0" smtClean="0"/>
+              <a:t>which are mapped onto </a:t>
+            </a:r>
+            <a:r>
+              <a:rPr lang="en-US" dirty="0" smtClean="0"/>
+              <a:t>DMA invocations </a:t>
             </a:r>
             <a:r>
               <a:rPr lang="en-US" b="1" i="1" dirty="0" smtClean="0"/>
@@ -20449,7 +20599,7 @@
           <a:p>
             <a:pPr lvl="1"/>
             <a:r>
-              <a:rPr lang="en-US" dirty="0" smtClean="0"/>
+              <a:rPr lang="en-US" sz="1600" dirty="0" smtClean="0"/>
               <a:t>Not associated with COI Pipelines</a:t>
             </a:r>
           </a:p>
@@ -20460,14 +20610,34 @@
               </a:spcBef>
             </a:pPr>
             <a:r>
-              <a:rPr lang="en-US" dirty="0" smtClean="0"/>
+              <a:rPr lang="en-US" sz="1600" dirty="0" smtClean="0"/>
               <a:t>COI Events used to enforce ordering between COI Buffer operations and between COI Buffer and COI Pipeline operations</a:t>
             </a:r>
           </a:p>
           <a:p>
             <a:r>
               <a:rPr lang="en-US" dirty="0" smtClean="0"/>
-              <a:t>Out-of-Order Command Lists are represented by COI Run-Functions that launch kernels asynchronously and immediately return.</a:t>
+              <a:t>Out-of-Order </a:t>
+            </a:r>
+            <a:r>
+              <a:rPr lang="en-US" dirty="0" err="1" smtClean="0"/>
+              <a:t>NDRanges</a:t>
+            </a:r>
+            <a:r>
+              <a:rPr lang="en-US" dirty="0" smtClean="0"/>
+              <a:t> </a:t>
+            </a:r>
+            <a:r>
+              <a:rPr lang="en-US" dirty="0" smtClean="0"/>
+              <a:t>are </a:t>
+            </a:r>
+            <a:r>
+              <a:rPr lang="en-US" dirty="0" smtClean="0"/>
+              <a:t>implemented by </a:t>
+            </a:r>
+            <a:r>
+              <a:rPr lang="en-US" dirty="0" smtClean="0"/>
+              <a:t>COI Run-Functions that launch kernels asynchronously and immediately return.</a:t>
             </a:r>
           </a:p>
           <a:p>
@@ -20553,7 +20723,7 @@
         </p:blipFill>
         <p:spPr bwMode="auto">
           <a:xfrm>
-            <a:off x="2109640" y="3962400"/>
+            <a:off x="1447800" y="3886200"/>
             <a:ext cx="4124474" cy="2819400"/>
           </a:xfrm>
           <a:prstGeom prst="rect">
@@ -20594,6 +20764,477 @@
           </a:extLst>
         </p:spPr>
       </p:pic>
+      <p:graphicFrame>
+        <p:nvGraphicFramePr>
+          <p:cNvPr id="5" name="Table 4"/>
+          <p:cNvGraphicFramePr>
+            <a:graphicFrameLocks noGrp="1"/>
+          </p:cNvGraphicFramePr>
+          <p:nvPr>
+            <p:extLst>
+              <p:ext uri="{D42A27DB-BD31-4B8C-83A1-F6EECF244321}">
+                <p14:modId xmlns:p14="http://schemas.microsoft.com/office/powerpoint/2010/main" val="1045240219"/>
+              </p:ext>
+            </p:extLst>
+          </p:nvPr>
+        </p:nvGraphicFramePr>
+        <p:xfrm>
+          <a:off x="5791199" y="4950459"/>
+          <a:ext cx="2743201" cy="764541"/>
+        </p:xfrm>
+        <a:graphic>
+          <a:graphicData uri="http://schemas.openxmlformats.org/drawingml/2006/table">
+            <a:tbl>
+              <a:tblPr firstRow="1" bandRow="1">
+                <a:tableStyleId>{2D5ABB26-0587-4C30-8999-92F81FD0307C}</a:tableStyleId>
+              </a:tblPr>
+              <a:tblGrid>
+                <a:gridCol w="1066801"/>
+                <a:gridCol w="228600"/>
+                <a:gridCol w="1447800"/>
+              </a:tblGrid>
+              <a:tr h="254847">
+                <a:tc>
+                  <a:txBody>
+                    <a:bodyPr/>
+                    <a:lstStyle/>
+                    <a:p>
+                      <a:r>
+                        <a:rPr lang="en-US" sz="1400" b="0" i="1" dirty="0" smtClean="0">
+                          <a:solidFill>
+                            <a:srgbClr val="FFFF00"/>
+                          </a:solidFill>
+                        </a:rPr>
+                        <a:t>Command</a:t>
+                      </a:r>
+                      <a:r>
+                        <a:rPr lang="en-US" sz="1400" b="0" i="1" baseline="0" dirty="0" smtClean="0">
+                          <a:solidFill>
+                            <a:srgbClr val="FFFF00"/>
+                          </a:solidFill>
+                        </a:rPr>
+                        <a:t> List</a:t>
+                      </a:r>
+                      <a:endParaRPr lang="en-US" sz="1400" b="0" i="1" dirty="0">
+                        <a:solidFill>
+                          <a:srgbClr val="FFFF00"/>
+                        </a:solidFill>
+                      </a:endParaRPr>
+                    </a:p>
+                  </a:txBody>
+                  <a:tcPr marL="0" marR="0" marT="0" marB="0">
+                    <a:lnL>
+                      <a:noFill/>
+                    </a:lnL>
+                    <a:lnR>
+                      <a:noFill/>
+                    </a:lnR>
+                    <a:lnT>
+                      <a:noFill/>
+                    </a:lnT>
+                    <a:lnB>
+                      <a:noFill/>
+                    </a:lnB>
+                    <a:lnTlToBr w="12700" cmpd="sng">
+                      <a:noFill/>
+                      <a:prstDash val="solid"/>
+                    </a:lnTlToBr>
+                    <a:lnBlToTr w="12700" cmpd="sng">
+                      <a:noFill/>
+                      <a:prstDash val="solid"/>
+                    </a:lnBlToTr>
+                  </a:tcPr>
+                </a:tc>
+                <a:tc>
+                  <a:txBody>
+                    <a:bodyPr/>
+                    <a:lstStyle/>
+                    <a:p>
+                      <a:r>
+                        <a:rPr lang="en-US" sz="1400" b="0" i="1" dirty="0" smtClean="0">
+                          <a:solidFill>
+                            <a:srgbClr val="FFFF00"/>
+                          </a:solidFill>
+                          <a:sym typeface="Wingdings"/>
+                        </a:rPr>
+                        <a:t></a:t>
+                      </a:r>
+                      <a:endParaRPr lang="en-US" sz="1400" b="0" i="1" dirty="0">
+                        <a:solidFill>
+                          <a:srgbClr val="FFFF00"/>
+                        </a:solidFill>
+                      </a:endParaRPr>
+                    </a:p>
+                  </a:txBody>
+                  <a:tcPr marL="0" marR="0" marT="0" marB="0">
+                    <a:lnL>
+                      <a:noFill/>
+                    </a:lnL>
+                    <a:lnR>
+                      <a:noFill/>
+                    </a:lnR>
+                    <a:lnT>
+                      <a:noFill/>
+                    </a:lnT>
+                    <a:lnB>
+                      <a:noFill/>
+                    </a:lnB>
+                    <a:lnTlToBr w="12700" cmpd="sng">
+                      <a:noFill/>
+                      <a:prstDash val="solid"/>
+                    </a:lnTlToBr>
+                    <a:lnBlToTr w="12700" cmpd="sng">
+                      <a:noFill/>
+                      <a:prstDash val="solid"/>
+                    </a:lnBlToTr>
+                  </a:tcPr>
+                </a:tc>
+                <a:tc>
+                  <a:txBody>
+                    <a:bodyPr/>
+                    <a:lstStyle/>
+                    <a:p>
+                      <a:r>
+                        <a:rPr lang="en-US" sz="1400" b="0" i="1" dirty="0" smtClean="0">
+                          <a:solidFill>
+                            <a:srgbClr val="FFFF00"/>
+                          </a:solidFill>
+                        </a:rPr>
+                        <a:t>COI Pipeline</a:t>
+                      </a:r>
+                      <a:endParaRPr lang="en-US" sz="1400" b="0" i="1" dirty="0">
+                        <a:solidFill>
+                          <a:srgbClr val="FFFF00"/>
+                        </a:solidFill>
+                      </a:endParaRPr>
+                    </a:p>
+                  </a:txBody>
+                  <a:tcPr marL="0" marR="0" marT="0" marB="0">
+                    <a:lnL>
+                      <a:noFill/>
+                    </a:lnL>
+                    <a:lnR>
+                      <a:noFill/>
+                    </a:lnR>
+                    <a:lnT>
+                      <a:noFill/>
+                    </a:lnT>
+                    <a:lnB>
+                      <a:noFill/>
+                    </a:lnB>
+                    <a:lnTlToBr w="12700" cmpd="sng">
+                      <a:noFill/>
+                      <a:prstDash val="solid"/>
+                    </a:lnTlToBr>
+                    <a:lnBlToTr w="12700" cmpd="sng">
+                      <a:noFill/>
+                      <a:prstDash val="solid"/>
+                    </a:lnBlToTr>
+                  </a:tcPr>
+                </a:tc>
+              </a:tr>
+              <a:tr h="254847">
+                <a:tc>
+                  <a:txBody>
+                    <a:bodyPr/>
+                    <a:lstStyle/>
+                    <a:p>
+                      <a:r>
+                        <a:rPr lang="en-US" sz="1400" b="0" i="1" dirty="0" err="1" smtClean="0">
+                          <a:solidFill>
+                            <a:srgbClr val="FFFF00"/>
+                          </a:solidFill>
+                        </a:rPr>
+                        <a:t>NDRange</a:t>
+                      </a:r>
+                      <a:endParaRPr lang="en-US" sz="1400" b="0" i="1" dirty="0">
+                        <a:solidFill>
+                          <a:srgbClr val="FFFF00"/>
+                        </a:solidFill>
+                      </a:endParaRPr>
+                    </a:p>
+                  </a:txBody>
+                  <a:tcPr marL="0" marR="0" marT="0" marB="0">
+                    <a:lnL>
+                      <a:noFill/>
+                    </a:lnL>
+                    <a:lnR>
+                      <a:noFill/>
+                    </a:lnR>
+                    <a:lnT>
+                      <a:noFill/>
+                    </a:lnT>
+                    <a:lnB>
+                      <a:noFill/>
+                    </a:lnB>
+                    <a:lnTlToBr w="12700" cmpd="sng">
+                      <a:noFill/>
+                      <a:prstDash val="solid"/>
+                    </a:lnTlToBr>
+                    <a:lnBlToTr w="12700" cmpd="sng">
+                      <a:noFill/>
+                      <a:prstDash val="solid"/>
+                    </a:lnBlToTr>
+                  </a:tcPr>
+                </a:tc>
+                <a:tc>
+                  <a:txBody>
+                    <a:bodyPr/>
+                    <a:lstStyle/>
+                    <a:p>
+                      <a:pPr marL="0" marR="0" indent="0" algn="l" defTabSz="914400" rtl="0" eaLnBrk="1" fontAlgn="auto" latinLnBrk="0" hangingPunct="1">
+                        <a:lnSpc>
+                          <a:spcPct val="100000"/>
+                        </a:lnSpc>
+                        <a:spcBef>
+                          <a:spcPts val="0"/>
+                        </a:spcBef>
+                        <a:spcAft>
+                          <a:spcPts val="0"/>
+                        </a:spcAft>
+                        <a:buClrTx/>
+                        <a:buSzTx/>
+                        <a:buFontTx/>
+                        <a:buNone/>
+                        <a:tabLst/>
+                        <a:defRPr/>
+                      </a:pPr>
+                      <a:r>
+                        <a:rPr lang="en-US" sz="1400" b="0" i="1" dirty="0" smtClean="0">
+                          <a:solidFill>
+                            <a:srgbClr val="FFFF00"/>
+                          </a:solidFill>
+                          <a:sym typeface="Wingdings"/>
+                        </a:rPr>
+                        <a:t></a:t>
+                      </a:r>
+                      <a:endParaRPr lang="en-US" sz="1400" b="0" i="1" dirty="0" smtClean="0">
+                        <a:solidFill>
+                          <a:srgbClr val="FFFF00"/>
+                        </a:solidFill>
+                      </a:endParaRPr>
+                    </a:p>
+                  </a:txBody>
+                  <a:tcPr marL="0" marR="0" marT="0" marB="0">
+                    <a:lnL>
+                      <a:noFill/>
+                    </a:lnL>
+                    <a:lnR>
+                      <a:noFill/>
+                    </a:lnR>
+                    <a:lnT>
+                      <a:noFill/>
+                    </a:lnT>
+                    <a:lnB>
+                      <a:noFill/>
+                    </a:lnB>
+                    <a:lnTlToBr w="12700" cmpd="sng">
+                      <a:noFill/>
+                      <a:prstDash val="solid"/>
+                    </a:lnTlToBr>
+                    <a:lnBlToTr w="12700" cmpd="sng">
+                      <a:noFill/>
+                      <a:prstDash val="solid"/>
+                    </a:lnBlToTr>
+                  </a:tcPr>
+                </a:tc>
+                <a:tc>
+                  <a:txBody>
+                    <a:bodyPr/>
+                    <a:lstStyle/>
+                    <a:p>
+                      <a:r>
+                        <a:rPr lang="en-US" sz="1400" b="0" i="1" dirty="0" smtClean="0">
+                          <a:solidFill>
+                            <a:srgbClr val="FFFF00"/>
+                          </a:solidFill>
+                        </a:rPr>
+                        <a:t>COI Run-Function</a:t>
+                      </a:r>
+                      <a:endParaRPr lang="en-US" sz="1400" b="0" i="1" dirty="0">
+                        <a:solidFill>
+                          <a:srgbClr val="FFFF00"/>
+                        </a:solidFill>
+                      </a:endParaRPr>
+                    </a:p>
+                  </a:txBody>
+                  <a:tcPr marL="0" marR="0" marT="0" marB="0">
+                    <a:lnL>
+                      <a:noFill/>
+                    </a:lnL>
+                    <a:lnR>
+                      <a:noFill/>
+                    </a:lnR>
+                    <a:lnT>
+                      <a:noFill/>
+                    </a:lnT>
+                    <a:lnB>
+                      <a:noFill/>
+                    </a:lnB>
+                    <a:lnTlToBr w="12700" cmpd="sng">
+                      <a:noFill/>
+                      <a:prstDash val="solid"/>
+                    </a:lnTlToBr>
+                    <a:lnBlToTr w="12700" cmpd="sng">
+                      <a:noFill/>
+                      <a:prstDash val="solid"/>
+                    </a:lnBlToTr>
+                  </a:tcPr>
+                </a:tc>
+              </a:tr>
+              <a:tr h="254847">
+                <a:tc>
+                  <a:txBody>
+                    <a:bodyPr/>
+                    <a:lstStyle/>
+                    <a:p>
+                      <a:r>
+                        <a:rPr lang="en-US" sz="1400" b="0" i="1" dirty="0" smtClean="0">
+                          <a:solidFill>
+                            <a:srgbClr val="FFFF00"/>
+                          </a:solidFill>
+                        </a:rPr>
+                        <a:t>Buffer/Image</a:t>
+                      </a:r>
+                      <a:endParaRPr lang="en-US" sz="1400" b="0" i="1" dirty="0">
+                        <a:solidFill>
+                          <a:srgbClr val="FFFF00"/>
+                        </a:solidFill>
+                      </a:endParaRPr>
+                    </a:p>
+                  </a:txBody>
+                  <a:tcPr marL="0" marR="0" marT="0" marB="0">
+                    <a:lnL>
+                      <a:noFill/>
+                    </a:lnL>
+                    <a:lnR>
+                      <a:noFill/>
+                    </a:lnR>
+                    <a:lnT>
+                      <a:noFill/>
+                    </a:lnT>
+                    <a:lnB>
+                      <a:noFill/>
+                    </a:lnB>
+                    <a:lnTlToBr w="12700" cmpd="sng">
+                      <a:noFill/>
+                      <a:prstDash val="solid"/>
+                    </a:lnTlToBr>
+                    <a:lnBlToTr w="12700" cmpd="sng">
+                      <a:noFill/>
+                      <a:prstDash val="solid"/>
+                    </a:lnBlToTr>
+                  </a:tcPr>
+                </a:tc>
+                <a:tc>
+                  <a:txBody>
+                    <a:bodyPr/>
+                    <a:lstStyle/>
+                    <a:p>
+                      <a:pPr marL="0" marR="0" indent="0" algn="l" defTabSz="914400" rtl="0" eaLnBrk="1" fontAlgn="auto" latinLnBrk="0" hangingPunct="1">
+                        <a:lnSpc>
+                          <a:spcPct val="100000"/>
+                        </a:lnSpc>
+                        <a:spcBef>
+                          <a:spcPts val="0"/>
+                        </a:spcBef>
+                        <a:spcAft>
+                          <a:spcPts val="0"/>
+                        </a:spcAft>
+                        <a:buClrTx/>
+                        <a:buSzTx/>
+                        <a:buFontTx/>
+                        <a:buNone/>
+                        <a:tabLst/>
+                        <a:defRPr/>
+                      </a:pPr>
+                      <a:r>
+                        <a:rPr lang="en-US" sz="1400" b="0" i="1" dirty="0" smtClean="0">
+                          <a:solidFill>
+                            <a:srgbClr val="FFFF00"/>
+                          </a:solidFill>
+                          <a:sym typeface="Wingdings"/>
+                        </a:rPr>
+                        <a:t></a:t>
+                      </a:r>
+                      <a:endParaRPr lang="en-US" sz="1400" b="0" i="1" dirty="0" smtClean="0">
+                        <a:solidFill>
+                          <a:srgbClr val="FFFF00"/>
+                        </a:solidFill>
+                      </a:endParaRPr>
+                    </a:p>
+                  </a:txBody>
+                  <a:tcPr marL="0" marR="0" marT="0" marB="0">
+                    <a:lnL>
+                      <a:noFill/>
+                    </a:lnL>
+                    <a:lnR>
+                      <a:noFill/>
+                    </a:lnR>
+                    <a:lnT>
+                      <a:noFill/>
+                    </a:lnT>
+                    <a:lnB>
+                      <a:noFill/>
+                    </a:lnB>
+                    <a:lnTlToBr w="12700" cmpd="sng">
+                      <a:noFill/>
+                      <a:prstDash val="solid"/>
+                    </a:lnTlToBr>
+                    <a:lnBlToTr w="12700" cmpd="sng">
+                      <a:noFill/>
+                      <a:prstDash val="solid"/>
+                    </a:lnBlToTr>
+                  </a:tcPr>
+                </a:tc>
+                <a:tc>
+                  <a:txBody>
+                    <a:bodyPr/>
+                    <a:lstStyle/>
+                    <a:p>
+                      <a:r>
+                        <a:rPr lang="en-US" sz="1400" b="0" i="1" dirty="0" smtClean="0">
+                          <a:solidFill>
+                            <a:srgbClr val="FFFF00"/>
+                          </a:solidFill>
+                        </a:rPr>
+                        <a:t>COI Buffer</a:t>
+                      </a:r>
+                      <a:endParaRPr lang="en-US" sz="1400" b="0" i="1" dirty="0">
+                        <a:solidFill>
+                          <a:srgbClr val="FFFF00"/>
+                        </a:solidFill>
+                      </a:endParaRPr>
+                    </a:p>
+                  </a:txBody>
+                  <a:tcPr marL="0" marR="0" marT="0" marB="0">
+                    <a:lnL>
+                      <a:noFill/>
+                    </a:lnL>
+                    <a:lnR>
+                      <a:noFill/>
+                    </a:lnR>
+                    <a:lnT>
+                      <a:noFill/>
+                    </a:lnT>
+                    <a:lnB>
+                      <a:noFill/>
+                    </a:lnB>
+                    <a:lnTlToBr w="12700" cmpd="sng">
+                      <a:noFill/>
+                      <a:prstDash val="solid"/>
+                    </a:lnTlToBr>
+                    <a:lnBlToTr w="12700" cmpd="sng">
+                      <a:noFill/>
+                      <a:prstDash val="solid"/>
+                    </a:lnBlToTr>
+                  </a:tcPr>
+                </a:tc>
+              </a:tr>
+            </a:tbl>
+          </a:graphicData>
+        </a:graphic>
+      </p:graphicFrame>
     </p:spTree>
     <p:extLst>
       <p:ext uri="{BB962C8B-B14F-4D97-AF65-F5344CB8AC3E}">
@@ -20607,6 +21248,13 @@
   <p:transition>
     <p:fade/>
   </p:transition>
+  <p:timing>
+    <p:tnLst>
+      <p:par>
+        <p:cTn id="1" dur="indefinite" restart="never" nodeType="tmRoot"/>
+      </p:par>
+    </p:tnLst>
+  </p:timing>
 </p:sld>
 </file>
 
@@ -20681,16 +21329,12 @@
               <a:t>Event signaling is done by either COI itself as operation is completed or by explicit </a:t>
             </a:r>
             <a:r>
-              <a:rPr lang="en-US" dirty="0" err="1"/>
-              <a:t>COIEventSignalUserEvent</a:t>
-            </a:r>
-            <a:r>
-              <a:rPr lang="en-US" dirty="0"/>
-              <a:t>() </a:t>
+              <a:rPr lang="en-US" dirty="0" smtClean="0"/>
+              <a:t>COI API call </a:t>
             </a:r>
             <a:r>
               <a:rPr lang="en-US" dirty="0" smtClean="0"/>
-              <a:t>call at device side.</a:t>
+              <a:t>at device side.</a:t>
             </a:r>
           </a:p>
           <a:p>
@@ -20806,6 +21450,13 @@
   <p:transition>
     <p:fade/>
   </p:transition>
+  <p:timing>
+    <p:tnLst>
+      <p:par>
+        <p:cTn id="1" dur="indefinite" restart="never" nodeType="tmRoot"/>
+      </p:par>
+    </p:tnLst>
+  </p:timing>
 </p:sld>
 </file>
 
@@ -20836,7 +21487,7 @@
             <p:ph idx="1"/>
             <p:extLst>
               <p:ext uri="{D42A27DB-BD31-4B8C-83A1-F6EECF244321}">
-                <p14:modId xmlns:p14="http://schemas.microsoft.com/office/powerpoint/2010/main" val="1415738842"/>
+                <p14:modId xmlns:p14="http://schemas.microsoft.com/office/powerpoint/2010/main" val="3196977865"/>
               </p:ext>
             </p:extLst>
           </p:nvPr>
@@ -20915,6 +21566,13 @@
   <p:transition>
     <p:fade/>
   </p:transition>
+  <p:timing>
+    <p:tnLst>
+      <p:par>
+        <p:cTn id="1" dur="indefinite" restart="never" nodeType="tmRoot"/>
+      </p:par>
+    </p:tnLst>
+  </p:timing>
 </p:sld>
 </file>
 
@@ -20945,7 +21603,12 @@
             <p:ph idx="1"/>
           </p:nvPr>
         </p:nvSpPr>
-        <p:spPr/>
+        <p:spPr>
+          <a:xfrm>
+            <a:off x="455613" y="914400"/>
+            <a:ext cx="8237537" cy="4953000"/>
+          </a:xfrm>
+        </p:spPr>
         <p:txBody>
           <a:bodyPr/>
           <a:lstStyle/>
@@ -21051,8 +21714,8 @@
         </p:blipFill>
         <p:spPr bwMode="auto">
           <a:xfrm>
-            <a:off x="287895" y="2543175"/>
-            <a:ext cx="4055505" cy="2714625"/>
+            <a:off x="287895" y="2260672"/>
+            <a:ext cx="4055505" cy="2387528"/>
           </a:xfrm>
           <a:prstGeom prst="rect">
             <a:avLst/>
@@ -21115,8 +21778,8 @@
         </p:blipFill>
         <p:spPr bwMode="auto">
           <a:xfrm>
-            <a:off x="4724400" y="2514600"/>
-            <a:ext cx="4191000" cy="2768529"/>
+            <a:off x="4724400" y="2260671"/>
+            <a:ext cx="4191000" cy="2387529"/>
           </a:xfrm>
           <a:prstGeom prst="rect">
             <a:avLst/>
@@ -21164,8 +21827,8 @@
         </p:nvSpPr>
         <p:spPr>
           <a:xfrm>
-            <a:off x="381000" y="5308937"/>
-            <a:ext cx="8001000" cy="1446550"/>
+            <a:off x="381000" y="4659630"/>
+            <a:ext cx="8001000" cy="1738938"/>
           </a:xfrm>
           <a:prstGeom prst="rect">
             <a:avLst/>
@@ -21209,7 +21872,7 @@
               <a:buChar char="•"/>
             </a:pPr>
             <a:r>
-              <a:rPr lang="en-US" sz="1600" b="0" dirty="0" smtClean="0">
+              <a:rPr lang="en-US" sz="1400" b="0" dirty="0" smtClean="0">
                 <a:solidFill>
                   <a:schemeClr val="tx1"/>
                 </a:solidFill>
@@ -21219,7 +21882,7 @@
               <a:t>Required to </a:t>
             </a:r>
             <a:r>
-              <a:rPr lang="en-US" sz="1600" b="0" dirty="0">
+              <a:rPr lang="en-US" sz="1400" b="0" dirty="0">
                 <a:solidFill>
                   <a:schemeClr val="tx1"/>
                 </a:solidFill>
@@ -21229,7 +21892,7 @@
               <a:t>allow differentiation between CL_RUNNING command status change notification and </a:t>
             </a:r>
             <a:r>
-              <a:rPr lang="en-US" sz="1600" b="0" dirty="0" err="1">
+              <a:rPr lang="en-US" sz="1400" b="0" dirty="0" err="1">
                 <a:solidFill>
                   <a:schemeClr val="tx1"/>
                 </a:solidFill>
@@ -21239,7 +21902,7 @@
               <a:t>T</a:t>
             </a:r>
             <a:r>
-              <a:rPr lang="en-US" sz="1600" b="0" baseline="-25000" dirty="0" err="1">
+              <a:rPr lang="en-US" sz="1400" b="0" baseline="-25000" dirty="0" err="1">
                 <a:solidFill>
                   <a:schemeClr val="tx1"/>
                 </a:solidFill>
@@ -21249,7 +21912,7 @@
               <a:t>start</a:t>
             </a:r>
             <a:r>
-              <a:rPr lang="en-US" sz="1600" b="0" dirty="0">
+              <a:rPr lang="en-US" sz="1400" b="0" dirty="0">
                 <a:solidFill>
                   <a:schemeClr val="tx1"/>
                 </a:solidFill>
@@ -21259,6 +21922,35 @@
               <a:t> </a:t>
             </a:r>
             <a:r>
+              <a:rPr lang="en-US" sz="1400" b="0" dirty="0" smtClean="0">
+                <a:solidFill>
+                  <a:schemeClr val="tx1"/>
+                </a:solidFill>
+                <a:effectLst/>
+                <a:latin typeface="+mn-lt"/>
+              </a:rPr>
+              <a:t>measurement</a:t>
+            </a:r>
+            <a:r>
+              <a:rPr lang="en-US" sz="1400" b="0" dirty="0" smtClean="0">
+                <a:solidFill>
+                  <a:schemeClr val="tx1"/>
+                </a:solidFill>
+                <a:effectLst/>
+                <a:latin typeface="+mn-lt"/>
+              </a:rPr>
+              <a:t>.</a:t>
+            </a:r>
+          </a:p>
+          <a:p>
+            <a:pPr marL="285750" indent="-285750" algn="l">
+              <a:spcBef>
+                <a:spcPts val="600"/>
+              </a:spcBef>
+              <a:buFont typeface="Arial" pitchFamily="34" charset="0"/>
+              <a:buChar char="•"/>
+            </a:pPr>
+            <a:r>
               <a:rPr lang="en-US" sz="1600" b="0" dirty="0" smtClean="0">
                 <a:solidFill>
                   <a:schemeClr val="tx1"/>
@@ -21266,7 +21958,27 @@
                 <a:effectLst/>
                 <a:latin typeface="+mn-lt"/>
               </a:rPr>
-              <a:t>measurement.</a:t>
+              <a:t>COI to provide a </a:t>
+            </a:r>
+            <a:r>
+              <a:rPr lang="en-US" b="0" dirty="0">
+                <a:solidFill>
+                  <a:schemeClr val="tx1"/>
+                </a:solidFill>
+                <a:effectLst/>
+                <a:latin typeface="+mn-lt"/>
+              </a:rPr>
+              <a:t>way</a:t>
+            </a:r>
+            <a:r>
+              <a:rPr lang="en-US" sz="1600" b="0" dirty="0" smtClean="0">
+                <a:solidFill>
+                  <a:schemeClr val="tx1"/>
+                </a:solidFill>
+                <a:effectLst/>
+                <a:latin typeface="+mn-lt"/>
+              </a:rPr>
+              <a:t> to record an execution start time as COI Buffer operation starts</a:t>
             </a:r>
             <a:endParaRPr lang="en-US" sz="1600" b="0" dirty="0">
               <a:solidFill>
@@ -21692,21 +22404,28 @@
             </a:r>
           </a:p>
           <a:p>
-            <a:pPr lvl="2"/>
+            <a:pPr lvl="1"/>
+            <a:r>
+              <a:rPr lang="en-US" b="0" dirty="0">
+                <a:effectLst/>
+              </a:rPr>
+              <a:t>Each TBB </a:t>
+            </a:r>
             <a:r>
               <a:rPr lang="en-US" b="0" dirty="0" smtClean="0">
-                <a:solidFill>
-                  <a:srgbClr val="FFFF00"/>
-                </a:solidFill>
                 <a:effectLst/>
-                <a:sym typeface="Wingdings" pitchFamily="2" charset="2"/>
               </a:rPr>
-              <a:t>New requirement to TBB</a:t>
+              <a:t>Arena </a:t>
             </a:r>
-          </a:p>
-          <a:p>
-            <a:pPr lvl="1"/>
-            <a:endParaRPr lang="en-US" dirty="0"/>
+            <a:r>
+              <a:rPr lang="en-US" b="0" dirty="0">
+                <a:effectLst/>
+              </a:rPr>
+              <a:t>will use distinct set of HW execution units (HW Cores/Threads)</a:t>
+            </a:r>
+            <a:endParaRPr lang="en-US" b="0" dirty="0">
+              <a:effectLst/>
+            </a:endParaRPr>
           </a:p>
         </p:txBody>
       </p:sp>
@@ -21723,6 +22442,13 @@
   <p:transition>
     <p:fade/>
   </p:transition>
+  <p:timing>
+    <p:tnLst>
+      <p:par>
+        <p:cTn id="1" dur="indefinite" restart="never" nodeType="tmRoot"/>
+      </p:par>
+    </p:tnLst>
+  </p:timing>
 </p:sld>
 </file>
 
@@ -21753,7 +22479,927 @@
             <p:ph idx="1"/>
             <p:extLst>
               <p:ext uri="{D42A27DB-BD31-4B8C-83A1-F6EECF244321}">
-                <p14:modId xmlns:p14="http://schemas.microsoft.com/office/powerpoint/2010/main" val="982587094"/>
+                <p14:modId xmlns:p14="http://schemas.microsoft.com/office/powerpoint/2010/main" val="3634274934"/>
+              </p:ext>
+            </p:extLst>
+          </p:nvPr>
+        </p:nvGraphicFramePr>
+        <p:xfrm>
+          <a:off x="304800" y="909320"/>
+          <a:ext cx="8610600" cy="5486400"/>
+        </p:xfrm>
+        <a:graphic>
+          <a:graphicData uri="http://schemas.openxmlformats.org/drawingml/2006/table">
+            <a:tbl>
+              <a:tblPr firstRow="1" bandRow="1">
+                <a:tableStyleId>{5940675A-B579-460E-94D1-54222C63F5DA}</a:tableStyleId>
+              </a:tblPr>
+              <a:tblGrid>
+                <a:gridCol w="3352800"/>
+                <a:gridCol w="5257800"/>
+              </a:tblGrid>
+              <a:tr h="370840">
+                <a:tc>
+                  <a:txBody>
+                    <a:bodyPr/>
+                    <a:lstStyle/>
+                    <a:p>
+                      <a:r>
+                        <a:rPr lang="en-US" sz="1400" dirty="0" smtClean="0"/>
+                        <a:t>CL_DEVICE_TYPE</a:t>
+                      </a:r>
+                      <a:endParaRPr lang="en-US" sz="1400" b="0" dirty="0"/>
+                    </a:p>
+                  </a:txBody>
+                  <a:tcPr/>
+                </a:tc>
+                <a:tc>
+                  <a:txBody>
+                    <a:bodyPr/>
+                    <a:lstStyle/>
+                    <a:p>
+                      <a:r>
+                        <a:rPr lang="en-US" sz="1400" dirty="0" smtClean="0"/>
+                        <a:t>CL_DEVICE_TYPE_ACCELERATOR</a:t>
+                      </a:r>
+                      <a:endParaRPr lang="en-US" sz="1400" b="0" dirty="0"/>
+                    </a:p>
+                  </a:txBody>
+                  <a:tcPr/>
+                </a:tc>
+              </a:tr>
+              <a:tr h="370840">
+                <a:tc>
+                  <a:txBody>
+                    <a:bodyPr/>
+                    <a:lstStyle/>
+                    <a:p>
+                      <a:r>
+                        <a:rPr lang="en-US" sz="1400" dirty="0" smtClean="0"/>
+                        <a:t>CL_DEVICE_MAX_COMPUTE_UNITS</a:t>
+                      </a:r>
+                      <a:endParaRPr lang="en-US" sz="1400" b="0" dirty="0"/>
+                    </a:p>
+                  </a:txBody>
+                  <a:tcPr/>
+                </a:tc>
+                <a:tc>
+                  <a:txBody>
+                    <a:bodyPr/>
+                    <a:lstStyle/>
+                    <a:p>
+                      <a:r>
+                        <a:rPr lang="en-US" sz="1400" dirty="0" smtClean="0"/>
+                        <a:t>Number</a:t>
+                      </a:r>
+                      <a:r>
+                        <a:rPr lang="en-US" sz="1400" baseline="0" dirty="0" smtClean="0"/>
+                        <a:t> of HW threads on device</a:t>
+                      </a:r>
+                      <a:endParaRPr lang="en-US" sz="1400" b="0" dirty="0"/>
+                    </a:p>
+                  </a:txBody>
+                  <a:tcPr/>
+                </a:tc>
+              </a:tr>
+              <a:tr h="370840">
+                <a:tc>
+                  <a:txBody>
+                    <a:bodyPr/>
+                    <a:lstStyle/>
+                    <a:p>
+                      <a:pPr marL="0" marR="0" indent="0" algn="l" defTabSz="914400" rtl="0" eaLnBrk="1" fontAlgn="auto" latinLnBrk="0" hangingPunct="1">
+                        <a:lnSpc>
+                          <a:spcPct val="100000"/>
+                        </a:lnSpc>
+                        <a:spcBef>
+                          <a:spcPts val="0"/>
+                        </a:spcBef>
+                        <a:spcAft>
+                          <a:spcPts val="0"/>
+                        </a:spcAft>
+                        <a:buClrTx/>
+                        <a:buSzTx/>
+                        <a:buFontTx/>
+                        <a:buNone/>
+                        <a:tabLst/>
+                        <a:defRPr/>
+                      </a:pPr>
+                      <a:r>
+                        <a:rPr lang="en-US" sz="1400" u="none" strike="noStrike" kern="1200" baseline="0" dirty="0" smtClean="0"/>
+                        <a:t>CL_DEVICE_PREFERRED_VECTOR_WIDTH_*</a:t>
+                      </a:r>
+                      <a:endParaRPr lang="en-US" sz="1400" b="0" i="0" u="none" strike="noStrike" kern="1200" baseline="0" dirty="0" smtClean="0">
+                        <a:solidFill>
+                          <a:schemeClr val="dk1"/>
+                        </a:solidFill>
+                        <a:latin typeface="+mn-lt"/>
+                        <a:ea typeface="+mn-ea"/>
+                        <a:cs typeface="+mn-cs"/>
+                      </a:endParaRPr>
+                    </a:p>
+                  </a:txBody>
+                  <a:tcPr/>
+                </a:tc>
+                <a:tc>
+                  <a:txBody>
+                    <a:bodyPr/>
+                    <a:lstStyle/>
+                    <a:p>
+                      <a:r>
+                        <a:rPr lang="en-US" sz="1400" dirty="0" smtClean="0"/>
+                        <a:t>1 to allow efficient auto-</a:t>
+                      </a:r>
+                      <a:r>
+                        <a:rPr lang="en-US" sz="1400" dirty="0" err="1" smtClean="0"/>
+                        <a:t>vectorization</a:t>
+                      </a:r>
+                      <a:endParaRPr lang="en-US" sz="1400" b="0" dirty="0"/>
+                    </a:p>
+                  </a:txBody>
+                  <a:tcPr/>
+                </a:tc>
+              </a:tr>
+              <a:tr h="370840">
+                <a:tc>
+                  <a:txBody>
+                    <a:bodyPr/>
+                    <a:lstStyle/>
+                    <a:p>
+                      <a:pPr marL="0" marR="0" indent="0" algn="l" defTabSz="914400" rtl="0" eaLnBrk="1" fontAlgn="auto" latinLnBrk="0" hangingPunct="1">
+                        <a:lnSpc>
+                          <a:spcPct val="100000"/>
+                        </a:lnSpc>
+                        <a:spcBef>
+                          <a:spcPts val="0"/>
+                        </a:spcBef>
+                        <a:spcAft>
+                          <a:spcPts val="0"/>
+                        </a:spcAft>
+                        <a:buClrTx/>
+                        <a:buSzTx/>
+                        <a:buFontTx/>
+                        <a:buNone/>
+                        <a:tabLst/>
+                        <a:defRPr/>
+                      </a:pPr>
+                      <a:r>
+                        <a:rPr lang="en-US" sz="1400" u="none" strike="noStrike" kern="1200" baseline="0" dirty="0" smtClean="0"/>
+                        <a:t>CL_DEVICE_NATIVE_VECTOR_WIDTH_*</a:t>
+                      </a:r>
+                      <a:endParaRPr lang="en-US" sz="1400" b="0" i="0" u="none" strike="noStrike" kern="1200" baseline="0" dirty="0" smtClean="0">
+                        <a:solidFill>
+                          <a:schemeClr val="dk1"/>
+                        </a:solidFill>
+                        <a:latin typeface="+mn-lt"/>
+                        <a:ea typeface="+mn-ea"/>
+                        <a:cs typeface="+mn-cs"/>
+                      </a:endParaRPr>
+                    </a:p>
+                  </a:txBody>
+                  <a:tcPr/>
+                </a:tc>
+                <a:tc>
+                  <a:txBody>
+                    <a:bodyPr/>
+                    <a:lstStyle/>
+                    <a:p>
+                      <a:r>
+                        <a:rPr lang="en-US" sz="1400" dirty="0" smtClean="0"/>
+                        <a:t>512 bits</a:t>
+                      </a:r>
+                      <a:endParaRPr lang="en-US" sz="1400" b="0" dirty="0"/>
+                    </a:p>
+                  </a:txBody>
+                  <a:tcPr/>
+                </a:tc>
+              </a:tr>
+              <a:tr h="370840">
+                <a:tc>
+                  <a:txBody>
+                    <a:bodyPr/>
+                    <a:lstStyle/>
+                    <a:p>
+                      <a:pPr marL="0" marR="0" indent="0" algn="l" defTabSz="914400" rtl="0" eaLnBrk="1" fontAlgn="auto" latinLnBrk="0" hangingPunct="1">
+                        <a:lnSpc>
+                          <a:spcPct val="100000"/>
+                        </a:lnSpc>
+                        <a:spcBef>
+                          <a:spcPts val="0"/>
+                        </a:spcBef>
+                        <a:spcAft>
+                          <a:spcPts val="0"/>
+                        </a:spcAft>
+                        <a:buClrTx/>
+                        <a:buSzTx/>
+                        <a:buFontTx/>
+                        <a:buNone/>
+                        <a:tabLst/>
+                        <a:defRPr/>
+                      </a:pPr>
+                      <a:r>
+                        <a:rPr lang="en-US" sz="1400" u="none" strike="noStrike" kern="1200" baseline="0" dirty="0" smtClean="0"/>
+                        <a:t>CL_DEVICE_HOST_UNIFIED_MEMORY	</a:t>
+                      </a:r>
+                      <a:endParaRPr lang="en-US" sz="1400" b="0" i="0" u="none" strike="noStrike" kern="1200" baseline="0" dirty="0" smtClean="0">
+                        <a:solidFill>
+                          <a:schemeClr val="dk1"/>
+                        </a:solidFill>
+                        <a:latin typeface="+mn-lt"/>
+                        <a:ea typeface="+mn-ea"/>
+                        <a:cs typeface="+mn-cs"/>
+                      </a:endParaRPr>
+                    </a:p>
+                  </a:txBody>
+                  <a:tcPr/>
+                </a:tc>
+                <a:tc>
+                  <a:txBody>
+                    <a:bodyPr/>
+                    <a:lstStyle/>
+                    <a:p>
+                      <a:r>
+                        <a:rPr lang="en-US" sz="1400" u="none" strike="noStrike" kern="1200" baseline="0" dirty="0" smtClean="0"/>
+                        <a:t>CL_FALSE 	</a:t>
+                      </a:r>
+                      <a:endParaRPr lang="en-US" sz="1400" b="0" i="0" u="none" strike="noStrike" kern="1200" baseline="0" dirty="0" smtClean="0">
+                        <a:solidFill>
+                          <a:schemeClr val="dk1"/>
+                        </a:solidFill>
+                        <a:latin typeface="+mn-lt"/>
+                        <a:ea typeface="+mn-ea"/>
+                        <a:cs typeface="+mn-cs"/>
+                      </a:endParaRPr>
+                    </a:p>
+                  </a:txBody>
+                  <a:tcPr/>
+                </a:tc>
+              </a:tr>
+              <a:tr h="370840">
+                <a:tc>
+                  <a:txBody>
+                    <a:bodyPr/>
+                    <a:lstStyle/>
+                    <a:p>
+                      <a:pPr marL="0" marR="0" indent="0" algn="l" defTabSz="914400" rtl="0" eaLnBrk="1" fontAlgn="auto" latinLnBrk="0" hangingPunct="1">
+                        <a:lnSpc>
+                          <a:spcPct val="100000"/>
+                        </a:lnSpc>
+                        <a:spcBef>
+                          <a:spcPts val="0"/>
+                        </a:spcBef>
+                        <a:spcAft>
+                          <a:spcPts val="0"/>
+                        </a:spcAft>
+                        <a:buClrTx/>
+                        <a:buSzTx/>
+                        <a:buFontTx/>
+                        <a:buNone/>
+                        <a:tabLst/>
+                        <a:defRPr/>
+                      </a:pPr>
+                      <a:r>
+                        <a:rPr lang="en-US" sz="1400" u="none" strike="noStrike" kern="1200" baseline="0" dirty="0" smtClean="0"/>
+                        <a:t>CL_DEVICE_GLOBAL_MEM_SIZE 	</a:t>
+                      </a:r>
+                      <a:endParaRPr lang="en-US" sz="1400" b="0" i="0" u="none" strike="noStrike" kern="1200" baseline="0" dirty="0" smtClean="0">
+                        <a:solidFill>
+                          <a:schemeClr val="dk1"/>
+                        </a:solidFill>
+                        <a:latin typeface="+mn-lt"/>
+                        <a:ea typeface="+mn-ea"/>
+                        <a:cs typeface="+mn-cs"/>
+                      </a:endParaRPr>
+                    </a:p>
+                  </a:txBody>
+                  <a:tcPr/>
+                </a:tc>
+                <a:tc>
+                  <a:txBody>
+                    <a:bodyPr/>
+                    <a:lstStyle/>
+                    <a:p>
+                      <a:r>
+                        <a:rPr lang="en-US" sz="1400" dirty="0" smtClean="0"/>
+                        <a:t>¾ of device</a:t>
+                      </a:r>
+                      <a:r>
+                        <a:rPr lang="en-US" sz="1400" baseline="0" dirty="0" smtClean="0"/>
+                        <a:t> physical memory size</a:t>
+                      </a:r>
+                      <a:endParaRPr lang="en-US" sz="1400" b="0" dirty="0"/>
+                    </a:p>
+                  </a:txBody>
+                  <a:tcPr/>
+                </a:tc>
+              </a:tr>
+              <a:tr h="370840">
+                <a:tc>
+                  <a:txBody>
+                    <a:bodyPr/>
+                    <a:lstStyle/>
+                    <a:p>
+                      <a:pPr marL="0" marR="0" indent="0" algn="l" defTabSz="914400" rtl="0" eaLnBrk="1" fontAlgn="auto" latinLnBrk="0" hangingPunct="1">
+                        <a:lnSpc>
+                          <a:spcPct val="100000"/>
+                        </a:lnSpc>
+                        <a:spcBef>
+                          <a:spcPts val="0"/>
+                        </a:spcBef>
+                        <a:spcAft>
+                          <a:spcPts val="0"/>
+                        </a:spcAft>
+                        <a:buClrTx/>
+                        <a:buSzTx/>
+                        <a:buFontTx/>
+                        <a:buNone/>
+                        <a:tabLst/>
+                        <a:defRPr/>
+                      </a:pPr>
+                      <a:r>
+                        <a:rPr lang="en-US" sz="1400" u="none" strike="noStrike" kern="1200" baseline="0" dirty="0" smtClean="0"/>
+                        <a:t>CL_DEVICE_MAX_MEM_ALLOC_SIZE </a:t>
+                      </a:r>
+                      <a:endParaRPr lang="en-US" sz="1400" b="0" i="0" u="none" strike="noStrike" kern="1200" baseline="0" dirty="0" smtClean="0">
+                        <a:solidFill>
+                          <a:schemeClr val="dk1"/>
+                        </a:solidFill>
+                        <a:latin typeface="+mn-lt"/>
+                        <a:ea typeface="+mn-ea"/>
+                        <a:cs typeface="+mn-cs"/>
+                      </a:endParaRPr>
+                    </a:p>
+                  </a:txBody>
+                  <a:tcPr/>
+                </a:tc>
+                <a:tc>
+                  <a:txBody>
+                    <a:bodyPr/>
+                    <a:lstStyle/>
+                    <a:p>
+                      <a:r>
+                        <a:rPr lang="en-US" sz="1400" dirty="0" smtClean="0"/>
+                        <a:t>¼ of Global</a:t>
+                      </a:r>
+                      <a:endParaRPr lang="en-US" sz="1400" b="0" dirty="0"/>
+                    </a:p>
+                  </a:txBody>
+                  <a:tcPr/>
+                </a:tc>
+              </a:tr>
+              <a:tr h="370840">
+                <a:tc>
+                  <a:txBody>
+                    <a:bodyPr/>
+                    <a:lstStyle/>
+                    <a:p>
+                      <a:pPr marL="0" marR="0" indent="0" algn="l" defTabSz="914400" rtl="0" eaLnBrk="1" fontAlgn="auto" latinLnBrk="0" hangingPunct="1">
+                        <a:lnSpc>
+                          <a:spcPct val="100000"/>
+                        </a:lnSpc>
+                        <a:spcBef>
+                          <a:spcPts val="0"/>
+                        </a:spcBef>
+                        <a:spcAft>
+                          <a:spcPts val="0"/>
+                        </a:spcAft>
+                        <a:buClrTx/>
+                        <a:buSzTx/>
+                        <a:buFontTx/>
+                        <a:buNone/>
+                        <a:tabLst/>
+                        <a:defRPr/>
+                      </a:pPr>
+                      <a:r>
+                        <a:rPr lang="en-US" sz="1400" u="none" strike="noStrike" kern="1200" baseline="0" dirty="0" smtClean="0"/>
+                        <a:t>CL_DEVICE_MEM_BASE_ADDR_ALIGN</a:t>
+                      </a:r>
+                      <a:endParaRPr lang="en-US" sz="1400" b="0" i="0" u="none" strike="noStrike" kern="1200" baseline="0" dirty="0" smtClean="0">
+                        <a:solidFill>
+                          <a:schemeClr val="dk1"/>
+                        </a:solidFill>
+                        <a:latin typeface="+mn-lt"/>
+                        <a:ea typeface="+mn-ea"/>
+                        <a:cs typeface="+mn-cs"/>
+                      </a:endParaRPr>
+                    </a:p>
+                  </a:txBody>
+                  <a:tcPr/>
+                </a:tc>
+                <a:tc>
+                  <a:txBody>
+                    <a:bodyPr/>
+                    <a:lstStyle/>
+                    <a:p>
+                      <a:r>
+                        <a:rPr lang="en-US" sz="1400" dirty="0" smtClean="0"/>
+                        <a:t>512 bytes</a:t>
+                      </a:r>
+                      <a:r>
+                        <a:rPr lang="en-US" sz="1400" baseline="0" dirty="0" smtClean="0"/>
+                        <a:t> – maximum alignment of KNF/KNC vector instructions</a:t>
+                      </a:r>
+                      <a:endParaRPr lang="en-US" sz="1400" b="0" dirty="0"/>
+                    </a:p>
+                  </a:txBody>
+                  <a:tcPr/>
+                </a:tc>
+              </a:tr>
+              <a:tr h="370840">
+                <a:tc>
+                  <a:txBody>
+                    <a:bodyPr/>
+                    <a:lstStyle/>
+                    <a:p>
+                      <a:pPr marL="0" marR="0" indent="0" algn="l" defTabSz="914400" rtl="0" eaLnBrk="1" fontAlgn="auto" latinLnBrk="0" hangingPunct="1">
+                        <a:lnSpc>
+                          <a:spcPct val="100000"/>
+                        </a:lnSpc>
+                        <a:spcBef>
+                          <a:spcPts val="0"/>
+                        </a:spcBef>
+                        <a:spcAft>
+                          <a:spcPts val="0"/>
+                        </a:spcAft>
+                        <a:buClrTx/>
+                        <a:buSzTx/>
+                        <a:buFontTx/>
+                        <a:buNone/>
+                        <a:tabLst/>
+                        <a:defRPr/>
+                      </a:pPr>
+                      <a:r>
+                        <a:rPr lang="en-US" sz="1400" u="none" strike="noStrike" kern="1200" baseline="0" dirty="0" smtClean="0"/>
+                        <a:t>CL_DEVICE_MAX_SAMPLERS 	</a:t>
+                      </a:r>
+                      <a:endParaRPr lang="en-US" sz="1400" b="0" i="0" u="none" strike="noStrike" kern="1200" baseline="0" dirty="0" smtClean="0">
+                        <a:solidFill>
+                          <a:schemeClr val="dk1"/>
+                        </a:solidFill>
+                        <a:latin typeface="+mn-lt"/>
+                        <a:ea typeface="+mn-ea"/>
+                        <a:cs typeface="+mn-cs"/>
+                      </a:endParaRPr>
+                    </a:p>
+                  </a:txBody>
+                  <a:tcPr/>
+                </a:tc>
+                <a:tc>
+                  <a:txBody>
+                    <a:bodyPr/>
+                    <a:lstStyle/>
+                    <a:p>
+                      <a:r>
+                        <a:rPr lang="en-US" sz="1400" dirty="0" smtClean="0"/>
+                        <a:t>Number of HW TXS units (after TXS units support will be added)</a:t>
+                      </a:r>
+                      <a:endParaRPr lang="en-US" sz="1400" b="0" dirty="0"/>
+                    </a:p>
+                  </a:txBody>
+                  <a:tcPr/>
+                </a:tc>
+              </a:tr>
+              <a:tr h="370840">
+                <a:tc>
+                  <a:txBody>
+                    <a:bodyPr/>
+                    <a:lstStyle/>
+                    <a:p>
+                      <a:pPr marL="0" marR="0" indent="0" algn="l" defTabSz="914400" rtl="0" eaLnBrk="1" fontAlgn="auto" latinLnBrk="0" hangingPunct="1">
+                        <a:lnSpc>
+                          <a:spcPct val="100000"/>
+                        </a:lnSpc>
+                        <a:spcBef>
+                          <a:spcPts val="0"/>
+                        </a:spcBef>
+                        <a:spcAft>
+                          <a:spcPts val="0"/>
+                        </a:spcAft>
+                        <a:buClrTx/>
+                        <a:buSzTx/>
+                        <a:buFontTx/>
+                        <a:buNone/>
+                        <a:tabLst/>
+                        <a:defRPr/>
+                      </a:pPr>
+                      <a:r>
+                        <a:rPr lang="en-US" sz="1400" u="none" strike="noStrike" kern="1200" baseline="0" dirty="0" smtClean="0"/>
+                        <a:t>CL_DEVICE_SINGLE_FP_CONFIG  (KNC)</a:t>
+                      </a:r>
+                      <a:endParaRPr lang="en-US" sz="1400" b="0" i="0" u="none" strike="noStrike" kern="1200" baseline="0" dirty="0" smtClean="0">
+                        <a:solidFill>
+                          <a:schemeClr val="dk1"/>
+                        </a:solidFill>
+                        <a:latin typeface="+mn-lt"/>
+                        <a:ea typeface="+mn-ea"/>
+                        <a:cs typeface="+mn-cs"/>
+                      </a:endParaRPr>
+                    </a:p>
+                  </a:txBody>
+                  <a:tcPr/>
+                </a:tc>
+                <a:tc>
+                  <a:txBody>
+                    <a:bodyPr/>
+                    <a:lstStyle/>
+                    <a:p>
+                      <a:pPr marL="0" marR="0" indent="0" algn="l" defTabSz="914400" rtl="0" eaLnBrk="1" fontAlgn="auto" latinLnBrk="0" hangingPunct="1">
+                        <a:lnSpc>
+                          <a:spcPct val="100000"/>
+                        </a:lnSpc>
+                        <a:spcBef>
+                          <a:spcPts val="0"/>
+                        </a:spcBef>
+                        <a:spcAft>
+                          <a:spcPts val="0"/>
+                        </a:spcAft>
+                        <a:buClrTx/>
+                        <a:buSzTx/>
+                        <a:buFontTx/>
+                        <a:buNone/>
+                        <a:tabLst/>
+                        <a:defRPr/>
+                      </a:pPr>
+                      <a:r>
+                        <a:rPr lang="en-US" sz="1100" u="none" strike="noStrike" kern="1200" baseline="0" dirty="0" smtClean="0"/>
+                        <a:t>DENORM,  INF_NAN, ROUND_TO_NEAREST, ROUND_TO_ZERO, ROUND_TO_INF, FMA </a:t>
+                      </a:r>
+                      <a:endParaRPr lang="en-US" sz="1600" b="0" i="0" u="none" strike="noStrike" kern="1200" baseline="0" dirty="0" smtClean="0">
+                        <a:solidFill>
+                          <a:schemeClr val="dk1"/>
+                        </a:solidFill>
+                        <a:latin typeface="+mn-lt"/>
+                        <a:ea typeface="+mn-ea"/>
+                        <a:cs typeface="+mn-cs"/>
+                      </a:endParaRPr>
+                    </a:p>
+                  </a:txBody>
+                  <a:tcPr/>
+                </a:tc>
+              </a:tr>
+              <a:tr h="370840">
+                <a:tc>
+                  <a:txBody>
+                    <a:bodyPr/>
+                    <a:lstStyle/>
+                    <a:p>
+                      <a:pPr marL="0" marR="0" indent="0" algn="l" defTabSz="914400" rtl="0" eaLnBrk="1" fontAlgn="auto" latinLnBrk="0" hangingPunct="1">
+                        <a:lnSpc>
+                          <a:spcPct val="100000"/>
+                        </a:lnSpc>
+                        <a:spcBef>
+                          <a:spcPts val="0"/>
+                        </a:spcBef>
+                        <a:spcAft>
+                          <a:spcPts val="0"/>
+                        </a:spcAft>
+                        <a:buClrTx/>
+                        <a:buSzTx/>
+                        <a:buFontTx/>
+                        <a:buNone/>
+                        <a:tabLst/>
+                        <a:defRPr/>
+                      </a:pPr>
+                      <a:r>
+                        <a:rPr lang="en-US" sz="1400" u="none" strike="noStrike" kern="1200" baseline="0" dirty="0" smtClean="0"/>
+                        <a:t>CL_DEVICE_DOUBLE_FP_CONFIG  (KNC)</a:t>
+                      </a:r>
+                      <a:endParaRPr lang="en-US" sz="1400" b="0" i="0" u="none" strike="noStrike" kern="1200" baseline="0" dirty="0" smtClean="0">
+                        <a:solidFill>
+                          <a:schemeClr val="dk1"/>
+                        </a:solidFill>
+                        <a:latin typeface="+mn-lt"/>
+                        <a:ea typeface="+mn-ea"/>
+                        <a:cs typeface="+mn-cs"/>
+                      </a:endParaRPr>
+                    </a:p>
+                  </a:txBody>
+                  <a:tcPr/>
+                </a:tc>
+                <a:tc>
+                  <a:txBody>
+                    <a:bodyPr/>
+                    <a:lstStyle/>
+                    <a:p>
+                      <a:pPr marL="0" marR="0" indent="0" algn="l" defTabSz="914400" rtl="0" eaLnBrk="1" fontAlgn="auto" latinLnBrk="0" hangingPunct="1">
+                        <a:lnSpc>
+                          <a:spcPct val="100000"/>
+                        </a:lnSpc>
+                        <a:spcBef>
+                          <a:spcPts val="0"/>
+                        </a:spcBef>
+                        <a:spcAft>
+                          <a:spcPts val="0"/>
+                        </a:spcAft>
+                        <a:buClrTx/>
+                        <a:buSzTx/>
+                        <a:buFontTx/>
+                        <a:buNone/>
+                        <a:tabLst/>
+                        <a:defRPr/>
+                      </a:pPr>
+                      <a:r>
+                        <a:rPr lang="en-US" sz="1100" u="none" strike="noStrike" kern="1200" baseline="0" dirty="0" smtClean="0"/>
+                        <a:t>DENORM, INF_NAN, ROUND_TO_NEAREST, ROUND_TO_ZERO, ROUND_TO_INF, FMA</a:t>
+                      </a:r>
+                      <a:endParaRPr lang="en-US" sz="1600" b="0" i="0" u="none" strike="noStrike" kern="1200" baseline="0" dirty="0" smtClean="0">
+                        <a:solidFill>
+                          <a:schemeClr val="dk1"/>
+                        </a:solidFill>
+                        <a:latin typeface="+mn-lt"/>
+                        <a:ea typeface="+mn-ea"/>
+                        <a:cs typeface="+mn-cs"/>
+                      </a:endParaRPr>
+                    </a:p>
+                  </a:txBody>
+                  <a:tcPr/>
+                </a:tc>
+              </a:tr>
+              <a:tr h="370840">
+                <a:tc>
+                  <a:txBody>
+                    <a:bodyPr/>
+                    <a:lstStyle/>
+                    <a:p>
+                      <a:pPr marL="0" marR="0" indent="0" algn="l" defTabSz="914400" rtl="0" eaLnBrk="1" fontAlgn="auto" latinLnBrk="0" hangingPunct="1">
+                        <a:lnSpc>
+                          <a:spcPct val="100000"/>
+                        </a:lnSpc>
+                        <a:spcBef>
+                          <a:spcPts val="0"/>
+                        </a:spcBef>
+                        <a:spcAft>
+                          <a:spcPts val="0"/>
+                        </a:spcAft>
+                        <a:buClrTx/>
+                        <a:buSzTx/>
+                        <a:buFontTx/>
+                        <a:buNone/>
+                        <a:tabLst/>
+                        <a:defRPr/>
+                      </a:pPr>
+                      <a:r>
+                        <a:rPr lang="en-US" sz="1400" u="none" strike="noStrike" kern="1200" baseline="0" dirty="0" smtClean="0"/>
+                        <a:t>CL_DEVICE_EXTENSIONS</a:t>
+                      </a:r>
+                      <a:endParaRPr lang="en-US" sz="1400" b="0" i="0" u="none" strike="noStrike" kern="1200" baseline="0" dirty="0" smtClean="0">
+                        <a:solidFill>
+                          <a:schemeClr val="tx1"/>
+                        </a:solidFill>
+                        <a:latin typeface="+mn-lt"/>
+                        <a:ea typeface="+mn-ea"/>
+                        <a:cs typeface="+mn-cs"/>
+                      </a:endParaRPr>
+                    </a:p>
+                  </a:txBody>
+                  <a:tcPr/>
+                </a:tc>
+                <a:tc>
+                  <a:txBody>
+                    <a:bodyPr/>
+                    <a:lstStyle/>
+                    <a:p>
+                      <a:r>
+                        <a:rPr lang="en-US" sz="1400" u="none" strike="noStrike" kern="1200" baseline="0" dirty="0" smtClean="0"/>
+                        <a:t>FP64, global/local/32/64/base/extended  atomics, byte store, 3D image writes, device fission, GL sharing</a:t>
+                      </a:r>
+                      <a:endParaRPr lang="en-US" sz="1400" b="0" i="0" u="none" strike="noStrike" kern="1200" baseline="0" dirty="0" smtClean="0">
+                        <a:solidFill>
+                          <a:schemeClr val="tx1"/>
+                        </a:solidFill>
+                        <a:latin typeface="+mn-lt"/>
+                        <a:ea typeface="+mn-ea"/>
+                        <a:cs typeface="+mn-cs"/>
+                      </a:endParaRPr>
+                    </a:p>
+                  </a:txBody>
+                  <a:tcPr/>
+                </a:tc>
+              </a:tr>
+              <a:tr h="370840">
+                <a:tc>
+                  <a:txBody>
+                    <a:bodyPr/>
+                    <a:lstStyle/>
+                    <a:p>
+                      <a:pPr marL="0" marR="0" indent="0" algn="l" defTabSz="914400" rtl="0" eaLnBrk="1" fontAlgn="auto" latinLnBrk="0" hangingPunct="1">
+                        <a:lnSpc>
+                          <a:spcPct val="100000"/>
+                        </a:lnSpc>
+                        <a:spcBef>
+                          <a:spcPts val="0"/>
+                        </a:spcBef>
+                        <a:spcAft>
+                          <a:spcPts val="0"/>
+                        </a:spcAft>
+                        <a:buClrTx/>
+                        <a:buSzTx/>
+                        <a:buFontTx/>
+                        <a:buNone/>
+                        <a:tabLst/>
+                        <a:defRPr/>
+                      </a:pPr>
+                      <a:r>
+                        <a:rPr lang="en-US" sz="1400" u="none" strike="noStrike" kern="1200" baseline="0" dirty="0" smtClean="0"/>
+                        <a:t>CL_DEVICE_PARTITION_PROPERTIES </a:t>
+                      </a:r>
+                      <a:endParaRPr lang="en-US" sz="1400" b="0" i="0" u="none" strike="noStrike" kern="1200" baseline="0" dirty="0" smtClean="0">
+                        <a:solidFill>
+                          <a:schemeClr val="tx1"/>
+                        </a:solidFill>
+                        <a:latin typeface="+mn-lt"/>
+                        <a:ea typeface="+mn-ea"/>
+                        <a:cs typeface="+mn-cs"/>
+                      </a:endParaRPr>
+                    </a:p>
+                  </a:txBody>
+                  <a:tcPr/>
+                </a:tc>
+                <a:tc>
+                  <a:txBody>
+                    <a:bodyPr/>
+                    <a:lstStyle/>
+                    <a:p>
+                      <a:r>
+                        <a:rPr lang="en-US" sz="1400" u="none" strike="noStrike" kern="1200" baseline="0" dirty="0" smtClean="0"/>
+                        <a:t>Equally, By Counts, By Affinity Domain</a:t>
+                      </a:r>
+                      <a:endParaRPr lang="en-US" sz="1400" b="0" i="0" u="none" strike="noStrike" kern="1200" baseline="0" dirty="0" smtClean="0">
+                        <a:solidFill>
+                          <a:schemeClr val="tx1"/>
+                        </a:solidFill>
+                        <a:latin typeface="+mn-lt"/>
+                        <a:ea typeface="+mn-ea"/>
+                        <a:cs typeface="+mn-cs"/>
+                      </a:endParaRPr>
+                    </a:p>
+                  </a:txBody>
+                  <a:tcPr/>
+                </a:tc>
+              </a:tr>
+              <a:tr h="370840">
+                <a:tc>
+                  <a:txBody>
+                    <a:bodyPr/>
+                    <a:lstStyle/>
+                    <a:p>
+                      <a:pPr marL="0" marR="0" indent="0" algn="l" defTabSz="914400" rtl="0" eaLnBrk="1" fontAlgn="auto" latinLnBrk="0" hangingPunct="1">
+                        <a:lnSpc>
+                          <a:spcPct val="100000"/>
+                        </a:lnSpc>
+                        <a:spcBef>
+                          <a:spcPts val="0"/>
+                        </a:spcBef>
+                        <a:spcAft>
+                          <a:spcPts val="0"/>
+                        </a:spcAft>
+                        <a:buClrTx/>
+                        <a:buSzTx/>
+                        <a:buFontTx/>
+                        <a:buNone/>
+                        <a:tabLst/>
+                        <a:defRPr/>
+                      </a:pPr>
+                      <a:r>
+                        <a:rPr lang="en-US" sz="1400" u="none" strike="noStrike" kern="1200" baseline="0" dirty="0" smtClean="0"/>
+                        <a:t>CL_DEVICE_PARTITION_AFFINITY_DOMAIN</a:t>
+                      </a:r>
+                      <a:endParaRPr lang="en-US" sz="1400" b="0" i="0" u="none" strike="noStrike" kern="1200" baseline="0" dirty="0" smtClean="0">
+                        <a:solidFill>
+                          <a:schemeClr val="tx1"/>
+                        </a:solidFill>
+                        <a:latin typeface="+mn-lt"/>
+                        <a:ea typeface="+mn-ea"/>
+                        <a:cs typeface="+mn-cs"/>
+                      </a:endParaRPr>
+                    </a:p>
+                  </a:txBody>
+                  <a:tcPr/>
+                </a:tc>
+                <a:tc>
+                  <a:txBody>
+                    <a:bodyPr/>
+                    <a:lstStyle/>
+                    <a:p>
+                      <a:r>
+                        <a:rPr lang="en-US" sz="1400" u="none" strike="noStrike" kern="1200" baseline="0" dirty="0" smtClean="0"/>
+                        <a:t>L1 cache only (assume both L1 and L2 split KNF/KNC device into CPU Cores)</a:t>
+                      </a:r>
+                      <a:endParaRPr lang="en-US" sz="1400" b="0" i="0" u="none" strike="noStrike" kern="1200" baseline="0" dirty="0" smtClean="0">
+                        <a:solidFill>
+                          <a:schemeClr val="tx1"/>
+                        </a:solidFill>
+                        <a:latin typeface="+mn-lt"/>
+                        <a:ea typeface="+mn-ea"/>
+                        <a:cs typeface="+mn-cs"/>
+                      </a:endParaRPr>
+                    </a:p>
+                  </a:txBody>
+                  <a:tcPr/>
+                </a:tc>
+              </a:tr>
+            </a:tbl>
+          </a:graphicData>
+        </a:graphic>
+      </p:graphicFrame>
+      <p:sp>
+        <p:nvSpPr>
+          <p:cNvPr id="3" name="Title 2"/>
+          <p:cNvSpPr>
+            <a:spLocks noGrp="1"/>
+          </p:cNvSpPr>
+          <p:nvPr>
+            <p:ph type="title"/>
+          </p:nvPr>
+        </p:nvSpPr>
+        <p:spPr/>
+        <p:txBody>
+          <a:bodyPr/>
+          <a:lstStyle/>
+          <a:p>
+            <a:r>
+              <a:rPr lang="en-US" dirty="0" smtClean="0"/>
+              <a:t>Device Info Highlights</a:t>
+            </a:r>
+            <a:endParaRPr lang="en-US" dirty="0"/>
+          </a:p>
+        </p:txBody>
+      </p:sp>
+      <p:sp>
+        <p:nvSpPr>
+          <p:cNvPr id="4" name="Slide Number Placeholder 3"/>
+          <p:cNvSpPr>
+            <a:spLocks noGrp="1"/>
+          </p:cNvSpPr>
+          <p:nvPr>
+            <p:ph type="sldNum" sz="quarter" idx="10"/>
+          </p:nvPr>
+        </p:nvSpPr>
+        <p:spPr/>
+        <p:txBody>
+          <a:bodyPr/>
+          <a:lstStyle/>
+          <a:p>
+            <a:fld id="{644F31DB-F08C-476F-B161-7D382042A277}" type="slidenum">
+              <a:rPr lang="en-US" smtClean="0"/>
+              <a:pPr/>
+              <a:t>15</a:t>
+            </a:fld>
+            <a:endParaRPr lang="en-US"/>
+          </a:p>
+        </p:txBody>
+      </p:sp>
+    </p:spTree>
+    <p:extLst>
+      <p:ext uri="{BB962C8B-B14F-4D97-AF65-F5344CB8AC3E}">
+        <p14:creationId xmlns:p14="http://schemas.microsoft.com/office/powerpoint/2010/main" val="821722739"/>
+      </p:ext>
+    </p:extLst>
+  </p:cSld>
+  <p:clrMapOvr>
+    <a:masterClrMapping/>
+  </p:clrMapOvr>
+  <p:transition>
+    <p:fade/>
+  </p:transition>
+  <p:timing>
+    <p:tnLst>
+      <p:par>
+        <p:cTn id="1" dur="indefinite" restart="never" nodeType="tmRoot"/>
+      </p:par>
+    </p:tnLst>
+  </p:timing>
+</p:sld>
+</file>
+
+<file path=ppt/slides/slide16.xml><?xml version="1.0" encoding="utf-8"?>
+<p:sld xmlns:a="http://schemas.openxmlformats.org/drawingml/2006/main" xmlns:r="http://schemas.openxmlformats.org/officeDocument/2006/relationships" xmlns:p="http://schemas.openxmlformats.org/presentationml/2006/main">
+  <p:cSld>
+    <p:spTree>
+      <p:nvGrpSpPr>
+        <p:cNvPr id="1" name=""/>
+        <p:cNvGrpSpPr/>
+        <p:nvPr/>
+      </p:nvGrpSpPr>
+      <p:grpSpPr>
+        <a:xfrm>
+          <a:off x="0" y="0"/>
+          <a:ext cx="0" cy="0"/>
+          <a:chOff x="0" y="0"/>
+          <a:chExt cx="0" cy="0"/>
+        </a:xfrm>
+      </p:grpSpPr>
+      <p:graphicFrame>
+        <p:nvGraphicFramePr>
+          <p:cNvPr id="5" name="Content Placeholder 4"/>
+          <p:cNvGraphicFramePr>
+            <a:graphicFrameLocks noGrp="1"/>
+          </p:cNvGraphicFramePr>
+          <p:nvPr>
+            <p:ph idx="1"/>
+            <p:extLst>
+              <p:ext uri="{D42A27DB-BD31-4B8C-83A1-F6EECF244321}">
+                <p14:modId xmlns:p14="http://schemas.microsoft.com/office/powerpoint/2010/main" val="3187404401"/>
               </p:ext>
             </p:extLst>
           </p:nvPr>
@@ -21809,7 +23455,7 @@
             <a:fld id="{644F31DB-F08C-476F-B161-7D382042A277}" type="slidenum">
               <a:rPr lang="en-US" smtClean="0"/>
               <a:pPr/>
-              <a:t>15</a:t>
+              <a:t>16</a:t>
             </a:fld>
             <a:endParaRPr lang="en-US"/>
           </a:p>
@@ -21828,6 +23474,13 @@
   <p:transition>
     <p:fade/>
   </p:transition>
+  <p:timing>
+    <p:tnLst>
+      <p:par>
+        <p:cTn id="1" dur="indefinite" restart="never" nodeType="tmRoot"/>
+      </p:par>
+    </p:tnLst>
+  </p:timing>
 </p:sld>
 </file>
 
@@ -28230,7 +29883,7 @@
             <a:graphicData uri="http://schemas.openxmlformats.org/presentationml/2006/ole">
               <mc:AlternateContent xmlns:mc="http://schemas.openxmlformats.org/markup-compatibility/2006">
                 <mc:Choice xmlns:v="urn:schemas-microsoft-com:vml" Requires="v">
-                  <p:oleObj spid="_x0000_s3180" name="Visio" r:id="rId3" imgW="2998483" imgH="2655307" progId="Visio.Drawing.11">
+                  <p:oleObj spid="_x0000_s3212" name="Visio" r:id="rId3" imgW="2998483" imgH="2655307" progId="Visio.Drawing.11">
                     <p:embed/>
                   </p:oleObj>
                 </mc:Choice>
@@ -30915,7 +32568,7 @@
             <a:graphicData uri="http://schemas.openxmlformats.org/presentationml/2006/ole">
               <mc:AlternateContent xmlns:mc="http://schemas.openxmlformats.org/markup-compatibility/2006">
                 <mc:Choice xmlns:v="urn:schemas-microsoft-com:vml" Requires="v">
-                  <p:oleObj spid="_x0000_s2159" name="Visio" r:id="rId3" imgW="13542503" imgH="6263447" progId="Visio.Drawing.11">
+                  <p:oleObj spid="_x0000_s2191" name="Visio" r:id="rId3" imgW="13542503" imgH="6263447" progId="Visio.Drawing.11">
                     <p:embed/>
                   </p:oleObj>
                 </mc:Choice>

</xml_diff>

<commit_message>
Fixes after OpenCL group review
</commit_message>
<xml_diff>
--- a/opencl-intel/devices/mic_device/doc/OpenCL for MIC acrh overview for Runtime.pptx
+++ b/opencl-intel/devices/mic_device/doc/OpenCL for MIC acrh overview for Runtime.pptx
@@ -5575,8 +5575,8 @@
     <dgm:cxn modelId="{2A48B30C-03F6-4155-9867-8FDB030F45B5}" type="presOf" srcId="{EDE9A32A-1EE8-49EE-9616-6231124FD3A3}" destId="{67CB0F3C-91F0-4252-B2FD-94DD2A88713F}" srcOrd="0" destOrd="1" presId="urn:microsoft.com/office/officeart/2005/8/layout/vList2"/>
     <dgm:cxn modelId="{448B5DFE-9B65-4D7F-9B9F-6117679C94CA}" srcId="{645C2147-D9DF-426D-9B9E-9A3E88FF3842}" destId="{16AB3D69-F3F4-49D7-A479-1381D0944BFF}" srcOrd="1" destOrd="0" parTransId="{B36237B1-1AF9-4E14-AB43-B4D8ACBF65FA}" sibTransId="{E44A54B4-060E-47E3-975D-95083743D9B3}"/>
     <dgm:cxn modelId="{591AAD2E-6BD0-47C7-826A-C50832576999}" srcId="{3B357217-0457-4C25-9F85-86D455F8C347}" destId="{8CADFED6-C70E-467B-9FA9-19F180D0304F}" srcOrd="0" destOrd="0" parTransId="{C291A340-5D69-4D16-9A00-B24344F612B1}" sibTransId="{BE0341A3-94A0-45A7-98A7-44CB269DAC3D}"/>
+    <dgm:cxn modelId="{2323AD08-9DE1-43A0-8103-30C242ADAC29}" type="presOf" srcId="{FF7C26BD-6F3D-490A-A545-505E6F77B79D}" destId="{5D0E9AB6-30DB-4451-BD34-57F4B8A1A198}" srcOrd="0" destOrd="0" presId="urn:microsoft.com/office/officeart/2005/8/layout/vList2"/>
     <dgm:cxn modelId="{9034A79B-6AA3-4830-BB01-11A5C52956C4}" srcId="{5FE6577F-2F0E-42A1-A8B3-642CEF5553B1}" destId="{B33E0094-6108-409F-9B05-31DF59FC87DE}" srcOrd="2" destOrd="0" parTransId="{EEA66E92-C882-4700-A457-379A110343AE}" sibTransId="{A50A1DDB-8226-4FD4-B38B-BB5910663D6F}"/>
-    <dgm:cxn modelId="{2323AD08-9DE1-43A0-8103-30C242ADAC29}" type="presOf" srcId="{FF7C26BD-6F3D-490A-A545-505E6F77B79D}" destId="{5D0E9AB6-30DB-4451-BD34-57F4B8A1A198}" srcOrd="0" destOrd="0" presId="urn:microsoft.com/office/officeart/2005/8/layout/vList2"/>
     <dgm:cxn modelId="{1801BD03-5993-4691-AEB2-670114D50408}" srcId="{645C2147-D9DF-426D-9B9E-9A3E88FF3842}" destId="{FF7C26BD-6F3D-490A-A545-505E6F77B79D}" srcOrd="0" destOrd="0" parTransId="{C7DDC468-2299-40F2-94F9-42ACFB819AE3}" sibTransId="{3D3A5D58-F110-4EAC-BD8B-9554B58A7838}"/>
     <dgm:cxn modelId="{680C57E1-1C70-44BD-8DBC-7739FF535F3C}" srcId="{16AB3D69-F3F4-49D7-A479-1381D0944BFF}" destId="{3B357217-0457-4C25-9F85-86D455F8C347}" srcOrd="1" destOrd="0" parTransId="{B04E24B6-D35E-4A81-8E70-9F6DF74BC9B1}" sibTransId="{D0D0E4D7-9784-47A3-9A9E-A3D72E4994F1}"/>
     <dgm:cxn modelId="{8B82F0A8-118D-4BAC-8F91-7D93C35B7153}" type="presOf" srcId="{673A70AA-5817-42A2-81C6-3AF6A86AD91C}" destId="{67CB0F3C-91F0-4252-B2FD-94DD2A88713F}" srcOrd="0" destOrd="0" presId="urn:microsoft.com/office/officeart/2005/8/layout/vList2"/>
@@ -6187,61 +6187,7 @@
 <dgm:dataModel xmlns:dgm="http://schemas.openxmlformats.org/drawingml/2006/diagram" xmlns:a="http://schemas.openxmlformats.org/drawingml/2006/main">
   <dgm:ptLst>
     <dgm:pt modelId="{5521DE05-0C36-47FF-A5DE-BF8AA21A5DD9}" type="doc">
-      <dgm:prSet loTypeId="urn:microsoft.com/office/officeart/2005/8/layout/process4" loCatId="process" qsTypeId="urn:microsoft.com/office/officeart/2005/8/quickstyle/simple1" qsCatId="simple" csTypeId="urn:microsoft.com/office/officeart/2005/8/colors/colorful2" csCatId="colorful" phldr="1"/>
-      <dgm:spPr/>
-      <dgm:t>
-        <a:bodyPr/>
-        <a:lstStyle/>
-        <a:p>
-          <a:endParaRPr lang="en-US"/>
-        </a:p>
-      </dgm:t>
-    </dgm:pt>
-    <dgm:pt modelId="{007DD2AD-9081-4079-823C-9AFD687AEFCF}">
-      <dgm:prSet custT="1"/>
-      <dgm:spPr/>
-      <dgm:t>
-        <a:bodyPr/>
-        <a:lstStyle/>
-        <a:p>
-          <a:pPr rtl="0"/>
-          <a:r>
-            <a:rPr lang="en-US" sz="1800" dirty="0" smtClean="0"/>
-            <a:t>MIC DA allocates new COI Buffer with limited size for each </a:t>
-          </a:r>
-          <a:r>
-            <a:rPr lang="en-US" sz="1800" dirty="0" err="1" smtClean="0"/>
-            <a:t>NDRange</a:t>
-          </a:r>
-          <a:r>
-            <a:rPr lang="en-US" sz="1800" dirty="0" smtClean="0"/>
-            <a:t> command that uses </a:t>
-          </a:r>
-          <a:r>
-            <a:rPr lang="en-US" sz="1800" dirty="0" err="1" smtClean="0"/>
-            <a:t>printf</a:t>
-          </a:r>
-          <a:r>
-            <a:rPr lang="en-US" sz="1800" dirty="0" smtClean="0"/>
-            <a:t>()</a:t>
-          </a:r>
-          <a:endParaRPr lang="en-US" sz="1800" dirty="0"/>
-        </a:p>
-      </dgm:t>
-    </dgm:pt>
-    <dgm:pt modelId="{E71A3DBD-D155-4670-8D6E-401E78D4376A}" type="parTrans" cxnId="{8D910CE5-7343-436F-A26F-D5EACB192C27}">
-      <dgm:prSet/>
-      <dgm:spPr/>
-      <dgm:t>
-        <a:bodyPr/>
-        <a:lstStyle/>
-        <a:p>
-          <a:endParaRPr lang="en-US"/>
-        </a:p>
-      </dgm:t>
-    </dgm:pt>
-    <dgm:pt modelId="{356CE534-FBA0-4FBB-9C31-F2B235A17175}" type="sibTrans" cxnId="{8D910CE5-7343-436F-A26F-D5EACB192C27}">
-      <dgm:prSet/>
+      <dgm:prSet loTypeId="urn:microsoft.com/office/officeart/2005/8/layout/process1" loCatId="process" qsTypeId="urn:microsoft.com/office/officeart/2005/8/quickstyle/simple1" qsCatId="simple" csTypeId="urn:microsoft.com/office/officeart/2005/8/colors/colorful2" csCatId="colorful" phldr="1"/>
       <dgm:spPr/>
       <dgm:t>
         <a:bodyPr/>
@@ -6261,7 +6207,11 @@
           <a:pPr rtl="0"/>
           <a:r>
             <a:rPr lang="en-US" sz="1800" dirty="0" smtClean="0"/>
-            <a:t>As kernel calls </a:t>
+            <a:t>kernel </a:t>
+          </a:r>
+          <a:r>
+            <a:rPr lang="en-US" sz="1800" dirty="0" smtClean="0"/>
+            <a:t>calls </a:t>
           </a:r>
           <a:r>
             <a:rPr lang="en-US" sz="1800" dirty="0" err="1" smtClean="0"/>
@@ -6269,7 +6219,11 @@
           </a:r>
           <a:r>
             <a:rPr lang="en-US" sz="1800" dirty="0" smtClean="0"/>
-            <a:t>() function Backend invokes MIC DA device side callback with relevant string and string size.</a:t>
+            <a:t>() </a:t>
+          </a:r>
+          <a:r>
+            <a:rPr lang="en-US" sz="1800" dirty="0" smtClean="0"/>
+            <a:t>function</a:t>
           </a:r>
           <a:endParaRPr lang="en-US" sz="1800" dirty="0"/>
         </a:p>
@@ -6307,18 +6261,27 @@
           <a:pPr rtl="0"/>
           <a:r>
             <a:rPr lang="en-US" sz="1800" dirty="0" smtClean="0"/>
-            <a:t>MIC DA device side callback copies the string to the specific buffer atomically</a:t>
+            <a:t>MIC DA device side callback </a:t>
           </a:r>
           <a:r>
             <a:rPr lang="en-US" sz="1800" dirty="0" smtClean="0"/>
-            <a:t>.</a:t>
+            <a:t>issues standard C </a:t>
           </a:r>
-        </a:p>
-        <a:p>
-          <a:pPr rtl="0"/>
           <a:r>
-            <a:rPr lang="en-US" sz="1800" b="1" i="1" dirty="0" smtClean="0"/>
-            <a:t>** Avoid Work Items output intermixing to ease debugging **</a:t>
+            <a:rPr lang="en-US" sz="1800" dirty="0" err="1" smtClean="0"/>
+            <a:t>printf</a:t>
+          </a:r>
+          <a:r>
+            <a:rPr lang="en-US" sz="1800" dirty="0" smtClean="0"/>
+            <a:t>() function to </a:t>
+          </a:r>
+          <a:r>
+            <a:rPr lang="en-US" sz="1800" dirty="0" err="1" smtClean="0"/>
+            <a:t>stdout</a:t>
+          </a:r>
+          <a:r>
+            <a:rPr lang="en-US" sz="1800" dirty="0" smtClean="0"/>
+            <a:t> stream.</a:t>
           </a:r>
           <a:endParaRPr lang="en-US" sz="1800" b="1" i="1" dirty="0"/>
         </a:p>
@@ -6355,16 +6318,24 @@
         <a:p>
           <a:pPr rtl="0"/>
           <a:r>
-            <a:rPr lang="en-US" sz="1800" smtClean="0"/>
-            <a:t>After NDRange command finished and appropriate COI Event in Notification Port is signaled  MIC DA host side will copy printf() buffer to the host and </a:t>
+            <a:rPr lang="en-US" sz="1800" dirty="0" smtClean="0"/>
+            <a:t>COI redirects device </a:t>
           </a:r>
           <a:r>
-            <a:rPr lang="en-US" sz="1800" i="1" smtClean="0"/>
-            <a:t>invoke appropriate Runtime service to consume the data</a:t>
+            <a:rPr lang="en-US" sz="1800" dirty="0" err="1" smtClean="0"/>
+            <a:t>stdout</a:t>
           </a:r>
           <a:r>
-            <a:rPr lang="en-US" sz="1800" smtClean="0"/>
-            <a:t>.</a:t>
+            <a:rPr lang="en-US" sz="1800" dirty="0" smtClean="0"/>
+            <a:t> to host application </a:t>
+          </a:r>
+          <a:r>
+            <a:rPr lang="en-US" sz="1800" dirty="0" err="1" smtClean="0"/>
+            <a:t>stdout</a:t>
+          </a:r>
+          <a:r>
+            <a:rPr lang="en-US" sz="1800" dirty="0" smtClean="0"/>
+            <a:t> stream. </a:t>
           </a:r>
           <a:endParaRPr lang="en-US" sz="1800" dirty="0"/>
         </a:p>
@@ -6392,11 +6363,52 @@
         </a:p>
       </dgm:t>
     </dgm:pt>
-    <dgm:pt modelId="{767864E3-0525-490A-A4C2-859F8709053C}" type="pres">
+    <dgm:pt modelId="{1D93C01E-1F08-4BB6-992A-51BB439396A2}">
+      <dgm:prSet custT="1"/>
+      <dgm:spPr/>
+      <dgm:t>
+        <a:bodyPr/>
+        <a:lstStyle/>
+        <a:p>
+          <a:pPr rtl="0"/>
+          <a:r>
+            <a:rPr lang="en-US" sz="1800" smtClean="0"/>
+            <a:t>Backend </a:t>
+          </a:r>
+          <a:r>
+            <a:rPr lang="en-US" sz="1800" dirty="0" smtClean="0"/>
+            <a:t>invokes MIC DA device side callback with relevant string and string size.</a:t>
+          </a:r>
+          <a:endParaRPr lang="en-US" sz="1800" dirty="0"/>
+        </a:p>
+      </dgm:t>
+    </dgm:pt>
+    <dgm:pt modelId="{4079233D-0206-4BC7-AE2A-0A9869712887}" type="parTrans" cxnId="{EB13B355-2C38-4872-94AD-4866FC0AAA91}">
+      <dgm:prSet/>
+      <dgm:spPr/>
+      <dgm:t>
+        <a:bodyPr/>
+        <a:lstStyle/>
+        <a:p>
+          <a:endParaRPr lang="en-US"/>
+        </a:p>
+      </dgm:t>
+    </dgm:pt>
+    <dgm:pt modelId="{AE772780-E92B-4C0D-BC6F-D75ACF002CE8}" type="sibTrans" cxnId="{EB13B355-2C38-4872-94AD-4866FC0AAA91}">
+      <dgm:prSet/>
+      <dgm:spPr/>
+      <dgm:t>
+        <a:bodyPr/>
+        <a:lstStyle/>
+        <a:p>
+          <a:endParaRPr lang="en-US"/>
+        </a:p>
+      </dgm:t>
+    </dgm:pt>
+    <dgm:pt modelId="{AB8E10D2-01E1-4BC2-80C4-7652179ACF4B}" type="pres">
       <dgm:prSet presAssocID="{5521DE05-0C36-47FF-A5DE-BF8AA21A5DD9}" presName="Name0" presStyleCnt="0">
         <dgm:presLayoutVars>
           <dgm:dir/>
-          <dgm:animLvl val="lvl"/>
           <dgm:resizeHandles val="exact"/>
         </dgm:presLayoutVars>
       </dgm:prSet>
@@ -6409,12 +6421,12 @@
         </a:p>
       </dgm:t>
     </dgm:pt>
-    <dgm:pt modelId="{5F841C1F-5D5B-4DCC-9077-30CDA3281A88}" type="pres">
-      <dgm:prSet presAssocID="{F4A0563D-9807-4109-8A3E-FA01E1FB9C8B}" presName="boxAndChildren" presStyleCnt="0"/>
-      <dgm:spPr/>
-    </dgm:pt>
-    <dgm:pt modelId="{7E0B1343-3CEF-47AD-8A82-DC7F83EE0732}" type="pres">
-      <dgm:prSet presAssocID="{F4A0563D-9807-4109-8A3E-FA01E1FB9C8B}" presName="parentTextBox" presStyleLbl="node1" presStyleIdx="0" presStyleCnt="4"/>
+    <dgm:pt modelId="{7AEE35B3-3929-4A16-90D9-993B1AFC31B5}" type="pres">
+      <dgm:prSet presAssocID="{2A71917F-8DBB-4408-9287-046EAD796B0A}" presName="node" presStyleLbl="node1" presStyleIdx="0" presStyleCnt="4">
+        <dgm:presLayoutVars>
+          <dgm:bulletEnabled val="1"/>
+        </dgm:presLayoutVars>
+      </dgm:prSet>
       <dgm:spPr/>
       <dgm:t>
         <a:bodyPr/>
@@ -6424,16 +6436,8 @@
         </a:p>
       </dgm:t>
     </dgm:pt>
-    <dgm:pt modelId="{2716E032-0493-4372-80E2-B30634F2AC9F}" type="pres">
-      <dgm:prSet presAssocID="{7E7FD89E-04AC-4977-8665-BF20A6B56F15}" presName="sp" presStyleCnt="0"/>
-      <dgm:spPr/>
-    </dgm:pt>
-    <dgm:pt modelId="{3ECB1C9A-9DA5-480E-9FC2-2D10DF11F2E6}" type="pres">
-      <dgm:prSet presAssocID="{86046F2D-EF8B-456E-A166-1D72235685ED}" presName="arrowAndChildren" presStyleCnt="0"/>
-      <dgm:spPr/>
-    </dgm:pt>
-    <dgm:pt modelId="{6F4C924D-0F7F-4AB7-B69D-4D109D0B9DCD}" type="pres">
-      <dgm:prSet presAssocID="{86046F2D-EF8B-456E-A166-1D72235685ED}" presName="parentTextArrow" presStyleLbl="node1" presStyleIdx="1" presStyleCnt="4"/>
+    <dgm:pt modelId="{07B03748-3870-49A9-9F52-53D5696CACE6}" type="pres">
+      <dgm:prSet presAssocID="{B43900F3-6E20-4A6D-8494-6711179A0D8F}" presName="sibTrans" presStyleLbl="sibTrans2D1" presStyleIdx="0" presStyleCnt="3"/>
       <dgm:spPr/>
       <dgm:t>
         <a:bodyPr/>
@@ -6443,16 +6447,8 @@
         </a:p>
       </dgm:t>
     </dgm:pt>
-    <dgm:pt modelId="{F32752CD-0C8E-4D6B-B180-F49B9919C27B}" type="pres">
-      <dgm:prSet presAssocID="{B43900F3-6E20-4A6D-8494-6711179A0D8F}" presName="sp" presStyleCnt="0"/>
-      <dgm:spPr/>
-    </dgm:pt>
-    <dgm:pt modelId="{1BCA258B-18FF-4BDC-92C5-4A784969248D}" type="pres">
-      <dgm:prSet presAssocID="{2A71917F-8DBB-4408-9287-046EAD796B0A}" presName="arrowAndChildren" presStyleCnt="0"/>
-      <dgm:spPr/>
-    </dgm:pt>
-    <dgm:pt modelId="{6B3A3F9E-A769-4656-A859-BA507AC1248C}" type="pres">
-      <dgm:prSet presAssocID="{2A71917F-8DBB-4408-9287-046EAD796B0A}" presName="parentTextArrow" presStyleLbl="node1" presStyleIdx="2" presStyleCnt="4"/>
+    <dgm:pt modelId="{79993F78-00AD-4180-9568-6157D89BA782}" type="pres">
+      <dgm:prSet presAssocID="{B43900F3-6E20-4A6D-8494-6711179A0D8F}" presName="connectorText" presStyleLbl="sibTrans2D1" presStyleIdx="0" presStyleCnt="3"/>
       <dgm:spPr/>
       <dgm:t>
         <a:bodyPr/>
@@ -6462,16 +6458,72 @@
         </a:p>
       </dgm:t>
     </dgm:pt>
-    <dgm:pt modelId="{6BA3442D-E068-401C-B3F7-19ECA27EA26E}" type="pres">
-      <dgm:prSet presAssocID="{356CE534-FBA0-4FBB-9C31-F2B235A17175}" presName="sp" presStyleCnt="0"/>
+    <dgm:pt modelId="{864363C6-652B-4DD8-86B7-8885EEEB880C}" type="pres">
+      <dgm:prSet presAssocID="{1D93C01E-1F08-4BB6-992A-51BB439396A2}" presName="node" presStyleLbl="node1" presStyleIdx="1" presStyleCnt="4">
+        <dgm:presLayoutVars>
+          <dgm:bulletEnabled val="1"/>
+        </dgm:presLayoutVars>
+      </dgm:prSet>
+      <dgm:spPr/>
+      <dgm:t>
+        <a:bodyPr/>
+        <a:lstStyle/>
+        <a:p>
+          <a:endParaRPr lang="en-US"/>
+        </a:p>
+      </dgm:t>
+    </dgm:pt>
+    <dgm:pt modelId="{0639B046-C3D5-49E6-89AC-FB80CD7DD456}" type="pres">
+      <dgm:prSet presAssocID="{AE772780-E92B-4C0D-BC6F-D75ACF002CE8}" presName="sibTrans" presStyleLbl="sibTrans2D1" presStyleIdx="1" presStyleCnt="3"/>
       <dgm:spPr/>
     </dgm:pt>
-    <dgm:pt modelId="{EC151991-E825-43AF-B271-8299086DEB87}" type="pres">
-      <dgm:prSet presAssocID="{007DD2AD-9081-4079-823C-9AFD687AEFCF}" presName="arrowAndChildren" presStyleCnt="0"/>
+    <dgm:pt modelId="{AE78BBDF-0B63-4EF0-A1FD-78D72F4316BB}" type="pres">
+      <dgm:prSet presAssocID="{AE772780-E92B-4C0D-BC6F-D75ACF002CE8}" presName="connectorText" presStyleLbl="sibTrans2D1" presStyleIdx="1" presStyleCnt="3"/>
       <dgm:spPr/>
     </dgm:pt>
-    <dgm:pt modelId="{FCDB95F6-53E8-4C47-8F8F-9E847D02123A}" type="pres">
-      <dgm:prSet presAssocID="{007DD2AD-9081-4079-823C-9AFD687AEFCF}" presName="parentTextArrow" presStyleLbl="node1" presStyleIdx="3" presStyleCnt="4"/>
+    <dgm:pt modelId="{D91390A3-1164-4A1A-A538-C0648F590879}" type="pres">
+      <dgm:prSet presAssocID="{86046F2D-EF8B-456E-A166-1D72235685ED}" presName="node" presStyleLbl="node1" presStyleIdx="2" presStyleCnt="4">
+        <dgm:presLayoutVars>
+          <dgm:bulletEnabled val="1"/>
+        </dgm:presLayoutVars>
+      </dgm:prSet>
+      <dgm:spPr/>
+      <dgm:t>
+        <a:bodyPr/>
+        <a:lstStyle/>
+        <a:p>
+          <a:endParaRPr lang="en-US"/>
+        </a:p>
+      </dgm:t>
+    </dgm:pt>
+    <dgm:pt modelId="{EAA81B7C-6FDA-4B97-86D0-F97DC70520B0}" type="pres">
+      <dgm:prSet presAssocID="{7E7FD89E-04AC-4977-8665-BF20A6B56F15}" presName="sibTrans" presStyleLbl="sibTrans2D1" presStyleIdx="2" presStyleCnt="3"/>
+      <dgm:spPr/>
+      <dgm:t>
+        <a:bodyPr/>
+        <a:lstStyle/>
+        <a:p>
+          <a:endParaRPr lang="en-US"/>
+        </a:p>
+      </dgm:t>
+    </dgm:pt>
+    <dgm:pt modelId="{B8C6EBEF-1E36-4AFE-BAA9-76FCB351D93B}" type="pres">
+      <dgm:prSet presAssocID="{7E7FD89E-04AC-4977-8665-BF20A6B56F15}" presName="connectorText" presStyleLbl="sibTrans2D1" presStyleIdx="2" presStyleCnt="3"/>
+      <dgm:spPr/>
+      <dgm:t>
+        <a:bodyPr/>
+        <a:lstStyle/>
+        <a:p>
+          <a:endParaRPr lang="en-US"/>
+        </a:p>
+      </dgm:t>
+    </dgm:pt>
+    <dgm:pt modelId="{C835CE53-7F6E-4DEB-A901-F739EA1BB092}" type="pres">
+      <dgm:prSet presAssocID="{F4A0563D-9807-4109-8A3E-FA01E1FB9C8B}" presName="node" presStyleLbl="node1" presStyleIdx="3" presStyleCnt="4">
+        <dgm:presLayoutVars>
+          <dgm:bulletEnabled val="1"/>
+        </dgm:presLayoutVars>
+      </dgm:prSet>
       <dgm:spPr/>
       <dgm:t>
         <a:bodyPr/>
@@ -6483,26 +6535,31 @@
     </dgm:pt>
   </dgm:ptLst>
   <dgm:cxnLst>
-    <dgm:cxn modelId="{8D910CE5-7343-436F-A26F-D5EACB192C27}" srcId="{5521DE05-0C36-47FF-A5DE-BF8AA21A5DD9}" destId="{007DD2AD-9081-4079-823C-9AFD687AEFCF}" srcOrd="0" destOrd="0" parTransId="{E71A3DBD-D155-4670-8D6E-401E78D4376A}" sibTransId="{356CE534-FBA0-4FBB-9C31-F2B235A17175}"/>
-    <dgm:cxn modelId="{2A135F17-4608-4AA1-B7E5-D93A787B2EA8}" type="presOf" srcId="{007DD2AD-9081-4079-823C-9AFD687AEFCF}" destId="{FCDB95F6-53E8-4C47-8F8F-9E847D02123A}" srcOrd="0" destOrd="0" presId="urn:microsoft.com/office/officeart/2005/8/layout/process4"/>
-    <dgm:cxn modelId="{4289EEA2-76F7-4CAA-B09D-D44BE2A8432D}" type="presOf" srcId="{5521DE05-0C36-47FF-A5DE-BF8AA21A5DD9}" destId="{767864E3-0525-490A-A4C2-859F8709053C}" srcOrd="0" destOrd="0" presId="urn:microsoft.com/office/officeart/2005/8/layout/process4"/>
-    <dgm:cxn modelId="{75ED5D39-E676-4C99-9C95-F240A3808901}" type="presOf" srcId="{86046F2D-EF8B-456E-A166-1D72235685ED}" destId="{6F4C924D-0F7F-4AB7-B69D-4D109D0B9DCD}" srcOrd="0" destOrd="0" presId="urn:microsoft.com/office/officeart/2005/8/layout/process4"/>
+    <dgm:cxn modelId="{770554D3-4867-478C-AC51-9DF06ACCAD28}" type="presOf" srcId="{B43900F3-6E20-4A6D-8494-6711179A0D8F}" destId="{07B03748-3870-49A9-9F52-53D5696CACE6}" srcOrd="0" destOrd="0" presId="urn:microsoft.com/office/officeart/2005/8/layout/process1"/>
+    <dgm:cxn modelId="{B4FAB1D4-A87A-405E-87F9-03BFF15DD820}" type="presOf" srcId="{AE772780-E92B-4C0D-BC6F-D75ACF002CE8}" destId="{0639B046-C3D5-49E6-89AC-FB80CD7DD456}" srcOrd="0" destOrd="0" presId="urn:microsoft.com/office/officeart/2005/8/layout/process1"/>
+    <dgm:cxn modelId="{458FF8D3-1228-49D1-8384-73A7AA0E384A}" srcId="{5521DE05-0C36-47FF-A5DE-BF8AA21A5DD9}" destId="{2A71917F-8DBB-4408-9287-046EAD796B0A}" srcOrd="0" destOrd="0" parTransId="{F4141090-3A6C-4ABE-AA90-EDC62AFA9358}" sibTransId="{B43900F3-6E20-4A6D-8494-6711179A0D8F}"/>
+    <dgm:cxn modelId="{EB13B355-2C38-4872-94AD-4866FC0AAA91}" srcId="{5521DE05-0C36-47FF-A5DE-BF8AA21A5DD9}" destId="{1D93C01E-1F08-4BB6-992A-51BB439396A2}" srcOrd="1" destOrd="0" parTransId="{4079233D-0206-4BC7-AE2A-0A9869712887}" sibTransId="{AE772780-E92B-4C0D-BC6F-D75ACF002CE8}"/>
+    <dgm:cxn modelId="{79989943-44C7-4A36-A2BB-7F6E853FB86B}" type="presOf" srcId="{7E7FD89E-04AC-4977-8665-BF20A6B56F15}" destId="{EAA81B7C-6FDA-4B97-86D0-F97DC70520B0}" srcOrd="0" destOrd="0" presId="urn:microsoft.com/office/officeart/2005/8/layout/process1"/>
+    <dgm:cxn modelId="{09380BD1-31AA-46D9-BCD0-8777F900C669}" type="presOf" srcId="{F4A0563D-9807-4109-8A3E-FA01E1FB9C8B}" destId="{C835CE53-7F6E-4DEB-A901-F739EA1BB092}" srcOrd="0" destOrd="0" presId="urn:microsoft.com/office/officeart/2005/8/layout/process1"/>
+    <dgm:cxn modelId="{D6B1A6F2-66ED-4CBA-8EE1-EA009BBB93C1}" type="presOf" srcId="{5521DE05-0C36-47FF-A5DE-BF8AA21A5DD9}" destId="{AB8E10D2-01E1-4BC2-80C4-7652179ACF4B}" srcOrd="0" destOrd="0" presId="urn:microsoft.com/office/officeart/2005/8/layout/process1"/>
     <dgm:cxn modelId="{0C8CE640-D2F0-4E8B-8DCF-DC60CCF514E5}" srcId="{5521DE05-0C36-47FF-A5DE-BF8AA21A5DD9}" destId="{86046F2D-EF8B-456E-A166-1D72235685ED}" srcOrd="2" destOrd="0" parTransId="{EC3FDECB-30E6-41C5-84ED-F44BD99C2851}" sibTransId="{7E7FD89E-04AC-4977-8665-BF20A6B56F15}"/>
-    <dgm:cxn modelId="{6347940E-7A81-4B8D-BCA2-08FC5876CCC5}" type="presOf" srcId="{2A71917F-8DBB-4408-9287-046EAD796B0A}" destId="{6B3A3F9E-A769-4656-A859-BA507AC1248C}" srcOrd="0" destOrd="0" presId="urn:microsoft.com/office/officeart/2005/8/layout/process4"/>
-    <dgm:cxn modelId="{1FE7E8A8-7B2B-4FA5-BE82-CA3DC33B0523}" type="presOf" srcId="{F4A0563D-9807-4109-8A3E-FA01E1FB9C8B}" destId="{7E0B1343-3CEF-47AD-8A82-DC7F83EE0732}" srcOrd="0" destOrd="0" presId="urn:microsoft.com/office/officeart/2005/8/layout/process4"/>
-    <dgm:cxn modelId="{458FF8D3-1228-49D1-8384-73A7AA0E384A}" srcId="{5521DE05-0C36-47FF-A5DE-BF8AA21A5DD9}" destId="{2A71917F-8DBB-4408-9287-046EAD796B0A}" srcOrd="1" destOrd="0" parTransId="{F4141090-3A6C-4ABE-AA90-EDC62AFA9358}" sibTransId="{B43900F3-6E20-4A6D-8494-6711179A0D8F}"/>
+    <dgm:cxn modelId="{EBE03324-754B-40E0-BD1B-D73B8306104E}" type="presOf" srcId="{7E7FD89E-04AC-4977-8665-BF20A6B56F15}" destId="{B8C6EBEF-1E36-4AFE-BAA9-76FCB351D93B}" srcOrd="1" destOrd="0" presId="urn:microsoft.com/office/officeart/2005/8/layout/process1"/>
+    <dgm:cxn modelId="{6D753309-0CB3-48A6-8987-8F584AF0A243}" type="presOf" srcId="{AE772780-E92B-4C0D-BC6F-D75ACF002CE8}" destId="{AE78BBDF-0B63-4EF0-A1FD-78D72F4316BB}" srcOrd="1" destOrd="0" presId="urn:microsoft.com/office/officeart/2005/8/layout/process1"/>
     <dgm:cxn modelId="{C3FC15A0-AD32-4D6B-B0ED-6F3CBCB3C215}" srcId="{5521DE05-0C36-47FF-A5DE-BF8AA21A5DD9}" destId="{F4A0563D-9807-4109-8A3E-FA01E1FB9C8B}" srcOrd="3" destOrd="0" parTransId="{3504CB28-85B0-4B0F-A7C8-5679F6E24D0F}" sibTransId="{93CBB696-5459-48CB-8A0D-BB7F30B537B6}"/>
-    <dgm:cxn modelId="{C0C1DBC8-A256-48F4-9061-AF6C13490BF4}" type="presParOf" srcId="{767864E3-0525-490A-A4C2-859F8709053C}" destId="{5F841C1F-5D5B-4DCC-9077-30CDA3281A88}" srcOrd="0" destOrd="0" presId="urn:microsoft.com/office/officeart/2005/8/layout/process4"/>
-    <dgm:cxn modelId="{0FD46B05-03B6-4558-A00B-C2F7E8206310}" type="presParOf" srcId="{5F841C1F-5D5B-4DCC-9077-30CDA3281A88}" destId="{7E0B1343-3CEF-47AD-8A82-DC7F83EE0732}" srcOrd="0" destOrd="0" presId="urn:microsoft.com/office/officeart/2005/8/layout/process4"/>
-    <dgm:cxn modelId="{D8BD499C-597B-4C5A-9F85-6C0EDA1417D3}" type="presParOf" srcId="{767864E3-0525-490A-A4C2-859F8709053C}" destId="{2716E032-0493-4372-80E2-B30634F2AC9F}" srcOrd="1" destOrd="0" presId="urn:microsoft.com/office/officeart/2005/8/layout/process4"/>
-    <dgm:cxn modelId="{2A7F675C-5ACC-456D-B723-01BAAE9139D5}" type="presParOf" srcId="{767864E3-0525-490A-A4C2-859F8709053C}" destId="{3ECB1C9A-9DA5-480E-9FC2-2D10DF11F2E6}" srcOrd="2" destOrd="0" presId="urn:microsoft.com/office/officeart/2005/8/layout/process4"/>
-    <dgm:cxn modelId="{A8C82FAD-DA2C-4CAE-8E6B-8C7A7E95CDFA}" type="presParOf" srcId="{3ECB1C9A-9DA5-480E-9FC2-2D10DF11F2E6}" destId="{6F4C924D-0F7F-4AB7-B69D-4D109D0B9DCD}" srcOrd="0" destOrd="0" presId="urn:microsoft.com/office/officeart/2005/8/layout/process4"/>
-    <dgm:cxn modelId="{6ED4AFF6-EB7D-4F05-A42C-18468FDD2BA4}" type="presParOf" srcId="{767864E3-0525-490A-A4C2-859F8709053C}" destId="{F32752CD-0C8E-4D6B-B180-F49B9919C27B}" srcOrd="3" destOrd="0" presId="urn:microsoft.com/office/officeart/2005/8/layout/process4"/>
-    <dgm:cxn modelId="{2514200B-780D-4A0C-8CCA-F81C11476038}" type="presParOf" srcId="{767864E3-0525-490A-A4C2-859F8709053C}" destId="{1BCA258B-18FF-4BDC-92C5-4A784969248D}" srcOrd="4" destOrd="0" presId="urn:microsoft.com/office/officeart/2005/8/layout/process4"/>
-    <dgm:cxn modelId="{C273C0D8-6723-44FD-886D-6A010EB39FE7}" type="presParOf" srcId="{1BCA258B-18FF-4BDC-92C5-4A784969248D}" destId="{6B3A3F9E-A769-4656-A859-BA507AC1248C}" srcOrd="0" destOrd="0" presId="urn:microsoft.com/office/officeart/2005/8/layout/process4"/>
-    <dgm:cxn modelId="{B198AF14-B841-4447-9D3E-93E71D86B8B9}" type="presParOf" srcId="{767864E3-0525-490A-A4C2-859F8709053C}" destId="{6BA3442D-E068-401C-B3F7-19ECA27EA26E}" srcOrd="5" destOrd="0" presId="urn:microsoft.com/office/officeart/2005/8/layout/process4"/>
-    <dgm:cxn modelId="{5AA0540E-8F99-4FA9-BB9A-67ED97B5452F}" type="presParOf" srcId="{767864E3-0525-490A-A4C2-859F8709053C}" destId="{EC151991-E825-43AF-B271-8299086DEB87}" srcOrd="6" destOrd="0" presId="urn:microsoft.com/office/officeart/2005/8/layout/process4"/>
-    <dgm:cxn modelId="{97457512-EEB7-46BF-91D7-5EEB001CAF1F}" type="presParOf" srcId="{EC151991-E825-43AF-B271-8299086DEB87}" destId="{FCDB95F6-53E8-4C47-8F8F-9E847D02123A}" srcOrd="0" destOrd="0" presId="urn:microsoft.com/office/officeart/2005/8/layout/process4"/>
+    <dgm:cxn modelId="{F6FD1FD2-B2A2-4856-B236-6BDB3CBAD549}" type="presOf" srcId="{2A71917F-8DBB-4408-9287-046EAD796B0A}" destId="{7AEE35B3-3929-4A16-90D9-993B1AFC31B5}" srcOrd="0" destOrd="0" presId="urn:microsoft.com/office/officeart/2005/8/layout/process1"/>
+    <dgm:cxn modelId="{DB968BB6-3CF0-4A92-88CE-ACDF94256678}" type="presOf" srcId="{1D93C01E-1F08-4BB6-992A-51BB439396A2}" destId="{864363C6-652B-4DD8-86B7-8885EEEB880C}" srcOrd="0" destOrd="0" presId="urn:microsoft.com/office/officeart/2005/8/layout/process1"/>
+    <dgm:cxn modelId="{3A2E8FB3-A269-4412-861C-051A5B9A07DA}" type="presOf" srcId="{B43900F3-6E20-4A6D-8494-6711179A0D8F}" destId="{79993F78-00AD-4180-9568-6157D89BA782}" srcOrd="1" destOrd="0" presId="urn:microsoft.com/office/officeart/2005/8/layout/process1"/>
+    <dgm:cxn modelId="{A4F28A18-2073-46D6-A7EE-FF70D997374E}" type="presOf" srcId="{86046F2D-EF8B-456E-A166-1D72235685ED}" destId="{D91390A3-1164-4A1A-A538-C0648F590879}" srcOrd="0" destOrd="0" presId="urn:microsoft.com/office/officeart/2005/8/layout/process1"/>
+    <dgm:cxn modelId="{A09AD850-A350-4106-9BAA-FCACA584E79E}" type="presParOf" srcId="{AB8E10D2-01E1-4BC2-80C4-7652179ACF4B}" destId="{7AEE35B3-3929-4A16-90D9-993B1AFC31B5}" srcOrd="0" destOrd="0" presId="urn:microsoft.com/office/officeart/2005/8/layout/process1"/>
+    <dgm:cxn modelId="{4F4A249B-4555-4996-A908-07516443705A}" type="presParOf" srcId="{AB8E10D2-01E1-4BC2-80C4-7652179ACF4B}" destId="{07B03748-3870-49A9-9F52-53D5696CACE6}" srcOrd="1" destOrd="0" presId="urn:microsoft.com/office/officeart/2005/8/layout/process1"/>
+    <dgm:cxn modelId="{98321CE1-B249-4A92-88A8-BAECF0AE9D4F}" type="presParOf" srcId="{07B03748-3870-49A9-9F52-53D5696CACE6}" destId="{79993F78-00AD-4180-9568-6157D89BA782}" srcOrd="0" destOrd="0" presId="urn:microsoft.com/office/officeart/2005/8/layout/process1"/>
+    <dgm:cxn modelId="{206FC9DA-8880-41B2-90FB-ABF04A8E30C5}" type="presParOf" srcId="{AB8E10D2-01E1-4BC2-80C4-7652179ACF4B}" destId="{864363C6-652B-4DD8-86B7-8885EEEB880C}" srcOrd="2" destOrd="0" presId="urn:microsoft.com/office/officeart/2005/8/layout/process1"/>
+    <dgm:cxn modelId="{91150900-EA7E-494C-9980-F66986C5A169}" type="presParOf" srcId="{AB8E10D2-01E1-4BC2-80C4-7652179ACF4B}" destId="{0639B046-C3D5-49E6-89AC-FB80CD7DD456}" srcOrd="3" destOrd="0" presId="urn:microsoft.com/office/officeart/2005/8/layout/process1"/>
+    <dgm:cxn modelId="{5D4964B6-5E6A-4621-BF37-DC8F526A48BF}" type="presParOf" srcId="{0639B046-C3D5-49E6-89AC-FB80CD7DD456}" destId="{AE78BBDF-0B63-4EF0-A1FD-78D72F4316BB}" srcOrd="0" destOrd="0" presId="urn:microsoft.com/office/officeart/2005/8/layout/process1"/>
+    <dgm:cxn modelId="{634AFC61-1866-40B4-82A0-54ED72C72C09}" type="presParOf" srcId="{AB8E10D2-01E1-4BC2-80C4-7652179ACF4B}" destId="{D91390A3-1164-4A1A-A538-C0648F590879}" srcOrd="4" destOrd="0" presId="urn:microsoft.com/office/officeart/2005/8/layout/process1"/>
+    <dgm:cxn modelId="{E31706A3-06CC-4669-ADFF-FDAF08478C69}" type="presParOf" srcId="{AB8E10D2-01E1-4BC2-80C4-7652179ACF4B}" destId="{EAA81B7C-6FDA-4B97-86D0-F97DC70520B0}" srcOrd="5" destOrd="0" presId="urn:microsoft.com/office/officeart/2005/8/layout/process1"/>
+    <dgm:cxn modelId="{AD3CE395-23AA-4C70-97EA-AF7215B4DC0E}" type="presParOf" srcId="{EAA81B7C-6FDA-4B97-86D0-F97DC70520B0}" destId="{B8C6EBEF-1E36-4AFE-BAA9-76FCB351D93B}" srcOrd="0" destOrd="0" presId="urn:microsoft.com/office/officeart/2005/8/layout/process1"/>
+    <dgm:cxn modelId="{BFF7E768-24E6-4CAA-B141-34C50F5BA338}" type="presParOf" srcId="{AB8E10D2-01E1-4BC2-80C4-7652179ACF4B}" destId="{C835CE53-7F6E-4DEB-A901-F739EA1BB092}" srcOrd="6" destOrd="0" presId="urn:microsoft.com/office/officeart/2005/8/layout/process1"/>
   </dgm:cxnLst>
   <dgm:bg/>
   <dgm:whole/>
@@ -6652,23 +6709,7 @@
           <a:pPr rtl="0"/>
           <a:r>
             <a:rPr lang="en-US" dirty="0" smtClean="0"/>
-            <a:t>Consume </a:t>
-          </a:r>
-          <a:r>
-            <a:rPr lang="en-US" dirty="0" err="1" smtClean="0"/>
-            <a:t>printf</a:t>
-          </a:r>
-          <a:r>
-            <a:rPr lang="en-US" dirty="0" smtClean="0"/>
-            <a:t>() buffer after </a:t>
-          </a:r>
-          <a:r>
-            <a:rPr lang="en-US" dirty="0" err="1" smtClean="0"/>
-            <a:t>NDRange</a:t>
-          </a:r>
-          <a:r>
-            <a:rPr lang="en-US" dirty="0" smtClean="0"/>
-            <a:t> completion</a:t>
+            <a:t>Modify Device Querying and Creation APIs of Device Agents to support multiple top level device instances of the same type</a:t>
           </a:r>
           <a:endParaRPr lang="en-US" dirty="0"/>
         </a:p>
@@ -6686,44 +6727,6 @@
       </dgm:t>
     </dgm:pt>
     <dgm:pt modelId="{A185D66A-7162-46EC-897B-87B62D19939B}" type="sibTrans" cxnId="{15EDBB0F-8D3D-4EC8-A294-E28A1258284E}">
-      <dgm:prSet/>
-      <dgm:spPr/>
-      <dgm:t>
-        <a:bodyPr/>
-        <a:lstStyle/>
-        <a:p>
-          <a:endParaRPr lang="en-US"/>
-        </a:p>
-      </dgm:t>
-    </dgm:pt>
-    <dgm:pt modelId="{1397783F-A20E-4235-A183-0F41B5A760A9}">
-      <dgm:prSet/>
-      <dgm:spPr/>
-      <dgm:t>
-        <a:bodyPr/>
-        <a:lstStyle/>
-        <a:p>
-          <a:pPr rtl="0"/>
-          <a:r>
-            <a:rPr lang="en-US" smtClean="0"/>
-            <a:t>Modify Device Querying and Creation APIs of Device Agents to support multiple top level device instances of the same type</a:t>
-          </a:r>
-          <a:endParaRPr lang="en-US" dirty="0"/>
-        </a:p>
-      </dgm:t>
-    </dgm:pt>
-    <dgm:pt modelId="{48E52DA6-416F-4E0D-9EFC-ABE192265EA5}" type="parTrans" cxnId="{22870A76-AE88-45DC-88C8-FD8E83391038}">
-      <dgm:prSet/>
-      <dgm:spPr/>
-      <dgm:t>
-        <a:bodyPr/>
-        <a:lstStyle/>
-        <a:p>
-          <a:endParaRPr lang="en-US"/>
-        </a:p>
-      </dgm:t>
-    </dgm:pt>
-    <dgm:pt modelId="{B75FA972-2FA7-4377-AE80-9572FD33A539}" type="sibTrans" cxnId="{22870A76-AE88-45DC-88C8-FD8E83391038}">
       <dgm:prSet/>
       <dgm:spPr/>
       <dgm:t>
@@ -6933,10 +6936,10 @@
         <a:p>
           <a:pPr rtl="0"/>
           <a:r>
-            <a:rPr lang="en-US" smtClean="0"/>
+            <a:rPr lang="en-US" dirty="0" smtClean="0"/>
             <a:t>Sub-buffers</a:t>
           </a:r>
-          <a:endParaRPr lang="en-US"/>
+          <a:endParaRPr lang="en-US" dirty="0"/>
         </a:p>
       </dgm:t>
     </dgm:pt>
@@ -7009,8 +7012,12 @@
         <a:p>
           <a:pPr rtl="0"/>
           <a:r>
-            <a:rPr lang="en-US" smtClean="0"/>
-            <a:t>Process crash notification</a:t>
+            <a:rPr lang="en-US" dirty="0" smtClean="0"/>
+            <a:t>Device process </a:t>
+          </a:r>
+          <a:r>
+            <a:rPr lang="en-US" dirty="0" smtClean="0"/>
+            <a:t>crash notification</a:t>
           </a:r>
           <a:endParaRPr lang="en-US" dirty="0"/>
         </a:p>
@@ -7307,39 +7314,37 @@
     </dgm:pt>
   </dgm:ptLst>
   <dgm:cxnLst>
+    <dgm:cxn modelId="{B7DC7B38-1D0C-4603-9A07-4BAF8922692C}" type="presOf" srcId="{4809A052-339C-4B54-B992-67A13C97ADAA}" destId="{CC7BCB6C-8BCA-495D-8CF6-D84666EF5E5F}" srcOrd="0" destOrd="1" presId="urn:microsoft.com/office/officeart/2005/8/layout/list1"/>
+    <dgm:cxn modelId="{1627157D-A4DF-4A75-82ED-2BCAFAF037CA}" type="presOf" srcId="{DD8C1B21-E105-4303-887A-6CB1E6E4DA97}" destId="{3C62609F-F3FD-4911-AA82-C116C88BB4F0}" srcOrd="0" destOrd="0" presId="urn:microsoft.com/office/officeart/2005/8/layout/list1"/>
+    <dgm:cxn modelId="{F9119C24-1BB2-44A5-9AE0-096AE02AC6B6}" type="presOf" srcId="{8480DCCD-41B1-4FEE-814C-0E656A275AF9}" destId="{4FB21003-4F00-4B83-ACB9-5DE3C9405725}" srcOrd="1" destOrd="0" presId="urn:microsoft.com/office/officeart/2005/8/layout/list1"/>
+    <dgm:cxn modelId="{4BE45462-0DEC-4F1C-9F3A-13F320DBD0FF}" srcId="{B3DC2587-E04D-4C5C-A58F-384A6C572ACF}" destId="{DCF00EED-65CC-4C7E-96D9-B816C13F9EFE}" srcOrd="0" destOrd="0" parTransId="{EE9344AE-E1C3-4C29-9CE4-D15F8E84686E}" sibTransId="{DB521E0F-A8CA-444C-A42C-3D0C5D6F961C}"/>
+    <dgm:cxn modelId="{49C9A4C3-F801-4B6F-85AE-E79F7EB06D7D}" srcId="{DD8C1B21-E105-4303-887A-6CB1E6E4DA97}" destId="{8480DCCD-41B1-4FEE-814C-0E656A275AF9}" srcOrd="2" destOrd="0" parTransId="{2948BB94-4223-4F8B-91EF-A67DF73C71F0}" sibTransId="{A72B276E-155B-4C51-99A8-88AC6AC51523}"/>
+    <dgm:cxn modelId="{42CF3D73-BDEF-4F6A-ADCE-8C1E30560002}" type="presOf" srcId="{249AE276-A24E-42C9-A4C9-E1D2CA9B3F6B}" destId="{CC7BCB6C-8BCA-495D-8CF6-D84666EF5E5F}" srcOrd="0" destOrd="2" presId="urn:microsoft.com/office/officeart/2005/8/layout/list1"/>
+    <dgm:cxn modelId="{F5930BE5-62C5-4646-924D-B5F9F4049EF1}" type="presOf" srcId="{875A89C7-B05B-4366-8D40-1185823E2C6E}" destId="{81383EA1-0C17-4163-B12F-244F1882C351}" srcOrd="0" destOrd="0" presId="urn:microsoft.com/office/officeart/2005/8/layout/list1"/>
+    <dgm:cxn modelId="{870DC54F-CA08-49D2-B0B2-26C1E543DD29}" srcId="{875A89C7-B05B-4366-8D40-1185823E2C6E}" destId="{381BE165-E217-4469-967D-449BAF1F7DC2}" srcOrd="0" destOrd="0" parTransId="{C1F212F0-DDFE-46DA-92C5-B13F3B821D77}" sibTransId="{10006573-E3B7-49BB-9CEB-185B034D967B}"/>
+    <dgm:cxn modelId="{84881D50-A9F4-45CF-B677-E307948FCB8F}" type="presOf" srcId="{381BE165-E217-4469-967D-449BAF1F7DC2}" destId="{A7510B0D-8B2A-4A86-807F-2A085A9968A5}" srcOrd="0" destOrd="0" presId="urn:microsoft.com/office/officeart/2005/8/layout/list1"/>
+    <dgm:cxn modelId="{9DE7BCFA-4B72-4028-BA7C-C42AA4694649}" srcId="{8480DCCD-41B1-4FEE-814C-0E656A275AF9}" destId="{5EA98692-4DD2-4F1A-909E-252F4E37A285}" srcOrd="1" destOrd="0" parTransId="{9CDABB4E-A8AE-4F6A-9188-E0631CE30B34}" sibTransId="{0882DC31-B73D-4877-9292-B07A59CEDE38}"/>
+    <dgm:cxn modelId="{621AC734-CB76-444E-9592-9E5788A9AD92}" type="presOf" srcId="{6AE72809-82D1-4054-A302-A4B509E9BE7A}" destId="{46877989-D016-4D36-BCED-CD47F213F7CE}" srcOrd="0" destOrd="0" presId="urn:microsoft.com/office/officeart/2005/8/layout/list1"/>
+    <dgm:cxn modelId="{D5FBEC3F-7977-4DCC-B14E-B8C8CB555C9F}" type="presOf" srcId="{B3DC2587-E04D-4C5C-A58F-384A6C572ACF}" destId="{F9FDB6E3-7604-4CFB-99E9-16977FD41B76}" srcOrd="1" destOrd="0" presId="urn:microsoft.com/office/officeart/2005/8/layout/list1"/>
+    <dgm:cxn modelId="{BE3AA0D0-7B74-4624-83C5-79A723A6E10A}" type="presOf" srcId="{52289717-3175-42C8-8737-9F6FBD19C023}" destId="{48B4068F-93DE-4F21-A39D-216EC12D90FA}" srcOrd="0" destOrd="0" presId="urn:microsoft.com/office/officeart/2005/8/layout/list1"/>
+    <dgm:cxn modelId="{102742C8-C00F-40D6-9C8A-B0B290F444C6}" srcId="{6AE72809-82D1-4054-A302-A4B509E9BE7A}" destId="{DB6FE0FF-CD4F-4631-BF72-C498006D7653}" srcOrd="1" destOrd="0" parTransId="{91D8CDED-B3ED-4E6D-9DC0-AF4B7125F173}" sibTransId="{FC0CF06E-6548-4E9C-9078-482335FAE958}"/>
+    <dgm:cxn modelId="{8C761ED4-F506-40FF-A62F-EF5BA50B6C76}" type="presOf" srcId="{B3DC2587-E04D-4C5C-A58F-384A6C572ACF}" destId="{5DEEECA0-F703-4185-BE20-02DAF9EFE1D1}" srcOrd="0" destOrd="0" presId="urn:microsoft.com/office/officeart/2005/8/layout/list1"/>
+    <dgm:cxn modelId="{8C4B960C-99B8-4601-8AC4-F88E3953A281}" type="presOf" srcId="{DFEDEE1D-69F6-4D76-8A43-6A808AD3E1C4}" destId="{CC7BCB6C-8BCA-495D-8CF6-D84666EF5E5F}" srcOrd="0" destOrd="3" presId="urn:microsoft.com/office/officeart/2005/8/layout/list1"/>
+    <dgm:cxn modelId="{7D232A26-26FE-40E6-B9A6-608CBAEAA451}" srcId="{DD8C1B21-E105-4303-887A-6CB1E6E4DA97}" destId="{6AE72809-82D1-4054-A302-A4B509E9BE7A}" srcOrd="1" destOrd="0" parTransId="{1FD80B2D-D71E-42AE-9903-35E256B15AA4}" sibTransId="{D0EB0430-64B4-4777-BA2A-87BF4A75F0CB}"/>
+    <dgm:cxn modelId="{A6C46689-EEC5-4B2E-9222-321978930691}" type="presOf" srcId="{D443A12C-8F2E-4816-851F-F7E8881004F2}" destId="{F2A0EB99-4789-4781-B84A-B91842BA5259}" srcOrd="0" destOrd="0" presId="urn:microsoft.com/office/officeart/2005/8/layout/list1"/>
+    <dgm:cxn modelId="{15EDBB0F-8D3D-4EC8-A294-E28A1258284E}" srcId="{6AE72809-82D1-4054-A302-A4B509E9BE7A}" destId="{D443A12C-8F2E-4816-851F-F7E8881004F2}" srcOrd="0" destOrd="0" parTransId="{79BA18C6-22C6-4234-B05F-44CD8516B15C}" sibTransId="{A185D66A-7162-46EC-897B-87B62D19939B}"/>
+    <dgm:cxn modelId="{7AD890BC-5599-4F95-A106-1C041C54315D}" srcId="{B3DC2587-E04D-4C5C-A58F-384A6C572ACF}" destId="{DFEDEE1D-69F6-4D76-8A43-6A808AD3E1C4}" srcOrd="3" destOrd="0" parTransId="{C11AC484-2EEE-4B3D-9B87-1816F90C24F3}" sibTransId="{6CF29048-0F10-4A73-A66D-4A25BC828763}"/>
+    <dgm:cxn modelId="{1BC08F88-EBA1-4C27-BB06-9BFEF1BB885F}" srcId="{B3DC2587-E04D-4C5C-A58F-384A6C572ACF}" destId="{249AE276-A24E-42C9-A4C9-E1D2CA9B3F6B}" srcOrd="2" destOrd="0" parTransId="{E3E3ED72-1F4A-4699-B828-FF7BA0222C30}" sibTransId="{69AA19D6-3BF5-4B77-8CFC-E1360EC589EC}"/>
+    <dgm:cxn modelId="{D7C19577-B0E8-494B-AE68-7087E7E452D3}" srcId="{DD8C1B21-E105-4303-887A-6CB1E6E4DA97}" destId="{875A89C7-B05B-4366-8D40-1185823E2C6E}" srcOrd="0" destOrd="0" parTransId="{1DF17B52-25DF-41A7-A84E-6375AE03F565}" sibTransId="{0292764D-80F7-4C7E-86C1-6FEFCE2161BE}"/>
+    <dgm:cxn modelId="{E31B849E-1834-41DC-8412-A952D3508046}" srcId="{DD8C1B21-E105-4303-887A-6CB1E6E4DA97}" destId="{B3DC2587-E04D-4C5C-A58F-384A6C572ACF}" srcOrd="3" destOrd="0" parTransId="{2F299146-BA38-46FD-86E5-FB35F2457340}" sibTransId="{1F6E51F2-0652-41FD-82EE-8D265B0695F8}"/>
+    <dgm:cxn modelId="{9A8C1E40-60C2-4689-9EC1-66B23E3145C8}" type="presOf" srcId="{DCF00EED-65CC-4C7E-96D9-B816C13F9EFE}" destId="{CC7BCB6C-8BCA-495D-8CF6-D84666EF5E5F}" srcOrd="0" destOrd="0" presId="urn:microsoft.com/office/officeart/2005/8/layout/list1"/>
+    <dgm:cxn modelId="{CE1E61B2-E742-4CBC-94AD-97B7A52B449D}" type="presOf" srcId="{5EA98692-4DD2-4F1A-909E-252F4E37A285}" destId="{48B4068F-93DE-4F21-A39D-216EC12D90FA}" srcOrd="0" destOrd="1" presId="urn:microsoft.com/office/officeart/2005/8/layout/list1"/>
     <dgm:cxn modelId="{BFB576BD-1931-40BE-956B-CDC49EE1C5C2}" type="presOf" srcId="{6AE72809-82D1-4054-A302-A4B509E9BE7A}" destId="{8508FF16-E7B7-4DEC-9EA2-CBDF500AA26F}" srcOrd="1" destOrd="0" presId="urn:microsoft.com/office/officeart/2005/8/layout/list1"/>
-    <dgm:cxn modelId="{4BE45462-0DEC-4F1C-9F3A-13F320DBD0FF}" srcId="{B3DC2587-E04D-4C5C-A58F-384A6C572ACF}" destId="{DCF00EED-65CC-4C7E-96D9-B816C13F9EFE}" srcOrd="0" destOrd="0" parTransId="{EE9344AE-E1C3-4C29-9CE4-D15F8E84686E}" sibTransId="{DB521E0F-A8CA-444C-A42C-3D0C5D6F961C}"/>
-    <dgm:cxn modelId="{84881D50-A9F4-45CF-B677-E307948FCB8F}" type="presOf" srcId="{381BE165-E217-4469-967D-449BAF1F7DC2}" destId="{A7510B0D-8B2A-4A86-807F-2A085A9968A5}" srcOrd="0" destOrd="0" presId="urn:microsoft.com/office/officeart/2005/8/layout/list1"/>
     <dgm:cxn modelId="{82632590-126F-478B-95A2-32CA0DFF92F4}" type="presOf" srcId="{875A89C7-B05B-4366-8D40-1185823E2C6E}" destId="{B4FDC873-78D4-4FB4-B5B0-049926DE8A1A}" srcOrd="1" destOrd="0" presId="urn:microsoft.com/office/officeart/2005/8/layout/list1"/>
-    <dgm:cxn modelId="{8C4B960C-99B8-4601-8AC4-F88E3953A281}" type="presOf" srcId="{DFEDEE1D-69F6-4D76-8A43-6A808AD3E1C4}" destId="{CC7BCB6C-8BCA-495D-8CF6-D84666EF5E5F}" srcOrd="0" destOrd="3" presId="urn:microsoft.com/office/officeart/2005/8/layout/list1"/>
-    <dgm:cxn modelId="{9DE7BCFA-4B72-4028-BA7C-C42AA4694649}" srcId="{8480DCCD-41B1-4FEE-814C-0E656A275AF9}" destId="{5EA98692-4DD2-4F1A-909E-252F4E37A285}" srcOrd="1" destOrd="0" parTransId="{9CDABB4E-A8AE-4F6A-9188-E0631CE30B34}" sibTransId="{0882DC31-B73D-4877-9292-B07A59CEDE38}"/>
-    <dgm:cxn modelId="{CE1E61B2-E742-4CBC-94AD-97B7A52B449D}" type="presOf" srcId="{5EA98692-4DD2-4F1A-909E-252F4E37A285}" destId="{48B4068F-93DE-4F21-A39D-216EC12D90FA}" srcOrd="0" destOrd="1" presId="urn:microsoft.com/office/officeart/2005/8/layout/list1"/>
-    <dgm:cxn modelId="{B7DC7B38-1D0C-4603-9A07-4BAF8922692C}" type="presOf" srcId="{4809A052-339C-4B54-B992-67A13C97ADAA}" destId="{CC7BCB6C-8BCA-495D-8CF6-D84666EF5E5F}" srcOrd="0" destOrd="1" presId="urn:microsoft.com/office/officeart/2005/8/layout/list1"/>
-    <dgm:cxn modelId="{D7C19577-B0E8-494B-AE68-7087E7E452D3}" srcId="{DD8C1B21-E105-4303-887A-6CB1E6E4DA97}" destId="{875A89C7-B05B-4366-8D40-1185823E2C6E}" srcOrd="0" destOrd="0" parTransId="{1DF17B52-25DF-41A7-A84E-6375AE03F565}" sibTransId="{0292764D-80F7-4C7E-86C1-6FEFCE2161BE}"/>
-    <dgm:cxn modelId="{8C761ED4-F506-40FF-A62F-EF5BA50B6C76}" type="presOf" srcId="{B3DC2587-E04D-4C5C-A58F-384A6C572ACF}" destId="{5DEEECA0-F703-4185-BE20-02DAF9EFE1D1}" srcOrd="0" destOrd="0" presId="urn:microsoft.com/office/officeart/2005/8/layout/list1"/>
-    <dgm:cxn modelId="{42CF3D73-BDEF-4F6A-ADCE-8C1E30560002}" type="presOf" srcId="{249AE276-A24E-42C9-A4C9-E1D2CA9B3F6B}" destId="{CC7BCB6C-8BCA-495D-8CF6-D84666EF5E5F}" srcOrd="0" destOrd="2" presId="urn:microsoft.com/office/officeart/2005/8/layout/list1"/>
-    <dgm:cxn modelId="{7D232A26-26FE-40E6-B9A6-608CBAEAA451}" srcId="{DD8C1B21-E105-4303-887A-6CB1E6E4DA97}" destId="{6AE72809-82D1-4054-A302-A4B509E9BE7A}" srcOrd="1" destOrd="0" parTransId="{1FD80B2D-D71E-42AE-9903-35E256B15AA4}" sibTransId="{D0EB0430-64B4-4777-BA2A-87BF4A75F0CB}"/>
+    <dgm:cxn modelId="{4B733FFC-0BEF-40D3-B3F1-9002D16FE07E}" type="presOf" srcId="{DB6FE0FF-CD4F-4631-BF72-C498006D7653}" destId="{F2A0EB99-4789-4781-B84A-B91842BA5259}" srcOrd="0" destOrd="1" presId="urn:microsoft.com/office/officeart/2005/8/layout/list1"/>
+    <dgm:cxn modelId="{1AC2612F-91E6-4D5C-83F6-8232A96CD232}" srcId="{8480DCCD-41B1-4FEE-814C-0E656A275AF9}" destId="{52289717-3175-42C8-8737-9F6FBD19C023}" srcOrd="0" destOrd="0" parTransId="{5490E82B-6B7D-4F30-802B-DC51137542F4}" sibTransId="{2C8228D6-5C36-4B75-A7CC-94F4EECE7C9D}"/>
+    <dgm:cxn modelId="{35685387-3BAE-487A-A073-963EC3E8E4D9}" type="presOf" srcId="{8480DCCD-41B1-4FEE-814C-0E656A275AF9}" destId="{FF8A8ED6-16E4-4154-9DE6-3FCAE702C2BF}" srcOrd="0" destOrd="0" presId="urn:microsoft.com/office/officeart/2005/8/layout/list1"/>
     <dgm:cxn modelId="{647A9804-2E88-46E4-92AE-3A6EC3759CCD}" srcId="{B3DC2587-E04D-4C5C-A58F-384A6C572ACF}" destId="{4809A052-339C-4B54-B992-67A13C97ADAA}" srcOrd="1" destOrd="0" parTransId="{2F7C2E58-9992-423E-A06F-6A88FFA0F391}" sibTransId="{331793EE-3D70-49D1-B005-76BE228CB3AC}"/>
-    <dgm:cxn modelId="{7AD890BC-5599-4F95-A106-1C041C54315D}" srcId="{B3DC2587-E04D-4C5C-A58F-384A6C572ACF}" destId="{DFEDEE1D-69F6-4D76-8A43-6A808AD3E1C4}" srcOrd="3" destOrd="0" parTransId="{C11AC484-2EEE-4B3D-9B87-1816F90C24F3}" sibTransId="{6CF29048-0F10-4A73-A66D-4A25BC828763}"/>
-    <dgm:cxn modelId="{15EDBB0F-8D3D-4EC8-A294-E28A1258284E}" srcId="{6AE72809-82D1-4054-A302-A4B509E9BE7A}" destId="{D443A12C-8F2E-4816-851F-F7E8881004F2}" srcOrd="0" destOrd="0" parTransId="{79BA18C6-22C6-4234-B05F-44CD8516B15C}" sibTransId="{A185D66A-7162-46EC-897B-87B62D19939B}"/>
-    <dgm:cxn modelId="{49C9A4C3-F801-4B6F-85AE-E79F7EB06D7D}" srcId="{DD8C1B21-E105-4303-887A-6CB1E6E4DA97}" destId="{8480DCCD-41B1-4FEE-814C-0E656A275AF9}" srcOrd="2" destOrd="0" parTransId="{2948BB94-4223-4F8B-91EF-A67DF73C71F0}" sibTransId="{A72B276E-155B-4C51-99A8-88AC6AC51523}"/>
-    <dgm:cxn modelId="{BE3AA0D0-7B74-4624-83C5-79A723A6E10A}" type="presOf" srcId="{52289717-3175-42C8-8737-9F6FBD19C023}" destId="{48B4068F-93DE-4F21-A39D-216EC12D90FA}" srcOrd="0" destOrd="0" presId="urn:microsoft.com/office/officeart/2005/8/layout/list1"/>
-    <dgm:cxn modelId="{9A8C1E40-60C2-4689-9EC1-66B23E3145C8}" type="presOf" srcId="{DCF00EED-65CC-4C7E-96D9-B816C13F9EFE}" destId="{CC7BCB6C-8BCA-495D-8CF6-D84666EF5E5F}" srcOrd="0" destOrd="0" presId="urn:microsoft.com/office/officeart/2005/8/layout/list1"/>
-    <dgm:cxn modelId="{A6C46689-EEC5-4B2E-9222-321978930691}" type="presOf" srcId="{D443A12C-8F2E-4816-851F-F7E8881004F2}" destId="{F2A0EB99-4789-4781-B84A-B91842BA5259}" srcOrd="0" destOrd="0" presId="urn:microsoft.com/office/officeart/2005/8/layout/list1"/>
-    <dgm:cxn modelId="{35685387-3BAE-487A-A073-963EC3E8E4D9}" type="presOf" srcId="{8480DCCD-41B1-4FEE-814C-0E656A275AF9}" destId="{FF8A8ED6-16E4-4154-9DE6-3FCAE702C2BF}" srcOrd="0" destOrd="0" presId="urn:microsoft.com/office/officeart/2005/8/layout/list1"/>
-    <dgm:cxn modelId="{F9119C24-1BB2-44A5-9AE0-096AE02AC6B6}" type="presOf" srcId="{8480DCCD-41B1-4FEE-814C-0E656A275AF9}" destId="{4FB21003-4F00-4B83-ACB9-5DE3C9405725}" srcOrd="1" destOrd="0" presId="urn:microsoft.com/office/officeart/2005/8/layout/list1"/>
-    <dgm:cxn modelId="{4B733FFC-0BEF-40D3-B3F1-9002D16FE07E}" type="presOf" srcId="{DB6FE0FF-CD4F-4631-BF72-C498006D7653}" destId="{F2A0EB99-4789-4781-B84A-B91842BA5259}" srcOrd="0" destOrd="2" presId="urn:microsoft.com/office/officeart/2005/8/layout/list1"/>
-    <dgm:cxn modelId="{C666E48A-E17F-40CA-81A4-0B136FD09BC9}" type="presOf" srcId="{1397783F-A20E-4235-A183-0F41B5A760A9}" destId="{F2A0EB99-4789-4781-B84A-B91842BA5259}" srcOrd="0" destOrd="1" presId="urn:microsoft.com/office/officeart/2005/8/layout/list1"/>
-    <dgm:cxn modelId="{1BC08F88-EBA1-4C27-BB06-9BFEF1BB885F}" srcId="{B3DC2587-E04D-4C5C-A58F-384A6C572ACF}" destId="{249AE276-A24E-42C9-A4C9-E1D2CA9B3F6B}" srcOrd="2" destOrd="0" parTransId="{E3E3ED72-1F4A-4699-B828-FF7BA0222C30}" sibTransId="{69AA19D6-3BF5-4B77-8CFC-E1360EC589EC}"/>
-    <dgm:cxn modelId="{22870A76-AE88-45DC-88C8-FD8E83391038}" srcId="{6AE72809-82D1-4054-A302-A4B509E9BE7A}" destId="{1397783F-A20E-4235-A183-0F41B5A760A9}" srcOrd="1" destOrd="0" parTransId="{48E52DA6-416F-4E0D-9EFC-ABE192265EA5}" sibTransId="{B75FA972-2FA7-4377-AE80-9572FD33A539}"/>
-    <dgm:cxn modelId="{102742C8-C00F-40D6-9C8A-B0B290F444C6}" srcId="{6AE72809-82D1-4054-A302-A4B509E9BE7A}" destId="{DB6FE0FF-CD4F-4631-BF72-C498006D7653}" srcOrd="2" destOrd="0" parTransId="{91D8CDED-B3ED-4E6D-9DC0-AF4B7125F173}" sibTransId="{FC0CF06E-6548-4E9C-9078-482335FAE958}"/>
-    <dgm:cxn modelId="{D5FBEC3F-7977-4DCC-B14E-B8C8CB555C9F}" type="presOf" srcId="{B3DC2587-E04D-4C5C-A58F-384A6C572ACF}" destId="{F9FDB6E3-7604-4CFB-99E9-16977FD41B76}" srcOrd="1" destOrd="0" presId="urn:microsoft.com/office/officeart/2005/8/layout/list1"/>
-    <dgm:cxn modelId="{1AC2612F-91E6-4D5C-83F6-8232A96CD232}" srcId="{8480DCCD-41B1-4FEE-814C-0E656A275AF9}" destId="{52289717-3175-42C8-8737-9F6FBD19C023}" srcOrd="0" destOrd="0" parTransId="{5490E82B-6B7D-4F30-802B-DC51137542F4}" sibTransId="{2C8228D6-5C36-4B75-A7CC-94F4EECE7C9D}"/>
-    <dgm:cxn modelId="{870DC54F-CA08-49D2-B0B2-26C1E543DD29}" srcId="{875A89C7-B05B-4366-8D40-1185823E2C6E}" destId="{381BE165-E217-4469-967D-449BAF1F7DC2}" srcOrd="0" destOrd="0" parTransId="{C1F212F0-DDFE-46DA-92C5-B13F3B821D77}" sibTransId="{10006573-E3B7-49BB-9CEB-185B034D967B}"/>
-    <dgm:cxn modelId="{F5930BE5-62C5-4646-924D-B5F9F4049EF1}" type="presOf" srcId="{875A89C7-B05B-4366-8D40-1185823E2C6E}" destId="{81383EA1-0C17-4163-B12F-244F1882C351}" srcOrd="0" destOrd="0" presId="urn:microsoft.com/office/officeart/2005/8/layout/list1"/>
-    <dgm:cxn modelId="{E31B849E-1834-41DC-8412-A952D3508046}" srcId="{DD8C1B21-E105-4303-887A-6CB1E6E4DA97}" destId="{B3DC2587-E04D-4C5C-A58F-384A6C572ACF}" srcOrd="3" destOrd="0" parTransId="{2F299146-BA38-46FD-86E5-FB35F2457340}" sibTransId="{1F6E51F2-0652-41FD-82EE-8D265B0695F8}"/>
-    <dgm:cxn modelId="{1627157D-A4DF-4A75-82ED-2BCAFAF037CA}" type="presOf" srcId="{DD8C1B21-E105-4303-887A-6CB1E6E4DA97}" destId="{3C62609F-F3FD-4911-AA82-C116C88BB4F0}" srcOrd="0" destOrd="0" presId="urn:microsoft.com/office/officeart/2005/8/layout/list1"/>
-    <dgm:cxn modelId="{621AC734-CB76-444E-9592-9E5788A9AD92}" type="presOf" srcId="{6AE72809-82D1-4054-A302-A4B509E9BE7A}" destId="{46877989-D016-4D36-BCED-CD47F213F7CE}" srcOrd="0" destOrd="0" presId="urn:microsoft.com/office/officeart/2005/8/layout/list1"/>
     <dgm:cxn modelId="{62B6AE52-FD6C-4C16-94F6-40B6C2E63A00}" type="presParOf" srcId="{3C62609F-F3FD-4911-AA82-C116C88BB4F0}" destId="{82D637B7-780B-4FA2-BADE-5DEF663CC138}" srcOrd="0" destOrd="0" presId="urn:microsoft.com/office/officeart/2005/8/layout/list1"/>
     <dgm:cxn modelId="{2E69C1DD-6CCD-4C80-A6D6-503AC3DF7C94}" type="presParOf" srcId="{82D637B7-780B-4FA2-BADE-5DEF663CC138}" destId="{81383EA1-0C17-4163-B12F-244F1882C351}" srcOrd="0" destOrd="0" presId="urn:microsoft.com/office/officeart/2005/8/layout/list1"/>
     <dgm:cxn modelId="{94D16D4A-8A84-4D2F-819F-70D419EF8767}" type="presParOf" srcId="{82D637B7-780B-4FA2-BADE-5DEF663CC138}" destId="{B4FDC873-78D4-4FB4-B5B0-049926DE8A1A}" srcOrd="1" destOrd="0" presId="urn:microsoft.com/office/officeart/2005/8/layout/list1"/>
@@ -9282,18 +9287,20 @@
       <dsp:cNvGrpSpPr/>
     </dsp:nvGrpSpPr>
     <dsp:grpSpPr/>
-    <dsp:sp modelId="{7E0B1343-3CEF-47AD-8A82-DC7F83EE0732}">
+    <dsp:sp modelId="{7AEE35B3-3929-4A16-90D9-993B1AFC31B5}">
       <dsp:nvSpPr>
         <dsp:cNvPr id="0" name=""/>
         <dsp:cNvSpPr/>
       </dsp:nvSpPr>
       <dsp:spPr>
         <a:xfrm>
-          <a:off x="0" y="4062533"/>
-          <a:ext cx="8237537" cy="888782"/>
+          <a:off x="3620" y="60810"/>
+          <a:ext cx="1582749" cy="2240579"/>
         </a:xfrm>
-        <a:prstGeom prst="rect">
-          <a:avLst/>
+        <a:prstGeom prst="roundRect">
+          <a:avLst>
+            <a:gd name="adj" fmla="val 10000"/>
+          </a:avLst>
         </a:prstGeom>
         <a:solidFill>
           <a:schemeClr val="accent2">
@@ -9331,7 +9338,7 @@
         </a:fontRef>
       </dsp:style>
       <dsp:txBody>
-        <a:bodyPr spcFirstLastPara="0" vert="horz" wrap="square" lIns="128016" tIns="128016" rIns="128016" bIns="128016" numCol="1" spcCol="1270" anchor="ctr" anchorCtr="0">
+        <a:bodyPr spcFirstLastPara="0" vert="horz" wrap="square" lIns="68580" tIns="68580" rIns="68580" bIns="68580" numCol="1" spcCol="1270" anchor="ctr" anchorCtr="0">
           <a:noAutofit/>
         </a:bodyPr>
         <a:lstStyle/>
@@ -9348,37 +9355,115 @@
             </a:spcAft>
           </a:pPr>
           <a:r>
-            <a:rPr lang="en-US" sz="1800" kern="1200" smtClean="0"/>
-            <a:t>After NDRange command finished and appropriate COI Event in Notification Port is signaled  MIC DA host side will copy printf() buffer to the host and </a:t>
+            <a:rPr lang="en-US" sz="1800" kern="1200" dirty="0" smtClean="0"/>
+            <a:t>kernel </a:t>
           </a:r>
           <a:r>
-            <a:rPr lang="en-US" sz="1800" i="1" kern="1200" smtClean="0"/>
-            <a:t>invoke appropriate Runtime service to consume the data</a:t>
+            <a:rPr lang="en-US" sz="1800" kern="1200" dirty="0" smtClean="0"/>
+            <a:t>calls </a:t>
           </a:r>
           <a:r>
-            <a:rPr lang="en-US" sz="1800" kern="1200" smtClean="0"/>
-            <a:t>.</a:t>
+            <a:rPr lang="en-US" sz="1800" kern="1200" dirty="0" err="1" smtClean="0"/>
+            <a:t>printf</a:t>
+          </a:r>
+          <a:r>
+            <a:rPr lang="en-US" sz="1800" kern="1200" dirty="0" smtClean="0"/>
+            <a:t>() </a:t>
+          </a:r>
+          <a:r>
+            <a:rPr lang="en-US" sz="1800" kern="1200" dirty="0" smtClean="0"/>
+            <a:t>function</a:t>
           </a:r>
           <a:endParaRPr lang="en-US" sz="1800" kern="1200" dirty="0"/>
         </a:p>
       </dsp:txBody>
       <dsp:txXfrm>
-        <a:off x="0" y="4062533"/>
-        <a:ext cx="8237537" cy="888782"/>
+        <a:off x="49977" y="107167"/>
+        <a:ext cx="1490035" cy="2147865"/>
       </dsp:txXfrm>
     </dsp:sp>
-    <dsp:sp modelId="{6F4C924D-0F7F-4AB7-B69D-4D109D0B9DCD}">
+    <dsp:sp modelId="{07B03748-3870-49A9-9F52-53D5696CACE6}">
       <dsp:nvSpPr>
         <dsp:cNvPr id="0" name=""/>
         <dsp:cNvSpPr/>
       </dsp:nvSpPr>
       <dsp:spPr>
-        <a:xfrm rot="10800000">
-          <a:off x="0" y="2708916"/>
-          <a:ext cx="8237537" cy="1366948"/>
+        <a:xfrm>
+          <a:off x="1744644" y="984839"/>
+          <a:ext cx="335542" cy="392521"/>
         </a:xfrm>
-        <a:prstGeom prst="upArrowCallout">
-          <a:avLst/>
+        <a:prstGeom prst="rightArrow">
+          <a:avLst>
+            <a:gd name="adj1" fmla="val 60000"/>
+            <a:gd name="adj2" fmla="val 50000"/>
+          </a:avLst>
+        </a:prstGeom>
+        <a:solidFill>
+          <a:schemeClr val="accent2">
+            <a:hueOff val="0"/>
+            <a:satOff val="0"/>
+            <a:lumOff val="0"/>
+            <a:alphaOff val="0"/>
+          </a:schemeClr>
+        </a:solidFill>
+        <a:ln>
+          <a:noFill/>
+        </a:ln>
+        <a:effectLst/>
+      </dsp:spPr>
+      <dsp:style>
+        <a:lnRef idx="0">
+          <a:scrgbClr r="0" g="0" b="0"/>
+        </a:lnRef>
+        <a:fillRef idx="1">
+          <a:scrgbClr r="0" g="0" b="0"/>
+        </a:fillRef>
+        <a:effectRef idx="0">
+          <a:scrgbClr r="0" g="0" b="0"/>
+        </a:effectRef>
+        <a:fontRef idx="minor">
+          <a:schemeClr val="lt1"/>
+        </a:fontRef>
+      </dsp:style>
+      <dsp:txBody>
+        <a:bodyPr spcFirstLastPara="0" vert="horz" wrap="square" lIns="0" tIns="0" rIns="0" bIns="0" numCol="1" spcCol="1270" anchor="ctr" anchorCtr="0">
+          <a:noAutofit/>
+        </a:bodyPr>
+        <a:lstStyle/>
+        <a:p>
+          <a:pPr lvl="0" algn="ctr" defTabSz="711200">
+            <a:lnSpc>
+              <a:spcPct val="90000"/>
+            </a:lnSpc>
+            <a:spcBef>
+              <a:spcPct val="0"/>
+            </a:spcBef>
+            <a:spcAft>
+              <a:spcPct val="35000"/>
+            </a:spcAft>
+          </a:pPr>
+          <a:endParaRPr lang="en-US" sz="1600" kern="1200"/>
+        </a:p>
+      </dsp:txBody>
+      <dsp:txXfrm>
+        <a:off x="1744644" y="1063343"/>
+        <a:ext cx="234879" cy="235513"/>
+      </dsp:txXfrm>
+    </dsp:sp>
+    <dsp:sp modelId="{864363C6-652B-4DD8-86B7-8885EEEB880C}">
+      <dsp:nvSpPr>
+        <dsp:cNvPr id="0" name=""/>
+        <dsp:cNvSpPr/>
+      </dsp:nvSpPr>
+      <dsp:spPr>
+        <a:xfrm>
+          <a:off x="2219469" y="60810"/>
+          <a:ext cx="1582749" cy="2240579"/>
+        </a:xfrm>
+        <a:prstGeom prst="roundRect">
+          <a:avLst>
+            <a:gd name="adj" fmla="val 10000"/>
+          </a:avLst>
         </a:prstGeom>
         <a:solidFill>
           <a:schemeClr val="accent2">
@@ -9416,7 +9501,7 @@
         </a:fontRef>
       </dsp:style>
       <dsp:txBody>
-        <a:bodyPr spcFirstLastPara="0" vert="horz" wrap="square" lIns="128016" tIns="128016" rIns="128016" bIns="128016" numCol="1" spcCol="1270" anchor="ctr" anchorCtr="0">
+        <a:bodyPr spcFirstLastPara="0" vert="horz" wrap="square" lIns="68580" tIns="68580" rIns="68580" bIns="68580" numCol="1" spcCol="1270" anchor="ctr" anchorCtr="0">
           <a:noAutofit/>
         </a:bodyPr>
         <a:lstStyle/>
@@ -9433,16 +9518,71 @@
             </a:spcAft>
           </a:pPr>
           <a:r>
-            <a:rPr lang="en-US" sz="1800" kern="1200" dirty="0" smtClean="0"/>
-            <a:t>MIC DA device side callback copies the string to the specific buffer atomically</a:t>
+            <a:rPr lang="en-US" sz="1800" kern="1200" smtClean="0"/>
+            <a:t>Backend </a:t>
           </a:r>
           <a:r>
             <a:rPr lang="en-US" sz="1800" kern="1200" dirty="0" smtClean="0"/>
-            <a:t>.</a:t>
+            <a:t>invokes MIC DA device side callback with relevant string and string size.</a:t>
           </a:r>
+          <a:endParaRPr lang="en-US" sz="1800" kern="1200" dirty="0"/>
         </a:p>
+      </dsp:txBody>
+      <dsp:txXfrm>
+        <a:off x="2265826" y="107167"/>
+        <a:ext cx="1490035" cy="2147865"/>
+      </dsp:txXfrm>
+    </dsp:sp>
+    <dsp:sp modelId="{0639B046-C3D5-49E6-89AC-FB80CD7DD456}">
+      <dsp:nvSpPr>
+        <dsp:cNvPr id="0" name=""/>
+        <dsp:cNvSpPr/>
+      </dsp:nvSpPr>
+      <dsp:spPr>
+        <a:xfrm>
+          <a:off x="3960493" y="984839"/>
+          <a:ext cx="335542" cy="392521"/>
+        </a:xfrm>
+        <a:prstGeom prst="rightArrow">
+          <a:avLst>
+            <a:gd name="adj1" fmla="val 60000"/>
+            <a:gd name="adj2" fmla="val 50000"/>
+          </a:avLst>
+        </a:prstGeom>
+        <a:solidFill>
+          <a:schemeClr val="accent2">
+            <a:hueOff val="511238"/>
+            <a:satOff val="-12091"/>
+            <a:lumOff val="9216"/>
+            <a:alphaOff val="0"/>
+          </a:schemeClr>
+        </a:solidFill>
+        <a:ln>
+          <a:noFill/>
+        </a:ln>
+        <a:effectLst/>
+      </dsp:spPr>
+      <dsp:style>
+        <a:lnRef idx="0">
+          <a:scrgbClr r="0" g="0" b="0"/>
+        </a:lnRef>
+        <a:fillRef idx="1">
+          <a:scrgbClr r="0" g="0" b="0"/>
+        </a:fillRef>
+        <a:effectRef idx="0">
+          <a:scrgbClr r="0" g="0" b="0"/>
+        </a:effectRef>
+        <a:fontRef idx="minor">
+          <a:schemeClr val="lt1"/>
+        </a:fontRef>
+      </dsp:style>
+      <dsp:txBody>
+        <a:bodyPr spcFirstLastPara="0" vert="horz" wrap="square" lIns="0" tIns="0" rIns="0" bIns="0" numCol="1" spcCol="1270" anchor="ctr" anchorCtr="0">
+          <a:noAutofit/>
+        </a:bodyPr>
+        <a:lstStyle/>
         <a:p>
-          <a:pPr lvl="0" algn="ctr" defTabSz="800100" rtl="0">
+          <a:pPr lvl="0" algn="ctr" defTabSz="711200">
             <a:lnSpc>
               <a:spcPct val="90000"/>
             </a:lnSpc>
@@ -9453,30 +9593,28 @@
               <a:spcPct val="35000"/>
             </a:spcAft>
           </a:pPr>
-          <a:r>
-            <a:rPr lang="en-US" sz="1800" b="1" i="1" kern="1200" dirty="0" smtClean="0"/>
-            <a:t>** Avoid Work Items output intermixing to ease debugging **</a:t>
-          </a:r>
-          <a:endParaRPr lang="en-US" sz="1800" b="1" i="1" kern="1200" dirty="0"/>
+          <a:endParaRPr lang="en-US" sz="1600" kern="1200"/>
         </a:p>
       </dsp:txBody>
-      <dsp:txXfrm rot="10800000">
-        <a:off x="0" y="2708916"/>
-        <a:ext cx="8237537" cy="888202"/>
+      <dsp:txXfrm>
+        <a:off x="3960493" y="1063343"/>
+        <a:ext cx="234879" cy="235513"/>
       </dsp:txXfrm>
     </dsp:sp>
-    <dsp:sp modelId="{6B3A3F9E-A769-4656-A859-BA507AC1248C}">
+    <dsp:sp modelId="{D91390A3-1164-4A1A-A538-C0648F590879}">
       <dsp:nvSpPr>
         <dsp:cNvPr id="0" name=""/>
         <dsp:cNvSpPr/>
       </dsp:nvSpPr>
       <dsp:spPr>
-        <a:xfrm rot="10800000">
-          <a:off x="0" y="1355300"/>
-          <a:ext cx="8237537" cy="1366948"/>
+        <a:xfrm>
+          <a:off x="4435318" y="60810"/>
+          <a:ext cx="1582749" cy="2240579"/>
         </a:xfrm>
-        <a:prstGeom prst="upArrowCallout">
-          <a:avLst/>
+        <a:prstGeom prst="roundRect">
+          <a:avLst>
+            <a:gd name="adj" fmla="val 10000"/>
+          </a:avLst>
         </a:prstGeom>
         <a:solidFill>
           <a:schemeClr val="accent2">
@@ -9514,7 +9652,7 @@
         </a:fontRef>
       </dsp:style>
       <dsp:txBody>
-        <a:bodyPr spcFirstLastPara="0" vert="horz" wrap="square" lIns="128016" tIns="128016" rIns="128016" bIns="128016" numCol="1" spcCol="1270" anchor="ctr" anchorCtr="0">
+        <a:bodyPr spcFirstLastPara="0" vert="horz" wrap="square" lIns="68580" tIns="68580" rIns="68580" bIns="68580" numCol="1" spcCol="1270" anchor="ctr" anchorCtr="0">
           <a:noAutofit/>
         </a:bodyPr>
         <a:lstStyle/>
@@ -9532,7 +9670,11 @@
           </a:pPr>
           <a:r>
             <a:rPr lang="en-US" sz="1800" kern="1200" dirty="0" smtClean="0"/>
-            <a:t>As kernel calls </a:t>
+            <a:t>MIC DA device side callback </a:t>
+          </a:r>
+          <a:r>
+            <a:rPr lang="en-US" sz="1800" kern="1200" dirty="0" smtClean="0"/>
+            <a:t>issues standard C </a:t>
           </a:r>
           <a:r>
             <a:rPr lang="en-US" sz="1800" kern="1200" dirty="0" err="1" smtClean="0"/>
@@ -9540,28 +9682,106 @@
           </a:r>
           <a:r>
             <a:rPr lang="en-US" sz="1800" kern="1200" dirty="0" smtClean="0"/>
-            <a:t>() function Backend invokes MIC DA device side callback with relevant string and string size.</a:t>
+            <a:t>() function to </a:t>
           </a:r>
-          <a:endParaRPr lang="en-US" sz="1800" kern="1200" dirty="0"/>
+          <a:r>
+            <a:rPr lang="en-US" sz="1800" kern="1200" dirty="0" err="1" smtClean="0"/>
+            <a:t>stdout</a:t>
+          </a:r>
+          <a:r>
+            <a:rPr lang="en-US" sz="1800" kern="1200" dirty="0" smtClean="0"/>
+            <a:t> stream.</a:t>
+          </a:r>
+          <a:endParaRPr lang="en-US" sz="1800" b="1" i="1" kern="1200" dirty="0"/>
         </a:p>
       </dsp:txBody>
-      <dsp:txXfrm rot="10800000">
-        <a:off x="0" y="1355300"/>
-        <a:ext cx="8237537" cy="888202"/>
+      <dsp:txXfrm>
+        <a:off x="4481675" y="107167"/>
+        <a:ext cx="1490035" cy="2147865"/>
       </dsp:txXfrm>
     </dsp:sp>
-    <dsp:sp modelId="{FCDB95F6-53E8-4C47-8F8F-9E847D02123A}">
+    <dsp:sp modelId="{EAA81B7C-6FDA-4B97-86D0-F97DC70520B0}">
       <dsp:nvSpPr>
         <dsp:cNvPr id="0" name=""/>
         <dsp:cNvSpPr/>
       </dsp:nvSpPr>
       <dsp:spPr>
-        <a:xfrm rot="10800000">
-          <a:off x="0" y="1683"/>
-          <a:ext cx="8237537" cy="1366948"/>
+        <a:xfrm>
+          <a:off x="6176342" y="984839"/>
+          <a:ext cx="335542" cy="392521"/>
         </a:xfrm>
-        <a:prstGeom prst="upArrowCallout">
-          <a:avLst/>
+        <a:prstGeom prst="rightArrow">
+          <a:avLst>
+            <a:gd name="adj1" fmla="val 60000"/>
+            <a:gd name="adj2" fmla="val 50000"/>
+          </a:avLst>
+        </a:prstGeom>
+        <a:solidFill>
+          <a:schemeClr val="accent2">
+            <a:hueOff val="1022477"/>
+            <a:satOff val="-24181"/>
+            <a:lumOff val="18432"/>
+            <a:alphaOff val="0"/>
+          </a:schemeClr>
+        </a:solidFill>
+        <a:ln>
+          <a:noFill/>
+        </a:ln>
+        <a:effectLst/>
+      </dsp:spPr>
+      <dsp:style>
+        <a:lnRef idx="0">
+          <a:scrgbClr r="0" g="0" b="0"/>
+        </a:lnRef>
+        <a:fillRef idx="1">
+          <a:scrgbClr r="0" g="0" b="0"/>
+        </a:fillRef>
+        <a:effectRef idx="0">
+          <a:scrgbClr r="0" g="0" b="0"/>
+        </a:effectRef>
+        <a:fontRef idx="minor">
+          <a:schemeClr val="lt1"/>
+        </a:fontRef>
+      </dsp:style>
+      <dsp:txBody>
+        <a:bodyPr spcFirstLastPara="0" vert="horz" wrap="square" lIns="0" tIns="0" rIns="0" bIns="0" numCol="1" spcCol="1270" anchor="ctr" anchorCtr="0">
+          <a:noAutofit/>
+        </a:bodyPr>
+        <a:lstStyle/>
+        <a:p>
+          <a:pPr lvl="0" algn="ctr" defTabSz="711200">
+            <a:lnSpc>
+              <a:spcPct val="90000"/>
+            </a:lnSpc>
+            <a:spcBef>
+              <a:spcPct val="0"/>
+            </a:spcBef>
+            <a:spcAft>
+              <a:spcPct val="35000"/>
+            </a:spcAft>
+          </a:pPr>
+          <a:endParaRPr lang="en-US" sz="1600" kern="1200"/>
+        </a:p>
+      </dsp:txBody>
+      <dsp:txXfrm>
+        <a:off x="6176342" y="1063343"/>
+        <a:ext cx="234879" cy="235513"/>
+      </dsp:txXfrm>
+    </dsp:sp>
+    <dsp:sp modelId="{C835CE53-7F6E-4DEB-A901-F739EA1BB092}">
+      <dsp:nvSpPr>
+        <dsp:cNvPr id="0" name=""/>
+        <dsp:cNvSpPr/>
+      </dsp:nvSpPr>
+      <dsp:spPr>
+        <a:xfrm>
+          <a:off x="6651167" y="60810"/>
+          <a:ext cx="1582749" cy="2240579"/>
+        </a:xfrm>
+        <a:prstGeom prst="roundRect">
+          <a:avLst>
+            <a:gd name="adj" fmla="val 10000"/>
+          </a:avLst>
         </a:prstGeom>
         <a:solidFill>
           <a:schemeClr val="accent2">
@@ -9599,7 +9819,7 @@
         </a:fontRef>
       </dsp:style>
       <dsp:txBody>
-        <a:bodyPr spcFirstLastPara="0" vert="horz" wrap="square" lIns="128016" tIns="128016" rIns="128016" bIns="128016" numCol="1" spcCol="1270" anchor="ctr" anchorCtr="0">
+        <a:bodyPr spcFirstLastPara="0" vert="horz" wrap="square" lIns="68580" tIns="68580" rIns="68580" bIns="68580" numCol="1" spcCol="1270" anchor="ctr" anchorCtr="0">
           <a:noAutofit/>
         </a:bodyPr>
         <a:lstStyle/>
@@ -9617,30 +9837,30 @@
           </a:pPr>
           <a:r>
             <a:rPr lang="en-US" sz="1800" kern="1200" dirty="0" smtClean="0"/>
-            <a:t>MIC DA allocates new COI Buffer with limited size for each </a:t>
+            <a:t>COI redirects device </a:t>
           </a:r>
           <a:r>
             <a:rPr lang="en-US" sz="1800" kern="1200" dirty="0" err="1" smtClean="0"/>
-            <a:t>NDRange</a:t>
+            <a:t>stdout</a:t>
           </a:r>
           <a:r>
             <a:rPr lang="en-US" sz="1800" kern="1200" dirty="0" smtClean="0"/>
-            <a:t> command that uses </a:t>
+            <a:t> to host application </a:t>
           </a:r>
           <a:r>
             <a:rPr lang="en-US" sz="1800" kern="1200" dirty="0" err="1" smtClean="0"/>
-            <a:t>printf</a:t>
+            <a:t>stdout</a:t>
           </a:r>
           <a:r>
             <a:rPr lang="en-US" sz="1800" kern="1200" dirty="0" smtClean="0"/>
-            <a:t>()</a:t>
+            <a:t> stream. </a:t>
           </a:r>
           <a:endParaRPr lang="en-US" sz="1800" kern="1200" dirty="0"/>
         </a:p>
       </dsp:txBody>
-      <dsp:txXfrm rot="10800000">
-        <a:off x="0" y="1683"/>
-        <a:ext cx="8237537" cy="888202"/>
+      <dsp:txXfrm>
+        <a:off x="6697524" y="107167"/>
+        <a:ext cx="1490035" cy="2147865"/>
       </dsp:txXfrm>
     </dsp:sp>
   </dsp:spTree>
@@ -9662,7 +9882,7 @@
       </dsp:nvSpPr>
       <dsp:spPr>
         <a:xfrm>
-          <a:off x="0" y="312360"/>
+          <a:off x="0" y="433634"/>
           <a:ext cx="8464550" cy="595350"/>
         </a:xfrm>
         <a:prstGeom prst="rect">
@@ -9728,7 +9948,7 @@
         </a:p>
       </dsp:txBody>
       <dsp:txXfrm>
-        <a:off x="0" y="312360"/>
+        <a:off x="0" y="433634"/>
         <a:ext cx="8464550" cy="595350"/>
       </dsp:txXfrm>
     </dsp:sp>
@@ -9739,7 +9959,7 @@
       </dsp:nvSpPr>
       <dsp:spPr>
         <a:xfrm>
-          <a:off x="423227" y="105720"/>
+          <a:off x="423227" y="226994"/>
           <a:ext cx="5925185" cy="413280"/>
         </a:xfrm>
         <a:prstGeom prst="roundRect">
@@ -9837,7 +10057,7 @@
         </a:p>
       </dsp:txBody>
       <dsp:txXfrm>
-        <a:off x="443402" y="125895"/>
+        <a:off x="443402" y="247169"/>
         <a:ext cx="5884835" cy="372930"/>
       </dsp:txXfrm>
     </dsp:sp>
@@ -9848,8 +10068,8 @@
       </dsp:nvSpPr>
       <dsp:spPr>
         <a:xfrm>
-          <a:off x="0" y="1189950"/>
-          <a:ext cx="8464550" cy="1455299"/>
+          <a:off x="0" y="1311224"/>
+          <a:ext cx="8464550" cy="1212750"/>
         </a:xfrm>
         <a:prstGeom prst="rect">
           <a:avLst/>
@@ -9908,41 +10128,6 @@
           </a:pPr>
           <a:r>
             <a:rPr lang="en-US" sz="1400" kern="1200" dirty="0" smtClean="0"/>
-            <a:t>Consume </a:t>
-          </a:r>
-          <a:r>
-            <a:rPr lang="en-US" sz="1400" kern="1200" dirty="0" err="1" smtClean="0"/>
-            <a:t>printf</a:t>
-          </a:r>
-          <a:r>
-            <a:rPr lang="en-US" sz="1400" kern="1200" dirty="0" smtClean="0"/>
-            <a:t>() buffer after </a:t>
-          </a:r>
-          <a:r>
-            <a:rPr lang="en-US" sz="1400" kern="1200" dirty="0" err="1" smtClean="0"/>
-            <a:t>NDRange</a:t>
-          </a:r>
-          <a:r>
-            <a:rPr lang="en-US" sz="1400" kern="1200" dirty="0" smtClean="0"/>
-            <a:t> completion</a:t>
-          </a:r>
-          <a:endParaRPr lang="en-US" sz="1400" kern="1200" dirty="0"/>
-        </a:p>
-        <a:p>
-          <a:pPr marL="114300" lvl="1" indent="-114300" algn="l" defTabSz="622300" rtl="0">
-            <a:lnSpc>
-              <a:spcPct val="90000"/>
-            </a:lnSpc>
-            <a:spcBef>
-              <a:spcPct val="0"/>
-            </a:spcBef>
-            <a:spcAft>
-              <a:spcPct val="15000"/>
-            </a:spcAft>
-            <a:buChar char="••"/>
-          </a:pPr>
-          <a:r>
-            <a:rPr lang="en-US" sz="1400" kern="1200" smtClean="0"/>
             <a:t>Modify Device Querying and Creation APIs of Device Agents to support multiple top level device instances of the same type</a:t>
           </a:r>
           <a:endParaRPr lang="en-US" sz="1400" kern="1200" dirty="0"/>
@@ -9968,8 +10153,8 @@
         </a:p>
       </dsp:txBody>
       <dsp:txXfrm>
-        <a:off x="0" y="1189950"/>
-        <a:ext cx="8464550" cy="1455299"/>
+        <a:off x="0" y="1311224"/>
+        <a:ext cx="8464550" cy="1212750"/>
       </dsp:txXfrm>
     </dsp:sp>
     <dsp:sp modelId="{8508FF16-E7B7-4DEC-9EA2-CBDF500AA26F}">
@@ -9979,7 +10164,7 @@
       </dsp:nvSpPr>
       <dsp:spPr>
         <a:xfrm>
-          <a:off x="423227" y="983310"/>
+          <a:off x="423227" y="1104584"/>
           <a:ext cx="5925185" cy="413280"/>
         </a:xfrm>
         <a:prstGeom prst="roundRect">
@@ -10077,7 +10262,7 @@
         </a:p>
       </dsp:txBody>
       <dsp:txXfrm>
-        <a:off x="443402" y="1003485"/>
+        <a:off x="443402" y="1124759"/>
         <a:ext cx="5884835" cy="372930"/>
       </dsp:txXfrm>
     </dsp:sp>
@@ -10088,7 +10273,7 @@
       </dsp:nvSpPr>
       <dsp:spPr>
         <a:xfrm>
-          <a:off x="0" y="2927489"/>
+          <a:off x="0" y="2806215"/>
           <a:ext cx="8464550" cy="815850"/>
         </a:xfrm>
         <a:prstGeom prst="rect">
@@ -10173,7 +10358,7 @@
         </a:p>
       </dsp:txBody>
       <dsp:txXfrm>
-        <a:off x="0" y="2927489"/>
+        <a:off x="0" y="2806215"/>
         <a:ext cx="8464550" cy="815850"/>
       </dsp:txXfrm>
     </dsp:sp>
@@ -10184,7 +10369,7 @@
       </dsp:nvSpPr>
       <dsp:spPr>
         <a:xfrm>
-          <a:off x="423227" y="2720849"/>
+          <a:off x="423227" y="2599574"/>
           <a:ext cx="5925185" cy="413280"/>
         </a:xfrm>
         <a:prstGeom prst="roundRect">
@@ -10282,7 +10467,7 @@
         </a:p>
       </dsp:txBody>
       <dsp:txXfrm>
-        <a:off x="443402" y="2741024"/>
+        <a:off x="443402" y="2619749"/>
         <a:ext cx="5884835" cy="372930"/>
       </dsp:txXfrm>
     </dsp:sp>
@@ -10293,7 +10478,7 @@
       </dsp:nvSpPr>
       <dsp:spPr>
         <a:xfrm>
-          <a:off x="0" y="4025579"/>
+          <a:off x="0" y="3904305"/>
           <a:ext cx="8464550" cy="1278900"/>
         </a:xfrm>
         <a:prstGeom prst="rect">
@@ -10371,10 +10556,10 @@
             <a:buChar char="••"/>
           </a:pPr>
           <a:r>
-            <a:rPr lang="en-US" sz="1400" kern="1200" smtClean="0"/>
+            <a:rPr lang="en-US" sz="1400" kern="1200" dirty="0" smtClean="0"/>
             <a:t>Sub-buffers</a:t>
           </a:r>
-          <a:endParaRPr lang="en-US" sz="1400" kern="1200"/>
+          <a:endParaRPr lang="en-US" sz="1400" kern="1200" dirty="0"/>
         </a:p>
         <a:p>
           <a:pPr marL="114300" lvl="1" indent="-114300" algn="l" defTabSz="622300" rtl="0">
@@ -10409,14 +10594,18 @@
             <a:buChar char="••"/>
           </a:pPr>
           <a:r>
-            <a:rPr lang="en-US" sz="1400" kern="1200" smtClean="0"/>
-            <a:t>Process crash notification</a:t>
+            <a:rPr lang="en-US" sz="1400" kern="1200" dirty="0" smtClean="0"/>
+            <a:t>Device process </a:t>
+          </a:r>
+          <a:r>
+            <a:rPr lang="en-US" sz="1400" kern="1200" dirty="0" smtClean="0"/>
+            <a:t>crash notification</a:t>
           </a:r>
           <a:endParaRPr lang="en-US" sz="1400" kern="1200" dirty="0"/>
         </a:p>
       </dsp:txBody>
       <dsp:txXfrm>
-        <a:off x="0" y="4025579"/>
+        <a:off x="0" y="3904305"/>
         <a:ext cx="8464550" cy="1278900"/>
       </dsp:txXfrm>
     </dsp:sp>
@@ -10427,7 +10616,7 @@
       </dsp:nvSpPr>
       <dsp:spPr>
         <a:xfrm>
-          <a:off x="423227" y="3818939"/>
+          <a:off x="423227" y="3697664"/>
           <a:ext cx="5925185" cy="413280"/>
         </a:xfrm>
         <a:prstGeom prst="roundRect">
@@ -10525,7 +10714,7 @@
         </a:p>
       </dsp:txBody>
       <dsp:txXfrm>
-        <a:off x="443402" y="3839114"/>
+        <a:off x="443402" y="3717839"/>
         <a:ext cx="5884835" cy="372930"/>
       </dsp:txXfrm>
     </dsp:sp>
@@ -11035,56 +11224,16 @@
 </file>
 
 <file path=ppt/diagrams/layout4.xml><?xml version="1.0" encoding="utf-8"?>
-<dgm:layoutDef xmlns:dgm="http://schemas.openxmlformats.org/drawingml/2006/diagram" xmlns:a="http://schemas.openxmlformats.org/drawingml/2006/main" uniqueId="urn:microsoft.com/office/officeart/2005/8/layout/process4">
+<dgm:layoutDef xmlns:dgm="http://schemas.openxmlformats.org/drawingml/2006/diagram" xmlns:a="http://schemas.openxmlformats.org/drawingml/2006/main" uniqueId="urn:microsoft.com/office/officeart/2005/8/layout/process1">
   <dgm:title val=""/>
   <dgm:desc val=""/>
   <dgm:catLst>
-    <dgm:cat type="process" pri="16000"/>
-    <dgm:cat type="list" pri="20000"/>
+    <dgm:cat type="process" pri="1000"/>
+    <dgm:cat type="convert" pri="15000"/>
   </dgm:catLst>
-  <dgm:sampData>
+  <dgm:sampData useDef="1">
     <dgm:dataModel>
-      <dgm:ptLst>
-        <dgm:pt modelId="0" type="doc"/>
-        <dgm:pt modelId="1">
-          <dgm:prSet phldr="1"/>
-        </dgm:pt>
-        <dgm:pt modelId="11">
-          <dgm:prSet phldr="1"/>
-        </dgm:pt>
-        <dgm:pt modelId="12">
-          <dgm:prSet phldr="1"/>
-        </dgm:pt>
-        <dgm:pt modelId="2">
-          <dgm:prSet phldr="1"/>
-        </dgm:pt>
-        <dgm:pt modelId="21">
-          <dgm:prSet phldr="1"/>
-        </dgm:pt>
-        <dgm:pt modelId="22">
-          <dgm:prSet phldr="1"/>
-        </dgm:pt>
-        <dgm:pt modelId="3">
-          <dgm:prSet phldr="1"/>
-        </dgm:pt>
-        <dgm:pt modelId="31">
-          <dgm:prSet phldr="1"/>
-        </dgm:pt>
-        <dgm:pt modelId="32">
-          <dgm:prSet phldr="1"/>
-        </dgm:pt>
-      </dgm:ptLst>
-      <dgm:cxnLst>
-        <dgm:cxn modelId="4" srcId="0" destId="1" srcOrd="0" destOrd="0"/>
-        <dgm:cxn modelId="5" srcId="0" destId="2" srcOrd="1" destOrd="0"/>
-        <dgm:cxn modelId="6" srcId="0" destId="3" srcOrd="2" destOrd="0"/>
-        <dgm:cxn modelId="13" srcId="1" destId="11" srcOrd="0" destOrd="0"/>
-        <dgm:cxn modelId="14" srcId="1" destId="12" srcOrd="1" destOrd="0"/>
-        <dgm:cxn modelId="23" srcId="2" destId="21" srcOrd="0" destOrd="0"/>
-        <dgm:cxn modelId="24" srcId="2" destId="22" srcOrd="1" destOrd="0"/>
-        <dgm:cxn modelId="33" srcId="3" destId="31" srcOrd="0" destOrd="0"/>
-        <dgm:cxn modelId="34" srcId="3" destId="32" srcOrd="1" destOrd="0"/>
-      </dgm:cxnLst>
+      <dgm:ptLst/>
       <dgm:bg/>
       <dgm:whole/>
     </dgm:dataModel>
@@ -11094,15 +11243,11 @@
       <dgm:ptLst>
         <dgm:pt modelId="0" type="doc"/>
         <dgm:pt modelId="1"/>
-        <dgm:pt modelId="11"/>
         <dgm:pt modelId="2"/>
-        <dgm:pt modelId="21"/>
       </dgm:ptLst>
       <dgm:cxnLst>
-        <dgm:cxn modelId="4" srcId="0" destId="1" srcOrd="0" destOrd="0"/>
-        <dgm:cxn modelId="5" srcId="0" destId="2" srcOrd="1" destOrd="0"/>
-        <dgm:cxn modelId="13" srcId="1" destId="11" srcOrd="0" destOrd="0"/>
-        <dgm:cxn modelId="23" srcId="2" destId="21" srcOrd="0" destOrd="0"/>
+        <dgm:cxn modelId="3" srcId="0" destId="1" srcOrd="0" destOrd="0"/>
+        <dgm:cxn modelId="4" srcId="0" destId="2" srcOrd="1" destOrd="0"/>
       </dgm:cxnLst>
       <dgm:bg/>
       <dgm:whole/>
@@ -11113,23 +11258,15 @@
       <dgm:ptLst>
         <dgm:pt modelId="0" type="doc"/>
         <dgm:pt modelId="1"/>
-        <dgm:pt modelId="11"/>
         <dgm:pt modelId="2"/>
-        <dgm:pt modelId="21"/>
         <dgm:pt modelId="3"/>
-        <dgm:pt modelId="31"/>
         <dgm:pt modelId="4"/>
-        <dgm:pt modelId="41"/>
       </dgm:ptLst>
       <dgm:cxnLst>
         <dgm:cxn modelId="5" srcId="0" destId="1" srcOrd="0" destOrd="0"/>
         <dgm:cxn modelId="6" srcId="0" destId="2" srcOrd="1" destOrd="0"/>
         <dgm:cxn modelId="7" srcId="0" destId="3" srcOrd="2" destOrd="0"/>
         <dgm:cxn modelId="8" srcId="0" destId="4" srcOrd="3" destOrd="0"/>
-        <dgm:cxn modelId="13" srcId="1" destId="11" srcOrd="0" destOrd="0"/>
-        <dgm:cxn modelId="23" srcId="2" destId="21" srcOrd="0" destOrd="0"/>
-        <dgm:cxn modelId="33" srcId="3" destId="31" srcOrd="0" destOrd="0"/>
-        <dgm:cxn modelId="43" srcId="4" destId="41" srcOrd="0" destOrd="0"/>
       </dgm:cxnLst>
       <dgm:bg/>
       <dgm:whole/>
@@ -11138,248 +11275,93 @@
   <dgm:layoutNode name="Name0">
     <dgm:varLst>
       <dgm:dir/>
-      <dgm:animLvl val="lvl"/>
       <dgm:resizeHandles val="exact"/>
     </dgm:varLst>
-    <dgm:alg type="lin">
-      <dgm:param type="linDir" val="fromB"/>
-    </dgm:alg>
+    <dgm:choose name="Name1">
+      <dgm:if name="Name2" func="var" arg="dir" op="equ" val="norm">
+        <dgm:alg type="lin"/>
+      </dgm:if>
+      <dgm:else name="Name3">
+        <dgm:alg type="lin">
+          <dgm:param type="linDir" val="fromR"/>
+        </dgm:alg>
+      </dgm:else>
+    </dgm:choose>
     <dgm:shape xmlns:r="http://schemas.openxmlformats.org/officeDocument/2006/relationships" r:blip="">
       <dgm:adjLst/>
     </dgm:shape>
     <dgm:presOf/>
     <dgm:constrLst>
-      <dgm:constr type="h" for="ch" forName="boxAndChildren" refType="h"/>
-      <dgm:constr type="h" for="ch" forName="arrowAndChildren" refType="h" refFor="ch" refForName="boxAndChildren" op="equ" fact="1.538"/>
-      <dgm:constr type="w" for="ch" forName="arrowAndChildren" refType="w"/>
-      <dgm:constr type="w" for="ch" forName="boxAndChildren" refType="w"/>
-      <dgm:constr type="h" for="ch" forName="sp" refType="h" fact="-0.015"/>
-      <dgm:constr type="primFontSz" for="des" forName="parentTextBox" val="65"/>
-      <dgm:constr type="primFontSz" for="des" forName="parentTextArrow" refType="primFontSz" refFor="des" refForName="parentTextBox" op="equ"/>
-      <dgm:constr type="primFontSz" for="des" forName="childTextArrow" val="65"/>
-      <dgm:constr type="primFontSz" for="des" forName="childTextBox" refType="primFontSz" refFor="des" refForName="childTextArrow" op="equ"/>
+      <dgm:constr type="w" for="ch" ptType="node" refType="w"/>
+      <dgm:constr type="h" for="ch" ptType="node" op="equ"/>
+      <dgm:constr type="primFontSz" for="ch" ptType="node" op="equ" val="65"/>
+      <dgm:constr type="w" for="ch" ptType="sibTrans" refType="w" refFor="ch" refPtType="node" op="equ" fact="0.4"/>
+      <dgm:constr type="h" for="ch" ptType="sibTrans" op="equ"/>
+      <dgm:constr type="primFontSz" for="des" forName="connectorText" op="equ" val="55"/>
+      <dgm:constr type="primFontSz" for="des" forName="connectorText" refType="primFontSz" refFor="ch" refPtType="node" op="lte" fact="0.8"/>
     </dgm:constrLst>
     <dgm:ruleLst/>
-    <dgm:forEach name="Name1" axis="ch" ptType="node" st="-1" step="-1">
-      <dgm:choose name="Name2">
-        <dgm:if name="Name3" axis="self" ptType="node" func="revPos" op="equ" val="1">
-          <dgm:layoutNode name="boxAndChildren">
-            <dgm:alg type="composite"/>
-            <dgm:shape xmlns:r="http://schemas.openxmlformats.org/officeDocument/2006/relationships" r:blip="">
-              <dgm:adjLst/>
-            </dgm:shape>
-            <dgm:presOf/>
-            <dgm:choose name="Name4">
-              <dgm:if name="Name5" axis="ch" ptType="node" func="cnt" op="gte" val="1">
-                <dgm:constrLst>
-                  <dgm:constr type="w" for="ch" forName="parentTextBox" refType="w"/>
-                  <dgm:constr type="h" for="ch" forName="parentTextBox" refType="h" fact="0.54"/>
-                  <dgm:constr type="t" for="ch" forName="parentTextBox"/>
-                  <dgm:constr type="w" for="ch" forName="entireBox" refType="w"/>
-                  <dgm:constr type="h" for="ch" forName="entireBox" refType="h"/>
-                  <dgm:constr type="w" for="ch" forName="descendantBox" refType="w"/>
-                  <dgm:constr type="b" for="ch" forName="descendantBox" refType="h" fact="0.98"/>
-                  <dgm:constr type="h" for="ch" forName="descendantBox" refType="h" fact="0.46"/>
-                </dgm:constrLst>
-              </dgm:if>
-              <dgm:else name="Name6">
-                <dgm:constrLst>
-                  <dgm:constr type="w" for="ch" forName="parentTextBox" refType="w"/>
-                  <dgm:constr type="h" for="ch" forName="parentTextBox" refType="h"/>
-                </dgm:constrLst>
-              </dgm:else>
-            </dgm:choose>
-            <dgm:ruleLst/>
-            <dgm:layoutNode name="parentTextBox">
-              <dgm:alg type="tx"/>
-              <dgm:choose name="Name7">
-                <dgm:if name="Name8" axis="ch" ptType="node" func="cnt" op="gte" val="1">
-                  <dgm:shape xmlns:r="http://schemas.openxmlformats.org/officeDocument/2006/relationships" type="rect" r:blip="" zOrderOff="1" hideGeom="1">
-                    <dgm:adjLst/>
-                  </dgm:shape>
-                </dgm:if>
-                <dgm:else name="Name9">
-                  <dgm:shape xmlns:r="http://schemas.openxmlformats.org/officeDocument/2006/relationships" type="rect" r:blip="">
-                    <dgm:adjLst/>
-                  </dgm:shape>
-                </dgm:else>
-              </dgm:choose>
-              <dgm:presOf axis="self"/>
-              <dgm:constrLst/>
-              <dgm:ruleLst>
-                <dgm:rule type="primFontSz" val="5" fact="NaN" max="NaN"/>
-              </dgm:ruleLst>
-            </dgm:layoutNode>
-            <dgm:choose name="Name10">
-              <dgm:if name="Name11" axis="ch" ptType="node" func="cnt" op="gte" val="1">
-                <dgm:layoutNode name="entireBox">
-                  <dgm:alg type="sp"/>
-                  <dgm:shape xmlns:r="http://schemas.openxmlformats.org/officeDocument/2006/relationships" type="rect" r:blip="">
-                    <dgm:adjLst/>
-                  </dgm:shape>
-                  <dgm:presOf axis="self"/>
-                  <dgm:constrLst/>
-                  <dgm:ruleLst/>
-                </dgm:layoutNode>
-                <dgm:layoutNode name="descendantBox" styleLbl="fgAccFollowNode1">
-                  <dgm:choose name="Name12">
-                    <dgm:if name="Name13" func="var" arg="dir" op="equ" val="norm">
-                      <dgm:alg type="lin"/>
-                    </dgm:if>
-                    <dgm:else name="Name14">
-                      <dgm:alg type="lin">
-                        <dgm:param type="linDir" val="fromR"/>
-                      </dgm:alg>
-                    </dgm:else>
-                  </dgm:choose>
-                  <dgm:shape xmlns:r="http://schemas.openxmlformats.org/officeDocument/2006/relationships" r:blip="">
-                    <dgm:adjLst/>
-                  </dgm:shape>
-                  <dgm:presOf/>
-                  <dgm:constrLst>
-                    <dgm:constr type="w" for="ch" forName="childTextBox" refType="w"/>
-                    <dgm:constr type="h" for="ch" forName="childTextBox" refType="h"/>
-                  </dgm:constrLst>
-                  <dgm:ruleLst/>
-                  <dgm:forEach name="Name15" axis="ch" ptType="node">
-                    <dgm:layoutNode name="childTextBox" styleLbl="fgAccFollowNode1">
-                      <dgm:varLst>
-                        <dgm:bulletEnabled val="1"/>
-                      </dgm:varLst>
-                      <dgm:alg type="tx"/>
-                      <dgm:shape xmlns:r="http://schemas.openxmlformats.org/officeDocument/2006/relationships" type="rect" r:blip="">
-                        <dgm:adjLst/>
-                      </dgm:shape>
-                      <dgm:presOf axis="desOrSelf" ptType="node"/>
-                      <dgm:constrLst>
-                        <dgm:constr type="tMarg" refType="primFontSz" fact="0.1"/>
-                        <dgm:constr type="bMarg" refType="primFontSz" fact="0.1"/>
-                      </dgm:constrLst>
-                      <dgm:ruleLst>
-                        <dgm:rule type="primFontSz" val="5" fact="NaN" max="NaN"/>
-                      </dgm:ruleLst>
-                    </dgm:layoutNode>
-                  </dgm:forEach>
-                </dgm:layoutNode>
-              </dgm:if>
-              <dgm:else name="Name16"/>
-            </dgm:choose>
-          </dgm:layoutNode>
-        </dgm:if>
-        <dgm:else name="Name17">
-          <dgm:layoutNode name="arrowAndChildren">
-            <dgm:alg type="composite"/>
-            <dgm:shape xmlns:r="http://schemas.openxmlformats.org/officeDocument/2006/relationships" r:blip="">
-              <dgm:adjLst/>
-            </dgm:shape>
-            <dgm:presOf/>
-            <dgm:choose name="Name18">
-              <dgm:if name="Name19" axis="ch" ptType="node" func="cnt" op="gte" val="1">
-                <dgm:constrLst>
-                  <dgm:constr type="w" for="ch" forName="parentTextArrow" refType="w"/>
-                  <dgm:constr type="t" for="ch" forName="parentTextArrow"/>
-                  <dgm:constr type="h" for="ch" forName="parentTextArrow" refType="h" fact="0.351"/>
-                  <dgm:constr type="w" for="ch" forName="arrow" refType="w"/>
-                  <dgm:constr type="h" for="ch" forName="arrow" refType="h"/>
-                  <dgm:constr type="w" for="ch" forName="descendantArrow" refType="w"/>
-                  <dgm:constr type="b" for="ch" forName="descendantArrow" refType="h" fact="0.65"/>
-                  <dgm:constr type="h" for="ch" forName="descendantArrow" refType="h" fact="0.299"/>
-                </dgm:constrLst>
-              </dgm:if>
-              <dgm:else name="Name20">
-                <dgm:constrLst>
-                  <dgm:constr type="w" for="ch" forName="parentTextArrow" refType="w"/>
-                  <dgm:constr type="h" for="ch" forName="parentTextArrow" refType="h"/>
-                </dgm:constrLst>
-              </dgm:else>
-            </dgm:choose>
-            <dgm:ruleLst/>
-            <dgm:layoutNode name="parentTextArrow">
-              <dgm:alg type="tx"/>
-              <dgm:choose name="Name21">
-                <dgm:if name="Name22" axis="ch" ptType="node" func="cnt" op="gte" val="1">
-                  <dgm:shape xmlns:r="http://schemas.openxmlformats.org/officeDocument/2006/relationships" type="rect" r:blip="" zOrderOff="1" hideGeom="1">
-                    <dgm:adjLst/>
-                  </dgm:shape>
-                </dgm:if>
-                <dgm:else name="Name23">
-                  <dgm:shape xmlns:r="http://schemas.openxmlformats.org/officeDocument/2006/relationships" rot="180" type="upArrowCallout" r:blip="">
-                    <dgm:adjLst/>
-                  </dgm:shape>
-                </dgm:else>
-              </dgm:choose>
-              <dgm:presOf axis="self"/>
-              <dgm:constrLst/>
-              <dgm:ruleLst>
-                <dgm:rule type="primFontSz" val="5" fact="NaN" max="NaN"/>
-              </dgm:ruleLst>
-            </dgm:layoutNode>
-            <dgm:choose name="Name24">
-              <dgm:if name="Name25" axis="ch" ptType="node" func="cnt" op="gte" val="1">
-                <dgm:layoutNode name="arrow">
-                  <dgm:alg type="sp"/>
-                  <dgm:shape xmlns:r="http://schemas.openxmlformats.org/officeDocument/2006/relationships" rot="180" type="upArrowCallout" r:blip="">
-                    <dgm:adjLst/>
-                  </dgm:shape>
-                  <dgm:presOf axis="self"/>
-                  <dgm:constrLst/>
-                  <dgm:ruleLst/>
-                </dgm:layoutNode>
-                <dgm:layoutNode name="descendantArrow">
-                  <dgm:choose name="Name26">
-                    <dgm:if name="Name27" func="var" arg="dir" op="equ" val="norm">
-                      <dgm:alg type="lin"/>
-                    </dgm:if>
-                    <dgm:else name="Name28">
-                      <dgm:alg type="lin">
-                        <dgm:param type="linDir" val="fromR"/>
-                      </dgm:alg>
-                    </dgm:else>
-                  </dgm:choose>
-                  <dgm:shape xmlns:r="http://schemas.openxmlformats.org/officeDocument/2006/relationships" r:blip="">
-                    <dgm:adjLst/>
-                  </dgm:shape>
-                  <dgm:presOf/>
-                  <dgm:constrLst>
-                    <dgm:constr type="w" for="ch" forName="childTextArrow" refType="w"/>
-                    <dgm:constr type="h" for="ch" forName="childTextArrow" refType="h"/>
-                  </dgm:constrLst>
-                  <dgm:ruleLst/>
-                  <dgm:forEach name="Name29" axis="ch" ptType="node">
-                    <dgm:layoutNode name="childTextArrow" styleLbl="fgAccFollowNode1">
-                      <dgm:varLst>
-                        <dgm:bulletEnabled val="1"/>
-                      </dgm:varLst>
-                      <dgm:alg type="tx"/>
-                      <dgm:shape xmlns:r="http://schemas.openxmlformats.org/officeDocument/2006/relationships" type="rect" r:blip="">
-                        <dgm:adjLst/>
-                      </dgm:shape>
-                      <dgm:presOf axis="desOrSelf" ptType="node"/>
-                      <dgm:constrLst>
-                        <dgm:constr type="tMarg" refType="primFontSz" fact="0.1"/>
-                        <dgm:constr type="bMarg" refType="primFontSz" fact="0.1"/>
-                      </dgm:constrLst>
-                      <dgm:ruleLst>
-                        <dgm:rule type="primFontSz" val="5" fact="NaN" max="NaN"/>
-                      </dgm:ruleLst>
-                    </dgm:layoutNode>
-                  </dgm:forEach>
-                </dgm:layoutNode>
-              </dgm:if>
-              <dgm:else name="Name30"/>
-            </dgm:choose>
-          </dgm:layoutNode>
-        </dgm:else>
-      </dgm:choose>
-      <dgm:forEach name="Name31" axis="precedSib" ptType="sibTrans" st="-1" cnt="1">
-        <dgm:layoutNode name="sp">
-          <dgm:alg type="sp"/>
-          <dgm:shape xmlns:r="http://schemas.openxmlformats.org/officeDocument/2006/relationships" r:blip="">
+    <dgm:forEach name="nodesForEach" axis="ch" ptType="node">
+      <dgm:layoutNode name="node">
+        <dgm:varLst>
+          <dgm:bulletEnabled val="1"/>
+        </dgm:varLst>
+        <dgm:alg type="tx"/>
+        <dgm:shape xmlns:r="http://schemas.openxmlformats.org/officeDocument/2006/relationships" type="roundRect" r:blip="">
+          <dgm:adjLst>
+            <dgm:adj idx="1" val="0.1"/>
+          </dgm:adjLst>
+        </dgm:shape>
+        <dgm:presOf axis="desOrSelf" ptType="node"/>
+        <dgm:constrLst>
+          <dgm:constr type="h" refType="w" fact="0.6"/>
+          <dgm:constr type="tMarg" refType="primFontSz" fact="0.3"/>
+          <dgm:constr type="bMarg" refType="primFontSz" fact="0.3"/>
+          <dgm:constr type="lMarg" refType="primFontSz" fact="0.3"/>
+          <dgm:constr type="rMarg" refType="primFontSz" fact="0.3"/>
+        </dgm:constrLst>
+        <dgm:ruleLst>
+          <dgm:rule type="primFontSz" val="18" fact="NaN" max="NaN"/>
+          <dgm:rule type="h" val="NaN" fact="1.5" max="NaN"/>
+          <dgm:rule type="primFontSz" val="5" fact="NaN" max="NaN"/>
+          <dgm:rule type="h" val="INF" fact="NaN" max="NaN"/>
+        </dgm:ruleLst>
+      </dgm:layoutNode>
+      <dgm:forEach name="sibTransForEach" axis="followSib" ptType="sibTrans" cnt="1">
+        <dgm:layoutNode name="sibTrans">
+          <dgm:alg type="conn">
+            <dgm:param type="begPts" val="auto"/>
+            <dgm:param type="endPts" val="auto"/>
+          </dgm:alg>
+          <dgm:shape xmlns:r="http://schemas.openxmlformats.org/officeDocument/2006/relationships" type="conn" r:blip="">
             <dgm:adjLst/>
           </dgm:shape>
           <dgm:presOf axis="self"/>
-          <dgm:constrLst/>
+          <dgm:constrLst>
+            <dgm:constr type="h" refType="w" fact="0.62"/>
+            <dgm:constr type="connDist"/>
+            <dgm:constr type="begPad" refType="connDist" fact="0.25"/>
+            <dgm:constr type="endPad" refType="connDist" fact="0.22"/>
+          </dgm:constrLst>
           <dgm:ruleLst/>
+          <dgm:layoutNode name="connectorText">
+            <dgm:alg type="tx">
+              <dgm:param type="autoTxRot" val="grav"/>
+            </dgm:alg>
+            <dgm:shape xmlns:r="http://schemas.openxmlformats.org/officeDocument/2006/relationships" type="conn" r:blip="" hideGeom="1">
+              <dgm:adjLst/>
+            </dgm:shape>
+            <dgm:presOf axis="self"/>
+            <dgm:constrLst>
+              <dgm:constr type="lMarg"/>
+              <dgm:constr type="rMarg"/>
+              <dgm:constr type="tMarg"/>
+              <dgm:constr type="bMarg"/>
+            </dgm:constrLst>
+            <dgm:ruleLst>
+              <dgm:rule type="primFontSz" val="5" fact="NaN" max="NaN"/>
+            </dgm:ruleLst>
+          </dgm:layoutNode>
         </dgm:layoutNode>
       </dgm:forEach>
     </dgm:forEach>
@@ -20521,11 +20503,7 @@
             </a:r>
             <a:r>
               <a:rPr lang="en-US" dirty="0" smtClean="0"/>
-              <a:t> </a:t>
-            </a:r>
-            <a:r>
-              <a:rPr lang="en-US" dirty="0" smtClean="0"/>
-              <a:t>is mapped to </a:t>
+              <a:t> is mapped to </a:t>
             </a:r>
             <a:r>
               <a:rPr lang="en-US" i="1" dirty="0" smtClean="0"/>
@@ -20533,11 +20511,7 @@
             </a:r>
             <a:r>
               <a:rPr lang="en-US" dirty="0" smtClean="0"/>
-              <a:t> (</a:t>
-            </a:r>
-            <a:r>
-              <a:rPr lang="en-US" dirty="0" smtClean="0"/>
-              <a:t>device-side </a:t>
+              <a:t> (device-side </a:t>
             </a:r>
             <a:r>
               <a:rPr lang="en-US" dirty="0" err="1" smtClean="0"/>
@@ -20547,7 +20521,6 @@
               <a:rPr lang="en-US" dirty="0" smtClean="0"/>
               <a:t>) invocation.</a:t>
             </a:r>
-            <a:endParaRPr lang="en-US" dirty="0" smtClean="0"/>
           </a:p>
           <a:p>
             <a:pPr>
@@ -20565,11 +20538,7 @@
             </a:r>
             <a:r>
               <a:rPr lang="en-US" dirty="0" smtClean="0"/>
-              <a:t>) are </a:t>
-            </a:r>
-            <a:r>
-              <a:rPr lang="en-US" dirty="0" smtClean="0"/>
-              <a:t>implemented as </a:t>
+              <a:t>) are implemented as </a:t>
             </a:r>
             <a:r>
               <a:rPr lang="en-US" i="1" dirty="0" smtClean="0"/>
@@ -20577,15 +20546,7 @@
             </a:r>
             <a:r>
               <a:rPr lang="en-US" dirty="0" smtClean="0"/>
-              <a:t> operations </a:t>
-            </a:r>
-            <a:r>
-              <a:rPr lang="en-US" dirty="0" smtClean="0"/>
-              <a:t>which are mapped onto </a:t>
-            </a:r>
-            <a:r>
-              <a:rPr lang="en-US" dirty="0" smtClean="0"/>
-              <a:t>DMA invocations </a:t>
+              <a:t> operations which are mapped onto DMA invocations </a:t>
             </a:r>
             <a:r>
               <a:rPr lang="en-US" b="1" i="1" dirty="0" smtClean="0"/>
@@ -20625,19 +20586,7 @@
             </a:r>
             <a:r>
               <a:rPr lang="en-US" dirty="0" smtClean="0"/>
-              <a:t> </a:t>
-            </a:r>
-            <a:r>
-              <a:rPr lang="en-US" dirty="0" smtClean="0"/>
-              <a:t>are </a:t>
-            </a:r>
-            <a:r>
-              <a:rPr lang="en-US" dirty="0" smtClean="0"/>
-              <a:t>implemented by </a:t>
-            </a:r>
-            <a:r>
-              <a:rPr lang="en-US" dirty="0" smtClean="0"/>
-              <a:t>COI Run-Functions that launch kernels asynchronously and immediately return.</a:t>
+              <a:t> are implemented by COI Run-Functions that launch kernels asynchronously and immediately return.</a:t>
             </a:r>
           </a:p>
           <a:p>
@@ -21326,15 +21275,7 @@
             <a:pPr lvl="1"/>
             <a:r>
               <a:rPr lang="en-US" dirty="0" smtClean="0"/>
-              <a:t>Event signaling is done by either COI itself as operation is completed or by explicit </a:t>
-            </a:r>
-            <a:r>
-              <a:rPr lang="en-US" dirty="0" smtClean="0"/>
-              <a:t>COI API call </a:t>
-            </a:r>
-            <a:r>
-              <a:rPr lang="en-US" dirty="0" smtClean="0"/>
-              <a:t>at device side.</a:t>
+              <a:t>Event signaling is done by either COI itself as operation is completed or by explicit COI API call at device side.</a:t>
             </a:r>
           </a:p>
           <a:p>
@@ -21487,14 +21428,14 @@
             <p:ph idx="1"/>
             <p:extLst>
               <p:ext uri="{D42A27DB-BD31-4B8C-83A1-F6EECF244321}">
-                <p14:modId xmlns:p14="http://schemas.microsoft.com/office/powerpoint/2010/main" val="3196977865"/>
+                <p14:modId xmlns:p14="http://schemas.microsoft.com/office/powerpoint/2010/main" val="897896682"/>
               </p:ext>
             </p:extLst>
           </p:nvPr>
         </p:nvGraphicFramePr>
         <p:xfrm>
-          <a:off x="455613" y="1219200"/>
-          <a:ext cx="8237537" cy="4953000"/>
+          <a:off x="455613" y="3810000"/>
+          <a:ext cx="8237537" cy="2362200"/>
         </p:xfrm>
         <a:graphic>
           <a:graphicData uri="http://schemas.openxmlformats.org/drawingml/2006/diagram">
@@ -21550,6 +21491,268 @@
               <a:t>12</a:t>
             </a:fld>
             <a:endParaRPr lang="en-US"/>
+          </a:p>
+        </p:txBody>
+      </p:sp>
+      <p:sp>
+        <p:nvSpPr>
+          <p:cNvPr id="7" name="Content Placeholder 1"/>
+          <p:cNvSpPr txBox="1">
+            <a:spLocks/>
+          </p:cNvSpPr>
+          <p:nvPr/>
+        </p:nvSpPr>
+        <p:spPr bwMode="auto">
+          <a:xfrm>
+            <a:off x="455613" y="1143000"/>
+            <a:ext cx="8237537" cy="2286000"/>
+          </a:xfrm>
+          <a:prstGeom prst="rect">
+            <a:avLst/>
+          </a:prstGeom>
+          <a:noFill/>
+          <a:ln w="9525">
+            <a:noFill/>
+            <a:miter lim="800000"/>
+            <a:headEnd/>
+            <a:tailEnd/>
+          </a:ln>
+          <a:effectLst/>
+        </p:spPr>
+        <p:txBody>
+          <a:bodyPr vert="horz" wrap="square" lIns="0" tIns="0" rIns="0" bIns="0" numCol="1" anchor="t" anchorCtr="0" compatLnSpc="1">
+            <a:prstTxWarp prst="textNoShape">
+              <a:avLst/>
+            </a:prstTxWarp>
+          </a:bodyPr>
+          <a:lstStyle>
+            <a:lvl1pPr marL="234950" indent="-234950" algn="l" rtl="0" eaLnBrk="1" fontAlgn="base" hangingPunct="1">
+              <a:lnSpc>
+                <a:spcPct val="90000"/>
+              </a:lnSpc>
+              <a:spcBef>
+                <a:spcPct val="30000"/>
+              </a:spcBef>
+              <a:spcAft>
+                <a:spcPct val="0"/>
+              </a:spcAft>
+              <a:buChar char="•"/>
+              <a:defRPr sz="2000">
+                <a:solidFill>
+                  <a:schemeClr val="tx1"/>
+                </a:solidFill>
+                <a:latin typeface="+mn-lt"/>
+                <a:ea typeface="+mn-ea"/>
+                <a:cs typeface="+mn-cs"/>
+              </a:defRPr>
+            </a:lvl1pPr>
+            <a:lvl2pPr marL="628650" indent="-223838" algn="l" rtl="0" eaLnBrk="1" fontAlgn="base" hangingPunct="1">
+              <a:spcBef>
+                <a:spcPct val="30000"/>
+              </a:spcBef>
+              <a:spcAft>
+                <a:spcPct val="0"/>
+              </a:spcAft>
+              <a:buFont typeface="Wingdings" pitchFamily="2" charset="2"/>
+              <a:buChar char="§"/>
+              <a:defRPr>
+                <a:solidFill>
+                  <a:schemeClr val="tx1"/>
+                </a:solidFill>
+                <a:latin typeface="+mn-lt"/>
+              </a:defRPr>
+            </a:lvl2pPr>
+            <a:lvl3pPr marL="895350" indent="-152400" algn="l" rtl="0" eaLnBrk="1" fontAlgn="base" hangingPunct="1">
+              <a:spcBef>
+                <a:spcPct val="30000"/>
+              </a:spcBef>
+              <a:spcAft>
+                <a:spcPct val="0"/>
+              </a:spcAft>
+              <a:buChar char="–"/>
+              <a:defRPr sz="1600">
+                <a:solidFill>
+                  <a:schemeClr val="tx1"/>
+                </a:solidFill>
+                <a:latin typeface="+mn-lt"/>
+              </a:defRPr>
+            </a:lvl3pPr>
+            <a:lvl4pPr marL="1162050" indent="-152400" algn="l" rtl="0" eaLnBrk="1" fontAlgn="base" hangingPunct="1">
+              <a:spcBef>
+                <a:spcPct val="30000"/>
+              </a:spcBef>
+              <a:spcAft>
+                <a:spcPct val="0"/>
+              </a:spcAft>
+              <a:buFont typeface="Times" pitchFamily="18" charset="0"/>
+              <a:buChar char="•"/>
+              <a:defRPr sz="1400">
+                <a:solidFill>
+                  <a:schemeClr val="tx1"/>
+                </a:solidFill>
+                <a:latin typeface="+mn-lt"/>
+              </a:defRPr>
+            </a:lvl4pPr>
+            <a:lvl5pPr marL="1520825" indent="-244475" algn="l" rtl="0" eaLnBrk="1" fontAlgn="base" hangingPunct="1">
+              <a:spcBef>
+                <a:spcPct val="30000"/>
+              </a:spcBef>
+              <a:spcAft>
+                <a:spcPct val="0"/>
+              </a:spcAft>
+              <a:buChar char="–"/>
+              <a:defRPr sz="1200">
+                <a:solidFill>
+                  <a:schemeClr val="tx1"/>
+                </a:solidFill>
+                <a:latin typeface="+mn-lt"/>
+              </a:defRPr>
+            </a:lvl5pPr>
+            <a:lvl6pPr marL="1978025" indent="-244475" algn="l" rtl="0" eaLnBrk="1" fontAlgn="base" hangingPunct="1">
+              <a:spcBef>
+                <a:spcPct val="30000"/>
+              </a:spcBef>
+              <a:spcAft>
+                <a:spcPct val="0"/>
+              </a:spcAft>
+              <a:buChar char="–"/>
+              <a:defRPr sz="1200">
+                <a:solidFill>
+                  <a:schemeClr val="tx1"/>
+                </a:solidFill>
+                <a:latin typeface="+mn-lt"/>
+              </a:defRPr>
+            </a:lvl6pPr>
+            <a:lvl7pPr marL="2435225" indent="-244475" algn="l" rtl="0" eaLnBrk="1" fontAlgn="base" hangingPunct="1">
+              <a:spcBef>
+                <a:spcPct val="30000"/>
+              </a:spcBef>
+              <a:spcAft>
+                <a:spcPct val="0"/>
+              </a:spcAft>
+              <a:buChar char="–"/>
+              <a:defRPr sz="1200">
+                <a:solidFill>
+                  <a:schemeClr val="tx1"/>
+                </a:solidFill>
+                <a:latin typeface="+mn-lt"/>
+              </a:defRPr>
+            </a:lvl7pPr>
+            <a:lvl8pPr marL="2892425" indent="-244475" algn="l" rtl="0" eaLnBrk="1" fontAlgn="base" hangingPunct="1">
+              <a:spcBef>
+                <a:spcPct val="30000"/>
+              </a:spcBef>
+              <a:spcAft>
+                <a:spcPct val="0"/>
+              </a:spcAft>
+              <a:buChar char="–"/>
+              <a:defRPr sz="1200">
+                <a:solidFill>
+                  <a:schemeClr val="tx1"/>
+                </a:solidFill>
+                <a:latin typeface="+mn-lt"/>
+              </a:defRPr>
+            </a:lvl8pPr>
+            <a:lvl9pPr marL="3349625" indent="-244475" algn="l" rtl="0" eaLnBrk="1" fontAlgn="base" hangingPunct="1">
+              <a:spcBef>
+                <a:spcPct val="30000"/>
+              </a:spcBef>
+              <a:spcAft>
+                <a:spcPct val="0"/>
+              </a:spcAft>
+              <a:buChar char="–"/>
+              <a:defRPr sz="1200">
+                <a:solidFill>
+                  <a:schemeClr val="tx1"/>
+                </a:solidFill>
+                <a:latin typeface="+mn-lt"/>
+              </a:defRPr>
+            </a:lvl9pPr>
+          </a:lstStyle>
+          <a:p>
+            <a:r>
+              <a:rPr lang="en-US" dirty="0" smtClean="0"/>
+              <a:t>OpenCL spec 1.2 defines </a:t>
+            </a:r>
+            <a:r>
+              <a:rPr lang="en-US" dirty="0" err="1" smtClean="0"/>
+              <a:t>printf</a:t>
+            </a:r>
+            <a:r>
+              <a:rPr lang="en-US" dirty="0" smtClean="0"/>
+              <a:t>() usage inside kernels as debug-only feature</a:t>
+            </a:r>
+          </a:p>
+          <a:p>
+            <a:r>
+              <a:rPr lang="en-US" dirty="0" smtClean="0"/>
+              <a:t>Implementation should dump kernel </a:t>
+            </a:r>
+            <a:r>
+              <a:rPr lang="en-US" dirty="0" err="1" smtClean="0"/>
+              <a:t>printf</a:t>
+            </a:r>
+            <a:r>
+              <a:rPr lang="en-US" dirty="0" smtClean="0"/>
+              <a:t>() output to any implementation-defined stream on host not later than relevant </a:t>
+            </a:r>
+            <a:r>
+              <a:rPr lang="en-US" dirty="0" err="1" smtClean="0"/>
+              <a:t>NDRange</a:t>
+            </a:r>
+            <a:r>
+              <a:rPr lang="en-US" dirty="0" smtClean="0"/>
+              <a:t> command is signed as completed</a:t>
+            </a:r>
+          </a:p>
+          <a:p>
+            <a:r>
+              <a:rPr lang="en-US" dirty="0" err="1" smtClean="0"/>
+              <a:t>Printf</a:t>
+            </a:r>
+            <a:r>
+              <a:rPr lang="en-US" dirty="0" smtClean="0"/>
+              <a:t>() outputs may overlap in any order given each single </a:t>
+            </a:r>
+            <a:r>
+              <a:rPr lang="en-US" dirty="0" err="1" smtClean="0"/>
+              <a:t>printf</a:t>
+            </a:r>
+            <a:r>
+              <a:rPr lang="en-US" dirty="0" smtClean="0"/>
+              <a:t>() output is sequential.</a:t>
+            </a:r>
+          </a:p>
+          <a:p>
+            <a:r>
+              <a:rPr lang="en-US" dirty="0" smtClean="0"/>
+              <a:t>MIC DA will reuse COI </a:t>
+            </a:r>
+            <a:r>
+              <a:rPr lang="en-US" dirty="0" err="1" smtClean="0"/>
+              <a:t>stdout</a:t>
+            </a:r>
+            <a:r>
+              <a:rPr lang="en-US" dirty="0" smtClean="0"/>
+              <a:t> redirection support to redirect device </a:t>
+            </a:r>
+            <a:r>
+              <a:rPr lang="en-US" dirty="0" err="1" smtClean="0"/>
+              <a:t>stdout</a:t>
+            </a:r>
+            <a:r>
+              <a:rPr lang="en-US" dirty="0" smtClean="0"/>
+              <a:t> to host </a:t>
+            </a:r>
+            <a:r>
+              <a:rPr lang="en-US" dirty="0" err="1" smtClean="0"/>
+              <a:t>stdout</a:t>
+            </a:r>
+            <a:r>
+              <a:rPr lang="en-US" dirty="0" smtClean="0"/>
+              <a:t>.</a:t>
+            </a:r>
+            <a:endParaRPr lang="en-US" dirty="0"/>
           </a:p>
         </p:txBody>
       </p:sp>
@@ -21929,17 +22132,7 @@
                 <a:effectLst/>
                 <a:latin typeface="+mn-lt"/>
               </a:rPr>
-              <a:t>measurement</a:t>
-            </a:r>
-            <a:r>
-              <a:rPr lang="en-US" sz="1400" b="0" dirty="0" smtClean="0">
-                <a:solidFill>
-                  <a:schemeClr val="tx1"/>
-                </a:solidFill>
-                <a:effectLst/>
-                <a:latin typeface="+mn-lt"/>
-              </a:rPr>
-              <a:t>.</a:t>
+              <a:t>measurement.</a:t>
             </a:r>
           </a:p>
           <a:p>
@@ -22423,9 +22616,6 @@
               </a:rPr>
               <a:t>will use distinct set of HW execution units (HW Cores/Threads)</a:t>
             </a:r>
-            <a:endParaRPr lang="en-US" b="0" dirty="0">
-              <a:effectLst/>
-            </a:endParaRPr>
           </a:p>
         </p:txBody>
       </p:sp>
@@ -22479,14 +22669,14 @@
             <p:ph idx="1"/>
             <p:extLst>
               <p:ext uri="{D42A27DB-BD31-4B8C-83A1-F6EECF244321}">
-                <p14:modId xmlns:p14="http://schemas.microsoft.com/office/powerpoint/2010/main" val="3634274934"/>
+                <p14:modId xmlns:p14="http://schemas.microsoft.com/office/powerpoint/2010/main" val="242761339"/>
               </p:ext>
             </p:extLst>
           </p:nvPr>
         </p:nvGraphicFramePr>
         <p:xfrm>
           <a:off x="304800" y="909320"/>
-          <a:ext cx="8610600" cy="5486400"/>
+          <a:ext cx="8610600" cy="5339080"/>
         </p:xfrm>
         <a:graphic>
           <a:graphicData uri="http://schemas.openxmlformats.org/drawingml/2006/table">
@@ -22893,11 +23083,19 @@
                     <a:p>
                       <a:r>
                         <a:rPr lang="en-US" sz="1400" dirty="0" smtClean="0"/>
-                        <a:t>512 bytes</a:t>
+                        <a:t>1024 bites</a:t>
                       </a:r>
                       <a:r>
                         <a:rPr lang="en-US" sz="1400" baseline="0" dirty="0" smtClean="0"/>
-                        <a:t> – maximum alignment of KNF/KNC vector instructions</a:t>
+                        <a:t> </a:t>
+                      </a:r>
+                      <a:r>
+                        <a:rPr lang="en-US" sz="1400" baseline="0" dirty="0" smtClean="0"/>
+                        <a:t>– </a:t>
+                      </a:r>
+                      <a:r>
+                        <a:rPr lang="en-US" sz="1400" baseline="0" dirty="0" smtClean="0"/>
+                        <a:t>long16 alignment</a:t>
                       </a:r>
                       <a:endParaRPr lang="en-US" sz="1400" b="0" dirty="0"/>
                     </a:p>
@@ -23161,7 +23359,11 @@
                     <a:p>
                       <a:r>
                         <a:rPr lang="en-US" sz="1400" u="none" strike="noStrike" kern="1200" baseline="0" dirty="0" smtClean="0"/>
-                        <a:t>FP64, global/local/32/64/base/extended  atomics, byte store, 3D image writes, device fission, GL sharing</a:t>
+                        <a:t>FP64, global/local/32/64/base/extended  atomics, byte store, 3D image writes, device </a:t>
+                      </a:r>
+                      <a:r>
+                        <a:rPr lang="en-US" sz="1400" u="none" strike="noStrike" kern="1200" baseline="0" dirty="0" smtClean="0"/>
+                        <a:t>fission</a:t>
                       </a:r>
                       <a:endParaRPr lang="en-US" sz="1400" b="0" i="0" u="none" strike="noStrike" kern="1200" baseline="0" dirty="0" smtClean="0">
                         <a:solidFill>
@@ -23222,7 +23424,11 @@
                     <a:p>
                       <a:r>
                         <a:rPr lang="en-US" sz="1400" u="none" strike="noStrike" kern="1200" baseline="0" dirty="0" smtClean="0"/>
-                        <a:t>Equally, By Counts, By Affinity Domain</a:t>
+                        <a:t>Equally, By Counts, By Affinity </a:t>
+                      </a:r>
+                      <a:r>
+                        <a:rPr lang="en-US" sz="1400" u="none" strike="noStrike" kern="1200" baseline="0" dirty="0" smtClean="0"/>
+                        <a:t>Domain, By Names (Intel extension)</a:t>
                       </a:r>
                       <a:endParaRPr lang="en-US" sz="1400" b="0" i="0" u="none" strike="noStrike" kern="1200" baseline="0" dirty="0" smtClean="0">
                         <a:solidFill>
@@ -23283,7 +23489,11 @@
                     <a:p>
                       <a:r>
                         <a:rPr lang="en-US" sz="1400" u="none" strike="noStrike" kern="1200" baseline="0" dirty="0" smtClean="0"/>
-                        <a:t>L1 cache only (assume both L1 and L2 split KNF/KNC device into CPU Cores)</a:t>
+                        <a:t>L1 cache </a:t>
+                      </a:r>
+                      <a:r>
+                        <a:rPr lang="en-US" sz="1400" u="none" strike="noStrike" kern="1200" baseline="0" dirty="0" smtClean="0"/>
+                        <a:t>only</a:t>
                       </a:r>
                       <a:endParaRPr lang="en-US" sz="1400" b="0" i="0" u="none" strike="noStrike" kern="1200" baseline="0" dirty="0" smtClean="0">
                         <a:solidFill>
@@ -23399,7 +23609,7 @@
             <p:ph idx="1"/>
             <p:extLst>
               <p:ext uri="{D42A27DB-BD31-4B8C-83A1-F6EECF244321}">
-                <p14:modId xmlns:p14="http://schemas.microsoft.com/office/powerpoint/2010/main" val="3187404401"/>
+                <p14:modId xmlns:p14="http://schemas.microsoft.com/office/powerpoint/2010/main" val="1196218911"/>
               </p:ext>
             </p:extLst>
           </p:nvPr>
@@ -29883,7 +30093,7 @@
             <a:graphicData uri="http://schemas.openxmlformats.org/presentationml/2006/ole">
               <mc:AlternateContent xmlns:mc="http://schemas.openxmlformats.org/markup-compatibility/2006">
                 <mc:Choice xmlns:v="urn:schemas-microsoft-com:vml" Requires="v">
-                  <p:oleObj spid="_x0000_s3212" name="Visio" r:id="rId3" imgW="2998483" imgH="2655307" progId="Visio.Drawing.11">
+                  <p:oleObj spid="_x0000_s3216" name="Visio" r:id="rId3" imgW="2998483" imgH="2655307" progId="Visio.Drawing.11">
                     <p:embed/>
                   </p:oleObj>
                 </mc:Choice>
@@ -32568,7 +32778,7 @@
             <a:graphicData uri="http://schemas.openxmlformats.org/presentationml/2006/ole">
               <mc:AlternateContent xmlns:mc="http://schemas.openxmlformats.org/markup-compatibility/2006">
                 <mc:Choice xmlns:v="urn:schemas-microsoft-com:vml" Requires="v">
-                  <p:oleObj spid="_x0000_s2191" name="Visio" r:id="rId3" imgW="13542503" imgH="6263447" progId="Visio.Drawing.11">
+                  <p:oleObj spid="_x0000_s2195" name="Visio" r:id="rId3" imgW="13542503" imgH="6263447" progId="Visio.Drawing.11">
                     <p:embed/>
                   </p:oleObj>
                 </mc:Choice>

</xml_diff>